<commit_message>
Pushing changes to the app.py flask doc updates to the presentation and updated page for the Predictive Analysis to allow for the form to pass info.
</commit_message>
<xml_diff>
--- a/Project3_Presentation.pptx
+++ b/Project3_Presentation.pptx
@@ -10,6 +10,11 @@
     <p:sldId id="258" r:id="rId4"/>
     <p:sldId id="259" r:id="rId5"/>
     <p:sldId id="260" r:id="rId6"/>
+    <p:sldId id="261" r:id="rId7"/>
+    <p:sldId id="262" r:id="rId8"/>
+    <p:sldId id="263" r:id="rId9"/>
+    <p:sldId id="264" r:id="rId10"/>
+    <p:sldId id="265" r:id="rId11"/>
   </p:sldIdLst>
   <p:sldSz cx="12192000" cy="6858000"/>
   <p:notesSz cx="6858000" cy="9144000"/>
@@ -108,6 +113,11 @@
       </a:defRPr>
     </a:lvl9pPr>
   </p:defaultTextStyle>
+  <p:extLst>
+    <p:ext uri="{EFAFB233-063F-42B5-8137-9DF3F51BA10A}">
+      <p15:sldGuideLst xmlns:p15="http://schemas.microsoft.com/office/powerpoint/2012/main"/>
+    </p:ext>
+  </p:extLst>
 </p:presentation>
 </file>
 
@@ -258,7 +268,7 @@
           <a:p>
             <a:fld id="{7827AB9E-CF3C-4C7C-8B51-C799DF2DBD52}" type="datetimeFigureOut">
               <a:rPr lang="en-US" smtClean="0"/>
-              <a:t>1/21/2021</a:t>
+              <a:t>1/22/2021</a:t>
             </a:fld>
             <a:endParaRPr lang="en-US"/>
           </a:p>
@@ -456,7 +466,7 @@
           <a:p>
             <a:fld id="{7827AB9E-CF3C-4C7C-8B51-C799DF2DBD52}" type="datetimeFigureOut">
               <a:rPr lang="en-US" smtClean="0"/>
-              <a:t>1/21/2021</a:t>
+              <a:t>1/22/2021</a:t>
             </a:fld>
             <a:endParaRPr lang="en-US"/>
           </a:p>
@@ -664,7 +674,7 @@
           <a:p>
             <a:fld id="{7827AB9E-CF3C-4C7C-8B51-C799DF2DBD52}" type="datetimeFigureOut">
               <a:rPr lang="en-US" smtClean="0"/>
-              <a:t>1/21/2021</a:t>
+              <a:t>1/22/2021</a:t>
             </a:fld>
             <a:endParaRPr lang="en-US"/>
           </a:p>
@@ -862,7 +872,7 @@
           <a:p>
             <a:fld id="{7827AB9E-CF3C-4C7C-8B51-C799DF2DBD52}" type="datetimeFigureOut">
               <a:rPr lang="en-US" smtClean="0"/>
-              <a:t>1/21/2021</a:t>
+              <a:t>1/22/2021</a:t>
             </a:fld>
             <a:endParaRPr lang="en-US"/>
           </a:p>
@@ -1137,7 +1147,7 @@
           <a:p>
             <a:fld id="{7827AB9E-CF3C-4C7C-8B51-C799DF2DBD52}" type="datetimeFigureOut">
               <a:rPr lang="en-US" smtClean="0"/>
-              <a:t>1/21/2021</a:t>
+              <a:t>1/22/2021</a:t>
             </a:fld>
             <a:endParaRPr lang="en-US"/>
           </a:p>
@@ -1402,7 +1412,7 @@
           <a:p>
             <a:fld id="{7827AB9E-CF3C-4C7C-8B51-C799DF2DBD52}" type="datetimeFigureOut">
               <a:rPr lang="en-US" smtClean="0"/>
-              <a:t>1/21/2021</a:t>
+              <a:t>1/22/2021</a:t>
             </a:fld>
             <a:endParaRPr lang="en-US"/>
           </a:p>
@@ -1814,7 +1824,7 @@
           <a:p>
             <a:fld id="{7827AB9E-CF3C-4C7C-8B51-C799DF2DBD52}" type="datetimeFigureOut">
               <a:rPr lang="en-US" smtClean="0"/>
-              <a:t>1/21/2021</a:t>
+              <a:t>1/22/2021</a:t>
             </a:fld>
             <a:endParaRPr lang="en-US"/>
           </a:p>
@@ -1955,7 +1965,7 @@
           <a:p>
             <a:fld id="{7827AB9E-CF3C-4C7C-8B51-C799DF2DBD52}" type="datetimeFigureOut">
               <a:rPr lang="en-US" smtClean="0"/>
-              <a:t>1/21/2021</a:t>
+              <a:t>1/22/2021</a:t>
             </a:fld>
             <a:endParaRPr lang="en-US"/>
           </a:p>
@@ -2068,7 +2078,7 @@
           <a:p>
             <a:fld id="{7827AB9E-CF3C-4C7C-8B51-C799DF2DBD52}" type="datetimeFigureOut">
               <a:rPr lang="en-US" smtClean="0"/>
-              <a:t>1/21/2021</a:t>
+              <a:t>1/22/2021</a:t>
             </a:fld>
             <a:endParaRPr lang="en-US"/>
           </a:p>
@@ -2379,7 +2389,7 @@
           <a:p>
             <a:fld id="{7827AB9E-CF3C-4C7C-8B51-C799DF2DBD52}" type="datetimeFigureOut">
               <a:rPr lang="en-US" smtClean="0"/>
-              <a:t>1/21/2021</a:t>
+              <a:t>1/22/2021</a:t>
             </a:fld>
             <a:endParaRPr lang="en-US"/>
           </a:p>
@@ -2667,7 +2677,7 @@
           <a:p>
             <a:fld id="{7827AB9E-CF3C-4C7C-8B51-C799DF2DBD52}" type="datetimeFigureOut">
               <a:rPr lang="en-US" smtClean="0"/>
-              <a:t>1/21/2021</a:t>
+              <a:t>1/22/2021</a:t>
             </a:fld>
             <a:endParaRPr lang="en-US"/>
           </a:p>
@@ -2908,7 +2918,7 @@
           <a:p>
             <a:fld id="{7827AB9E-CF3C-4C7C-8B51-C799DF2DBD52}" type="datetimeFigureOut">
               <a:rPr lang="en-US" smtClean="0"/>
-              <a:t>1/21/2021</a:t>
+              <a:t>1/22/2021</a:t>
             </a:fld>
             <a:endParaRPr lang="en-US"/>
           </a:p>
@@ -3613,10 +3623,656 @@
           </a:prstGeom>
         </p:spPr>
       </p:pic>
+      <p:pic>
+        <p:nvPicPr>
+          <p:cNvPr id="5" name="Picture 4">
+            <a:extLst>
+              <a:ext uri="{FF2B5EF4-FFF2-40B4-BE49-F238E27FC236}">
+                <a16:creationId xmlns:a16="http://schemas.microsoft.com/office/drawing/2014/main" id="{3E321DFF-65F1-4597-BF23-ECF0D2400F7B}"/>
+              </a:ext>
+            </a:extLst>
+          </p:cNvPr>
+          <p:cNvPicPr>
+            <a:picLocks noChangeAspect="1"/>
+          </p:cNvPicPr>
+          <p:nvPr/>
+        </p:nvPicPr>
+        <p:blipFill>
+          <a:blip r:embed="rId5">
+            <a:extLst>
+              <a:ext uri="{28A0092B-C50C-407E-A947-70E740481C1C}">
+                <a14:useLocalDpi xmlns:a14="http://schemas.microsoft.com/office/drawing/2010/main" val="0"/>
+              </a:ext>
+            </a:extLst>
+          </a:blip>
+          <a:stretch>
+            <a:fillRect/>
+          </a:stretch>
+        </p:blipFill>
+        <p:spPr>
+          <a:xfrm>
+            <a:off x="1628191" y="6119040"/>
+            <a:ext cx="476190" cy="476190"/>
+          </a:xfrm>
+          <a:prstGeom prst="rect">
+            <a:avLst/>
+          </a:prstGeom>
+        </p:spPr>
+      </p:pic>
     </p:spTree>
     <p:extLst>
       <p:ext uri="{BB962C8B-B14F-4D97-AF65-F5344CB8AC3E}">
         <p14:creationId xmlns:p14="http://schemas.microsoft.com/office/powerpoint/2010/main" val="789146175"/>
+      </p:ext>
+    </p:extLst>
+  </p:cSld>
+  <p:clrMapOvr>
+    <a:masterClrMapping/>
+  </p:clrMapOvr>
+</p:sld>
+</file>
+
+<file path=ppt/slides/slide10.xml><?xml version="1.0" encoding="utf-8"?>
+<p:sld xmlns:a="http://schemas.openxmlformats.org/drawingml/2006/main" xmlns:r="http://schemas.openxmlformats.org/officeDocument/2006/relationships" xmlns:p="http://schemas.openxmlformats.org/presentationml/2006/main">
+  <p:cSld>
+    <p:spTree>
+      <p:nvGrpSpPr>
+        <p:cNvPr id="1" name=""/>
+        <p:cNvGrpSpPr/>
+        <p:nvPr/>
+      </p:nvGrpSpPr>
+      <p:grpSpPr>
+        <a:xfrm>
+          <a:off x="0" y="0"/>
+          <a:ext cx="0" cy="0"/>
+          <a:chOff x="0" y="0"/>
+          <a:chExt cx="0" cy="0"/>
+        </a:xfrm>
+      </p:grpSpPr>
+      <p:pic>
+        <p:nvPicPr>
+          <p:cNvPr id="29" name="Picture 28">
+            <a:extLst>
+              <a:ext uri="{FF2B5EF4-FFF2-40B4-BE49-F238E27FC236}">
+                <a16:creationId xmlns:a16="http://schemas.microsoft.com/office/drawing/2014/main" id="{59772A1E-E566-408B-94A7-06A075AE2A37}"/>
+              </a:ext>
+            </a:extLst>
+          </p:cNvPr>
+          <p:cNvPicPr>
+            <a:picLocks noChangeAspect="1"/>
+          </p:cNvPicPr>
+          <p:nvPr/>
+        </p:nvPicPr>
+        <p:blipFill>
+          <a:blip r:embed="rId2">
+            <a:extLst>
+              <a:ext uri="{28A0092B-C50C-407E-A947-70E740481C1C}">
+                <a14:useLocalDpi xmlns:a14="http://schemas.microsoft.com/office/drawing/2010/main" val="0"/>
+              </a:ext>
+            </a:extLst>
+          </a:blip>
+          <a:stretch>
+            <a:fillRect/>
+          </a:stretch>
+        </p:blipFill>
+        <p:spPr>
+          <a:xfrm>
+            <a:off x="4002729" y="3416299"/>
+            <a:ext cx="4277416" cy="2566450"/>
+          </a:xfrm>
+          <a:prstGeom prst="rect">
+            <a:avLst/>
+          </a:prstGeom>
+        </p:spPr>
+      </p:pic>
+      <p:pic>
+        <p:nvPicPr>
+          <p:cNvPr id="5" name="Picture 4">
+            <a:extLst>
+              <a:ext uri="{FF2B5EF4-FFF2-40B4-BE49-F238E27FC236}">
+                <a16:creationId xmlns:a16="http://schemas.microsoft.com/office/drawing/2014/main" id="{4E1D6A53-CCB1-448E-B73A-C24A6B7FA7F5}"/>
+              </a:ext>
+            </a:extLst>
+          </p:cNvPr>
+          <p:cNvPicPr>
+            <a:picLocks noChangeAspect="1"/>
+          </p:cNvPicPr>
+          <p:nvPr/>
+        </p:nvPicPr>
+        <p:blipFill>
+          <a:blip r:embed="rId3">
+            <a:extLst>
+              <a:ext uri="{28A0092B-C50C-407E-A947-70E740481C1C}">
+                <a14:useLocalDpi xmlns:a14="http://schemas.microsoft.com/office/drawing/2010/main" val="0"/>
+              </a:ext>
+            </a:extLst>
+          </a:blip>
+          <a:stretch>
+            <a:fillRect/>
+          </a:stretch>
+        </p:blipFill>
+        <p:spPr>
+          <a:xfrm rot="16200000">
+            <a:off x="-2711636" y="3002718"/>
+            <a:ext cx="6591625" cy="1026863"/>
+          </a:xfrm>
+          <a:prstGeom prst="rect">
+            <a:avLst/>
+          </a:prstGeom>
+        </p:spPr>
+      </p:pic>
+      <p:sp>
+        <p:nvSpPr>
+          <p:cNvPr id="2" name="Title 1">
+            <a:extLst>
+              <a:ext uri="{FF2B5EF4-FFF2-40B4-BE49-F238E27FC236}">
+                <a16:creationId xmlns:a16="http://schemas.microsoft.com/office/drawing/2014/main" id="{B78BD6CC-06EC-41F0-A49E-9914B3569BBB}"/>
+              </a:ext>
+            </a:extLst>
+          </p:cNvPr>
+          <p:cNvSpPr>
+            <a:spLocks noGrp="1"/>
+          </p:cNvSpPr>
+          <p:nvPr>
+            <p:ph type="title"/>
+          </p:nvPr>
+        </p:nvSpPr>
+        <p:spPr>
+          <a:xfrm>
+            <a:off x="883637" y="2568829"/>
+            <a:ext cx="10515600" cy="1325563"/>
+          </a:xfrm>
+        </p:spPr>
+        <p:txBody>
+          <a:bodyPr>
+            <a:normAutofit/>
+          </a:bodyPr>
+          <a:lstStyle/>
+          <a:p>
+            <a:pPr algn="ctr"/>
+            <a:r>
+              <a:rPr lang="en-US" sz="4800" b="1" dirty="0">
+                <a:solidFill>
+                  <a:srgbClr val="777777"/>
+                </a:solidFill>
+              </a:rPr>
+              <a:t>Questions</a:t>
+            </a:r>
+          </a:p>
+        </p:txBody>
+      </p:sp>
+      <p:pic>
+        <p:nvPicPr>
+          <p:cNvPr id="7" name="Picture 6">
+            <a:extLst>
+              <a:ext uri="{FF2B5EF4-FFF2-40B4-BE49-F238E27FC236}">
+                <a16:creationId xmlns:a16="http://schemas.microsoft.com/office/drawing/2014/main" id="{31756008-26B5-498C-B4BB-EDA072BEC72A}"/>
+              </a:ext>
+            </a:extLst>
+          </p:cNvPr>
+          <p:cNvPicPr>
+            <a:picLocks noChangeAspect="1"/>
+          </p:cNvPicPr>
+          <p:nvPr/>
+        </p:nvPicPr>
+        <p:blipFill>
+          <a:blip r:embed="rId3">
+            <a:extLst>
+              <a:ext uri="{28A0092B-C50C-407E-A947-70E740481C1C}">
+                <a14:useLocalDpi xmlns:a14="http://schemas.microsoft.com/office/drawing/2010/main" val="0"/>
+              </a:ext>
+            </a:extLst>
+          </a:blip>
+          <a:stretch>
+            <a:fillRect/>
+          </a:stretch>
+        </p:blipFill>
+        <p:spPr>
+          <a:xfrm>
+            <a:off x="650232" y="262770"/>
+            <a:ext cx="4137525" cy="476190"/>
+          </a:xfrm>
+          <a:prstGeom prst="rect">
+            <a:avLst/>
+          </a:prstGeom>
+        </p:spPr>
+      </p:pic>
+      <p:pic>
+        <p:nvPicPr>
+          <p:cNvPr id="9" name="Picture 8">
+            <a:extLst>
+              <a:ext uri="{FF2B5EF4-FFF2-40B4-BE49-F238E27FC236}">
+                <a16:creationId xmlns:a16="http://schemas.microsoft.com/office/drawing/2014/main" id="{53554AA0-9657-46C8-BC8A-EF6404AD3D89}"/>
+              </a:ext>
+            </a:extLst>
+          </p:cNvPr>
+          <p:cNvPicPr>
+            <a:picLocks noChangeAspect="1"/>
+          </p:cNvPicPr>
+          <p:nvPr/>
+        </p:nvPicPr>
+        <p:blipFill>
+          <a:blip r:embed="rId4">
+            <a:extLst>
+              <a:ext uri="{28A0092B-C50C-407E-A947-70E740481C1C}">
+                <a14:useLocalDpi xmlns:a14="http://schemas.microsoft.com/office/drawing/2010/main" val="0"/>
+              </a:ext>
+            </a:extLst>
+          </a:blip>
+          <a:stretch>
+            <a:fillRect/>
+          </a:stretch>
+        </p:blipFill>
+        <p:spPr>
+          <a:xfrm>
+            <a:off x="838200" y="6119040"/>
+            <a:ext cx="476190" cy="476190"/>
+          </a:xfrm>
+          <a:prstGeom prst="rect">
+            <a:avLst/>
+          </a:prstGeom>
+        </p:spPr>
+      </p:pic>
+      <p:pic>
+        <p:nvPicPr>
+          <p:cNvPr id="11" name="Picture 10">
+            <a:extLst>
+              <a:ext uri="{FF2B5EF4-FFF2-40B4-BE49-F238E27FC236}">
+                <a16:creationId xmlns:a16="http://schemas.microsoft.com/office/drawing/2014/main" id="{6A914B30-4EB6-4805-9773-1EC500ADCB6C}"/>
+              </a:ext>
+            </a:extLst>
+          </p:cNvPr>
+          <p:cNvPicPr>
+            <a:picLocks noChangeAspect="1"/>
+          </p:cNvPicPr>
+          <p:nvPr/>
+        </p:nvPicPr>
+        <p:blipFill>
+          <a:blip r:embed="rId4">
+            <a:extLst>
+              <a:ext uri="{28A0092B-C50C-407E-A947-70E740481C1C}">
+                <a14:useLocalDpi xmlns:a14="http://schemas.microsoft.com/office/drawing/2010/main" val="0"/>
+              </a:ext>
+            </a:extLst>
+          </a:blip>
+          <a:stretch>
+            <a:fillRect/>
+          </a:stretch>
+        </p:blipFill>
+        <p:spPr>
+          <a:xfrm>
+            <a:off x="1388875" y="6119040"/>
+            <a:ext cx="476190" cy="476190"/>
+          </a:xfrm>
+          <a:prstGeom prst="rect">
+            <a:avLst/>
+          </a:prstGeom>
+        </p:spPr>
+      </p:pic>
+      <p:pic>
+        <p:nvPicPr>
+          <p:cNvPr id="12" name="Picture 11">
+            <a:extLst>
+              <a:ext uri="{FF2B5EF4-FFF2-40B4-BE49-F238E27FC236}">
+                <a16:creationId xmlns:a16="http://schemas.microsoft.com/office/drawing/2014/main" id="{AD78F74E-3885-4DCF-9468-F8A2333ED915}"/>
+              </a:ext>
+            </a:extLst>
+          </p:cNvPr>
+          <p:cNvPicPr>
+            <a:picLocks noChangeAspect="1"/>
+          </p:cNvPicPr>
+          <p:nvPr/>
+        </p:nvPicPr>
+        <p:blipFill>
+          <a:blip r:embed="rId4">
+            <a:extLst>
+              <a:ext uri="{28A0092B-C50C-407E-A947-70E740481C1C}">
+                <a14:useLocalDpi xmlns:a14="http://schemas.microsoft.com/office/drawing/2010/main" val="0"/>
+              </a:ext>
+            </a:extLst>
+          </a:blip>
+          <a:stretch>
+            <a:fillRect/>
+          </a:stretch>
+        </p:blipFill>
+        <p:spPr>
+          <a:xfrm>
+            <a:off x="1939550" y="6130590"/>
+            <a:ext cx="476190" cy="476190"/>
+          </a:xfrm>
+          <a:prstGeom prst="rect">
+            <a:avLst/>
+          </a:prstGeom>
+        </p:spPr>
+      </p:pic>
+      <p:pic>
+        <p:nvPicPr>
+          <p:cNvPr id="10" name="Picture 9">
+            <a:extLst>
+              <a:ext uri="{FF2B5EF4-FFF2-40B4-BE49-F238E27FC236}">
+                <a16:creationId xmlns:a16="http://schemas.microsoft.com/office/drawing/2014/main" id="{8F280CB9-BE83-492C-A8EA-AFC285C29450}"/>
+              </a:ext>
+            </a:extLst>
+          </p:cNvPr>
+          <p:cNvPicPr>
+            <a:picLocks noChangeAspect="1"/>
+          </p:cNvPicPr>
+          <p:nvPr/>
+        </p:nvPicPr>
+        <p:blipFill>
+          <a:blip r:embed="rId5">
+            <a:extLst>
+              <a:ext uri="{28A0092B-C50C-407E-A947-70E740481C1C}">
+                <a14:useLocalDpi xmlns:a14="http://schemas.microsoft.com/office/drawing/2010/main" val="0"/>
+              </a:ext>
+            </a:extLst>
+          </a:blip>
+          <a:stretch>
+            <a:fillRect/>
+          </a:stretch>
+        </p:blipFill>
+        <p:spPr>
+          <a:xfrm>
+            <a:off x="3724182" y="761053"/>
+            <a:ext cx="1262116" cy="1684990"/>
+          </a:xfrm>
+          <a:prstGeom prst="rect">
+            <a:avLst/>
+          </a:prstGeom>
+        </p:spPr>
+      </p:pic>
+      <p:pic>
+        <p:nvPicPr>
+          <p:cNvPr id="17" name="Picture 16">
+            <a:extLst>
+              <a:ext uri="{FF2B5EF4-FFF2-40B4-BE49-F238E27FC236}">
+                <a16:creationId xmlns:a16="http://schemas.microsoft.com/office/drawing/2014/main" id="{9D0CED4E-704C-4F3C-81AB-B833A19FE62B}"/>
+              </a:ext>
+            </a:extLst>
+          </p:cNvPr>
+          <p:cNvPicPr>
+            <a:picLocks noChangeAspect="1"/>
+          </p:cNvPicPr>
+          <p:nvPr/>
+        </p:nvPicPr>
+        <p:blipFill>
+          <a:blip r:embed="rId6">
+            <a:extLst>
+              <a:ext uri="{28A0092B-C50C-407E-A947-70E740481C1C}">
+                <a14:useLocalDpi xmlns:a14="http://schemas.microsoft.com/office/drawing/2010/main" val="0"/>
+              </a:ext>
+            </a:extLst>
+          </a:blip>
+          <a:stretch>
+            <a:fillRect/>
+          </a:stretch>
+        </p:blipFill>
+        <p:spPr>
+          <a:xfrm>
+            <a:off x="1661719" y="1098832"/>
+            <a:ext cx="2114550" cy="2162175"/>
+          </a:xfrm>
+          <a:prstGeom prst="rect">
+            <a:avLst/>
+          </a:prstGeom>
+        </p:spPr>
+      </p:pic>
+      <p:pic>
+        <p:nvPicPr>
+          <p:cNvPr id="25" name="Picture 24">
+            <a:extLst>
+              <a:ext uri="{FF2B5EF4-FFF2-40B4-BE49-F238E27FC236}">
+                <a16:creationId xmlns:a16="http://schemas.microsoft.com/office/drawing/2014/main" id="{9CAC5799-7FB2-4E0C-9105-60376B31BF7F}"/>
+              </a:ext>
+            </a:extLst>
+          </p:cNvPr>
+          <p:cNvPicPr>
+            <a:picLocks noChangeAspect="1"/>
+          </p:cNvPicPr>
+          <p:nvPr/>
+        </p:nvPicPr>
+        <p:blipFill>
+          <a:blip r:embed="rId7">
+            <a:extLst>
+              <a:ext uri="{28A0092B-C50C-407E-A947-70E740481C1C}">
+                <a14:useLocalDpi xmlns:a14="http://schemas.microsoft.com/office/drawing/2010/main" val="0"/>
+              </a:ext>
+            </a:extLst>
+          </a:blip>
+          <a:stretch>
+            <a:fillRect/>
+          </a:stretch>
+        </p:blipFill>
+        <p:spPr>
+          <a:xfrm>
+            <a:off x="6641270" y="829057"/>
+            <a:ext cx="2857500" cy="1600200"/>
+          </a:xfrm>
+          <a:prstGeom prst="rect">
+            <a:avLst/>
+          </a:prstGeom>
+        </p:spPr>
+      </p:pic>
+      <p:pic>
+        <p:nvPicPr>
+          <p:cNvPr id="27" name="Picture 26">
+            <a:extLst>
+              <a:ext uri="{FF2B5EF4-FFF2-40B4-BE49-F238E27FC236}">
+                <a16:creationId xmlns:a16="http://schemas.microsoft.com/office/drawing/2014/main" id="{AA765A7E-6133-4128-B4D1-1B733C77AD90}"/>
+              </a:ext>
+            </a:extLst>
+          </p:cNvPr>
+          <p:cNvPicPr>
+            <a:picLocks noChangeAspect="1"/>
+          </p:cNvPicPr>
+          <p:nvPr/>
+        </p:nvPicPr>
+        <p:blipFill>
+          <a:blip r:embed="rId8">
+            <a:extLst>
+              <a:ext uri="{28A0092B-C50C-407E-A947-70E740481C1C}">
+                <a14:useLocalDpi xmlns:a14="http://schemas.microsoft.com/office/drawing/2010/main" val="0"/>
+              </a:ext>
+            </a:extLst>
+          </a:blip>
+          <a:stretch>
+            <a:fillRect/>
+          </a:stretch>
+        </p:blipFill>
+        <p:spPr>
+          <a:xfrm>
+            <a:off x="9181185" y="597497"/>
+            <a:ext cx="2152650" cy="2124075"/>
+          </a:xfrm>
+          <a:prstGeom prst="rect">
+            <a:avLst/>
+          </a:prstGeom>
+        </p:spPr>
+      </p:pic>
+      <p:pic>
+        <p:nvPicPr>
+          <p:cNvPr id="23" name="Picture 22">
+            <a:extLst>
+              <a:ext uri="{FF2B5EF4-FFF2-40B4-BE49-F238E27FC236}">
+                <a16:creationId xmlns:a16="http://schemas.microsoft.com/office/drawing/2014/main" id="{C20BA4F3-BF16-43C6-9030-12E84373123F}"/>
+              </a:ext>
+            </a:extLst>
+          </p:cNvPr>
+          <p:cNvPicPr>
+            <a:picLocks noChangeAspect="1"/>
+          </p:cNvPicPr>
+          <p:nvPr/>
+        </p:nvPicPr>
+        <p:blipFill>
+          <a:blip r:embed="rId9">
+            <a:extLst>
+              <a:ext uri="{28A0092B-C50C-407E-A947-70E740481C1C}">
+                <a14:useLocalDpi xmlns:a14="http://schemas.microsoft.com/office/drawing/2010/main" val="0"/>
+              </a:ext>
+            </a:extLst>
+          </a:blip>
+          <a:stretch>
+            <a:fillRect/>
+          </a:stretch>
+        </p:blipFill>
+        <p:spPr>
+          <a:xfrm>
+            <a:off x="4954407" y="214769"/>
+            <a:ext cx="1828800" cy="2495550"/>
+          </a:xfrm>
+          <a:prstGeom prst="rect">
+            <a:avLst/>
+          </a:prstGeom>
+        </p:spPr>
+      </p:pic>
+      <p:pic>
+        <p:nvPicPr>
+          <p:cNvPr id="19" name="Picture 18">
+            <a:extLst>
+              <a:ext uri="{FF2B5EF4-FFF2-40B4-BE49-F238E27FC236}">
+                <a16:creationId xmlns:a16="http://schemas.microsoft.com/office/drawing/2014/main" id="{729B3C39-2481-4818-AFA2-9F05D6691E27}"/>
+              </a:ext>
+            </a:extLst>
+          </p:cNvPr>
+          <p:cNvPicPr>
+            <a:picLocks noChangeAspect="1"/>
+          </p:cNvPicPr>
+          <p:nvPr/>
+        </p:nvPicPr>
+        <p:blipFill>
+          <a:blip r:embed="rId10">
+            <a:extLst>
+              <a:ext uri="{28A0092B-C50C-407E-A947-70E740481C1C}">
+                <a14:useLocalDpi xmlns:a14="http://schemas.microsoft.com/office/drawing/2010/main" val="0"/>
+              </a:ext>
+            </a:extLst>
+          </a:blip>
+          <a:stretch>
+            <a:fillRect/>
+          </a:stretch>
+        </p:blipFill>
+        <p:spPr>
+          <a:xfrm>
+            <a:off x="883637" y="2865692"/>
+            <a:ext cx="2219325" cy="2057400"/>
+          </a:xfrm>
+          <a:prstGeom prst="rect">
+            <a:avLst/>
+          </a:prstGeom>
+        </p:spPr>
+      </p:pic>
+      <p:pic>
+        <p:nvPicPr>
+          <p:cNvPr id="4" name="Picture 3">
+            <a:extLst>
+              <a:ext uri="{FF2B5EF4-FFF2-40B4-BE49-F238E27FC236}">
+                <a16:creationId xmlns:a16="http://schemas.microsoft.com/office/drawing/2014/main" id="{98D0CD13-CD46-49F0-B9C9-6EBDC734B600}"/>
+              </a:ext>
+            </a:extLst>
+          </p:cNvPr>
+          <p:cNvPicPr>
+            <a:picLocks noChangeAspect="1"/>
+          </p:cNvPicPr>
+          <p:nvPr/>
+        </p:nvPicPr>
+        <p:blipFill>
+          <a:blip r:embed="rId11">
+            <a:extLst>
+              <a:ext uri="{28A0092B-C50C-407E-A947-70E740481C1C}">
+                <a14:useLocalDpi xmlns:a14="http://schemas.microsoft.com/office/drawing/2010/main" val="0"/>
+              </a:ext>
+            </a:extLst>
+          </a:blip>
+          <a:stretch>
+            <a:fillRect/>
+          </a:stretch>
+        </p:blipFill>
+        <p:spPr>
+          <a:xfrm>
+            <a:off x="2561225" y="2372951"/>
+            <a:ext cx="1717318" cy="1717318"/>
+          </a:xfrm>
+          <a:prstGeom prst="rect">
+            <a:avLst/>
+          </a:prstGeom>
+        </p:spPr>
+      </p:pic>
+      <p:pic>
+        <p:nvPicPr>
+          <p:cNvPr id="14" name="Picture 13">
+            <a:extLst>
+              <a:ext uri="{FF2B5EF4-FFF2-40B4-BE49-F238E27FC236}">
+                <a16:creationId xmlns:a16="http://schemas.microsoft.com/office/drawing/2014/main" id="{F80B4489-8E4C-4050-929D-5264D2059D1F}"/>
+              </a:ext>
+            </a:extLst>
+          </p:cNvPr>
+          <p:cNvPicPr>
+            <a:picLocks noChangeAspect="1"/>
+          </p:cNvPicPr>
+          <p:nvPr/>
+        </p:nvPicPr>
+        <p:blipFill>
+          <a:blip r:embed="rId12">
+            <a:extLst>
+              <a:ext uri="{28A0092B-C50C-407E-A947-70E740481C1C}">
+                <a14:useLocalDpi xmlns:a14="http://schemas.microsoft.com/office/drawing/2010/main" val="0"/>
+              </a:ext>
+            </a:extLst>
+          </a:blip>
+          <a:stretch>
+            <a:fillRect/>
+          </a:stretch>
+        </p:blipFill>
+        <p:spPr>
+          <a:xfrm>
+            <a:off x="9645364" y="3103957"/>
+            <a:ext cx="2247900" cy="1971675"/>
+          </a:xfrm>
+          <a:prstGeom prst="rect">
+            <a:avLst/>
+          </a:prstGeom>
+        </p:spPr>
+      </p:pic>
+      <p:pic>
+        <p:nvPicPr>
+          <p:cNvPr id="21" name="Picture 20">
+            <a:extLst>
+              <a:ext uri="{FF2B5EF4-FFF2-40B4-BE49-F238E27FC236}">
+                <a16:creationId xmlns:a16="http://schemas.microsoft.com/office/drawing/2014/main" id="{420C2504-F99E-44CE-A0B1-9DFB5E912FCF}"/>
+              </a:ext>
+            </a:extLst>
+          </p:cNvPr>
+          <p:cNvPicPr>
+            <a:picLocks noChangeAspect="1"/>
+          </p:cNvPicPr>
+          <p:nvPr/>
+        </p:nvPicPr>
+        <p:blipFill>
+          <a:blip r:embed="rId13">
+            <a:extLst>
+              <a:ext uri="{28A0092B-C50C-407E-A947-70E740481C1C}">
+                <a14:useLocalDpi xmlns:a14="http://schemas.microsoft.com/office/drawing/2010/main" val="0"/>
+              </a:ext>
+            </a:extLst>
+          </a:blip>
+          <a:stretch>
+            <a:fillRect/>
+          </a:stretch>
+        </p:blipFill>
+        <p:spPr>
+          <a:xfrm>
+            <a:off x="7820383" y="2446043"/>
+            <a:ext cx="2590800" cy="1762125"/>
+          </a:xfrm>
+          <a:prstGeom prst="rect">
+            <a:avLst/>
+          </a:prstGeom>
+        </p:spPr>
+      </p:pic>
+    </p:spTree>
+    <p:extLst>
+      <p:ext uri="{BB962C8B-B14F-4D97-AF65-F5344CB8AC3E}">
+        <p14:creationId xmlns:p14="http://schemas.microsoft.com/office/powerpoint/2010/main" val="872645906"/>
       </p:ext>
     </p:extLst>
   </p:cSld>
@@ -3928,6 +4584,114 @@
           <a:xfrm>
             <a:off x="5750664" y="1386694"/>
             <a:ext cx="5603136" cy="3782116"/>
+          </a:xfrm>
+          <a:prstGeom prst="rect">
+            <a:avLst/>
+          </a:prstGeom>
+        </p:spPr>
+      </p:pic>
+      <p:pic>
+        <p:nvPicPr>
+          <p:cNvPr id="6" name="Picture 5">
+            <a:extLst>
+              <a:ext uri="{FF2B5EF4-FFF2-40B4-BE49-F238E27FC236}">
+                <a16:creationId xmlns:a16="http://schemas.microsoft.com/office/drawing/2014/main" id="{AE4E9D00-C229-4EEC-B1AA-7201CFC44EA6}"/>
+              </a:ext>
+            </a:extLst>
+          </p:cNvPr>
+          <p:cNvPicPr>
+            <a:picLocks noChangeAspect="1"/>
+          </p:cNvPicPr>
+          <p:nvPr/>
+        </p:nvPicPr>
+        <p:blipFill>
+          <a:blip r:embed="rId5">
+            <a:extLst>
+              <a:ext uri="{28A0092B-C50C-407E-A947-70E740481C1C}">
+                <a14:useLocalDpi xmlns:a14="http://schemas.microsoft.com/office/drawing/2010/main" val="0"/>
+              </a:ext>
+            </a:extLst>
+          </a:blip>
+          <a:stretch>
+            <a:fillRect/>
+          </a:stretch>
+        </p:blipFill>
+        <p:spPr>
+          <a:xfrm>
+            <a:off x="838200" y="6119040"/>
+            <a:ext cx="476190" cy="476190"/>
+          </a:xfrm>
+          <a:prstGeom prst="rect">
+            <a:avLst/>
+          </a:prstGeom>
+        </p:spPr>
+      </p:pic>
+      <p:pic>
+        <p:nvPicPr>
+          <p:cNvPr id="11" name="Picture 10">
+            <a:extLst>
+              <a:ext uri="{FF2B5EF4-FFF2-40B4-BE49-F238E27FC236}">
+                <a16:creationId xmlns:a16="http://schemas.microsoft.com/office/drawing/2014/main" id="{327B040F-AD7D-4A95-9918-DF743F31B946}"/>
+              </a:ext>
+            </a:extLst>
+          </p:cNvPr>
+          <p:cNvPicPr>
+            <a:picLocks noChangeAspect="1"/>
+          </p:cNvPicPr>
+          <p:nvPr/>
+        </p:nvPicPr>
+        <p:blipFill>
+          <a:blip r:embed="rId5">
+            <a:extLst>
+              <a:ext uri="{28A0092B-C50C-407E-A947-70E740481C1C}">
+                <a14:useLocalDpi xmlns:a14="http://schemas.microsoft.com/office/drawing/2010/main" val="0"/>
+              </a:ext>
+            </a:extLst>
+          </a:blip>
+          <a:stretch>
+            <a:fillRect/>
+          </a:stretch>
+        </p:blipFill>
+        <p:spPr>
+          <a:xfrm>
+            <a:off x="1388875" y="6119040"/>
+            <a:ext cx="476190" cy="476190"/>
+          </a:xfrm>
+          <a:prstGeom prst="rect">
+            <a:avLst/>
+          </a:prstGeom>
+        </p:spPr>
+      </p:pic>
+      <p:pic>
+        <p:nvPicPr>
+          <p:cNvPr id="12" name="Picture 11">
+            <a:extLst>
+              <a:ext uri="{FF2B5EF4-FFF2-40B4-BE49-F238E27FC236}">
+                <a16:creationId xmlns:a16="http://schemas.microsoft.com/office/drawing/2014/main" id="{FBBFC471-1634-42BC-8DBB-981B35078DC5}"/>
+              </a:ext>
+            </a:extLst>
+          </p:cNvPr>
+          <p:cNvPicPr>
+            <a:picLocks noChangeAspect="1"/>
+          </p:cNvPicPr>
+          <p:nvPr/>
+        </p:nvPicPr>
+        <p:blipFill>
+          <a:blip r:embed="rId5">
+            <a:extLst>
+              <a:ext uri="{28A0092B-C50C-407E-A947-70E740481C1C}">
+                <a14:useLocalDpi xmlns:a14="http://schemas.microsoft.com/office/drawing/2010/main" val="0"/>
+              </a:ext>
+            </a:extLst>
+          </a:blip>
+          <a:stretch>
+            <a:fillRect/>
+          </a:stretch>
+        </p:blipFill>
+        <p:spPr>
+          <a:xfrm>
+            <a:off x="1939550" y="6130590"/>
+            <a:ext cx="476190" cy="476190"/>
           </a:xfrm>
           <a:prstGeom prst="rect">
             <a:avLst/>
@@ -4150,8 +4914,8 @@
         </p:blipFill>
         <p:spPr>
           <a:xfrm>
-            <a:off x="9037115" y="5803809"/>
-            <a:ext cx="3154334" cy="1051444"/>
+            <a:off x="9319328" y="5897880"/>
+            <a:ext cx="2589908" cy="863302"/>
           </a:xfrm>
           <a:prstGeom prst="rect">
             <a:avLst/>
@@ -4186,14 +4950,241 @@
         </p:blipFill>
         <p:spPr>
           <a:xfrm>
-            <a:off x="3316078" y="2981330"/>
-            <a:ext cx="5559844" cy="3613900"/>
+            <a:off x="3866753" y="3054916"/>
+            <a:ext cx="4458494" cy="2898022"/>
           </a:xfrm>
           <a:prstGeom prst="rect">
             <a:avLst/>
           </a:prstGeom>
         </p:spPr>
       </p:pic>
+      <p:pic>
+        <p:nvPicPr>
+          <p:cNvPr id="9" name="Picture 8">
+            <a:extLst>
+              <a:ext uri="{FF2B5EF4-FFF2-40B4-BE49-F238E27FC236}">
+                <a16:creationId xmlns:a16="http://schemas.microsoft.com/office/drawing/2014/main" id="{38A43EFE-BF8C-4EC9-B527-5CC6CB918EED}"/>
+              </a:ext>
+            </a:extLst>
+          </p:cNvPr>
+          <p:cNvPicPr>
+            <a:picLocks noChangeAspect="1"/>
+          </p:cNvPicPr>
+          <p:nvPr/>
+        </p:nvPicPr>
+        <p:blipFill>
+          <a:blip r:embed="rId5">
+            <a:extLst>
+              <a:ext uri="{28A0092B-C50C-407E-A947-70E740481C1C}">
+                <a14:useLocalDpi xmlns:a14="http://schemas.microsoft.com/office/drawing/2010/main" val="0"/>
+              </a:ext>
+            </a:extLst>
+          </a:blip>
+          <a:stretch>
+            <a:fillRect/>
+          </a:stretch>
+        </p:blipFill>
+        <p:spPr>
+          <a:xfrm>
+            <a:off x="838200" y="6119040"/>
+            <a:ext cx="476190" cy="476190"/>
+          </a:xfrm>
+          <a:prstGeom prst="rect">
+            <a:avLst/>
+          </a:prstGeom>
+        </p:spPr>
+      </p:pic>
+      <p:pic>
+        <p:nvPicPr>
+          <p:cNvPr id="10" name="Picture 9">
+            <a:extLst>
+              <a:ext uri="{FF2B5EF4-FFF2-40B4-BE49-F238E27FC236}">
+                <a16:creationId xmlns:a16="http://schemas.microsoft.com/office/drawing/2014/main" id="{2152DA94-61A6-4DC1-8DF9-C45E4E95443E}"/>
+              </a:ext>
+            </a:extLst>
+          </p:cNvPr>
+          <p:cNvPicPr>
+            <a:picLocks noChangeAspect="1"/>
+          </p:cNvPicPr>
+          <p:nvPr/>
+        </p:nvPicPr>
+        <p:blipFill>
+          <a:blip r:embed="rId5">
+            <a:extLst>
+              <a:ext uri="{28A0092B-C50C-407E-A947-70E740481C1C}">
+                <a14:useLocalDpi xmlns:a14="http://schemas.microsoft.com/office/drawing/2010/main" val="0"/>
+              </a:ext>
+            </a:extLst>
+          </a:blip>
+          <a:stretch>
+            <a:fillRect/>
+          </a:stretch>
+        </p:blipFill>
+        <p:spPr>
+          <a:xfrm>
+            <a:off x="1388875" y="6119040"/>
+            <a:ext cx="476190" cy="476190"/>
+          </a:xfrm>
+          <a:prstGeom prst="rect">
+            <a:avLst/>
+          </a:prstGeom>
+        </p:spPr>
+      </p:pic>
+      <p:pic>
+        <p:nvPicPr>
+          <p:cNvPr id="11" name="Picture 10">
+            <a:extLst>
+              <a:ext uri="{FF2B5EF4-FFF2-40B4-BE49-F238E27FC236}">
+                <a16:creationId xmlns:a16="http://schemas.microsoft.com/office/drawing/2014/main" id="{7E604BC0-367B-4DC0-923B-4D355C76732B}"/>
+              </a:ext>
+            </a:extLst>
+          </p:cNvPr>
+          <p:cNvPicPr>
+            <a:picLocks noChangeAspect="1"/>
+          </p:cNvPicPr>
+          <p:nvPr/>
+        </p:nvPicPr>
+        <p:blipFill>
+          <a:blip r:embed="rId5">
+            <a:extLst>
+              <a:ext uri="{28A0092B-C50C-407E-A947-70E740481C1C}">
+                <a14:useLocalDpi xmlns:a14="http://schemas.microsoft.com/office/drawing/2010/main" val="0"/>
+              </a:ext>
+            </a:extLst>
+          </a:blip>
+          <a:stretch>
+            <a:fillRect/>
+          </a:stretch>
+        </p:blipFill>
+        <p:spPr>
+          <a:xfrm>
+            <a:off x="1939550" y="6130590"/>
+            <a:ext cx="476190" cy="476190"/>
+          </a:xfrm>
+          <a:prstGeom prst="rect">
+            <a:avLst/>
+          </a:prstGeom>
+        </p:spPr>
+      </p:pic>
+      <p:pic>
+        <p:nvPicPr>
+          <p:cNvPr id="20" name="Picture 19">
+            <a:extLst>
+              <a:ext uri="{FF2B5EF4-FFF2-40B4-BE49-F238E27FC236}">
+                <a16:creationId xmlns:a16="http://schemas.microsoft.com/office/drawing/2014/main" id="{C37F3CA1-E3A4-409A-8145-3AF3A2450181}"/>
+              </a:ext>
+            </a:extLst>
+          </p:cNvPr>
+          <p:cNvPicPr>
+            <a:picLocks noChangeAspect="1"/>
+          </p:cNvPicPr>
+          <p:nvPr/>
+        </p:nvPicPr>
+        <p:blipFill>
+          <a:blip r:embed="rId6">
+            <a:extLst>
+              <a:ext uri="{28A0092B-C50C-407E-A947-70E740481C1C}">
+                <a14:useLocalDpi xmlns:a14="http://schemas.microsoft.com/office/drawing/2010/main" val="0"/>
+              </a:ext>
+            </a:extLst>
+          </a:blip>
+          <a:stretch>
+            <a:fillRect/>
+          </a:stretch>
+        </p:blipFill>
+        <p:spPr>
+          <a:xfrm>
+            <a:off x="9233370" y="5531802"/>
+            <a:ext cx="1380912" cy="1280160"/>
+          </a:xfrm>
+          <a:prstGeom prst="rect">
+            <a:avLst/>
+          </a:prstGeom>
+        </p:spPr>
+      </p:pic>
+      <p:sp>
+        <p:nvSpPr>
+          <p:cNvPr id="4" name="TextBox 3">
+            <a:extLst>
+              <a:ext uri="{FF2B5EF4-FFF2-40B4-BE49-F238E27FC236}">
+                <a16:creationId xmlns:a16="http://schemas.microsoft.com/office/drawing/2014/main" id="{B5FF2032-5F50-4EE5-879B-20DCB9324FE4}"/>
+              </a:ext>
+            </a:extLst>
+          </p:cNvPr>
+          <p:cNvSpPr txBox="1"/>
+          <p:nvPr/>
+        </p:nvSpPr>
+        <p:spPr>
+          <a:xfrm>
+            <a:off x="3826523" y="6369764"/>
+            <a:ext cx="5623628" cy="246221"/>
+          </a:xfrm>
+          <a:prstGeom prst="rect">
+            <a:avLst/>
+          </a:prstGeom>
+          <a:noFill/>
+        </p:spPr>
+        <p:txBody>
+          <a:bodyPr wrap="square" rtlCol="0">
+            <a:spAutoFit/>
+          </a:bodyPr>
+          <a:lstStyle/>
+          <a:p>
+            <a:pPr algn="r"/>
+            <a:r>
+              <a:rPr lang="en-US" sz="1000" b="0" i="1" dirty="0">
+                <a:solidFill>
+                  <a:srgbClr val="202124"/>
+                </a:solidFill>
+                <a:effectLst/>
+                <a:latin typeface="arial" panose="020B0604020202020204" pitchFamily="34" charset="0"/>
+              </a:rPr>
+              <a:t>Lifespan in the wild is unknown but </a:t>
+            </a:r>
+            <a:r>
+              <a:rPr lang="en-US" sz="1000" b="1" i="1" dirty="0">
+                <a:solidFill>
+                  <a:srgbClr val="202124"/>
+                </a:solidFill>
+                <a:effectLst/>
+                <a:latin typeface="arial" panose="020B0604020202020204" pitchFamily="34" charset="0"/>
+              </a:rPr>
+              <a:t>aye</a:t>
+            </a:r>
+            <a:r>
+              <a:rPr lang="en-US" sz="1000" b="0" i="1" dirty="0">
+                <a:solidFill>
+                  <a:srgbClr val="202124"/>
+                </a:solidFill>
+                <a:effectLst/>
+                <a:latin typeface="arial" panose="020B0604020202020204" pitchFamily="34" charset="0"/>
+              </a:rPr>
+              <a:t>-</a:t>
+            </a:r>
+            <a:r>
+              <a:rPr lang="en-US" sz="1000" b="1" i="1" dirty="0">
+                <a:solidFill>
+                  <a:srgbClr val="202124"/>
+                </a:solidFill>
+                <a:effectLst/>
+                <a:latin typeface="arial" panose="020B0604020202020204" pitchFamily="34" charset="0"/>
+              </a:rPr>
+              <a:t>ayes</a:t>
+            </a:r>
+            <a:r>
+              <a:rPr lang="en-US" sz="1000" b="0" i="1" dirty="0">
+                <a:solidFill>
+                  <a:srgbClr val="202124"/>
+                </a:solidFill>
+                <a:effectLst/>
+                <a:latin typeface="arial" panose="020B0604020202020204" pitchFamily="34" charset="0"/>
+              </a:rPr>
+              <a:t> have lived 23 years in captivity.</a:t>
+            </a:r>
+            <a:endParaRPr lang="en-US" sz="1000" i="1" dirty="0"/>
+          </a:p>
+        </p:txBody>
+      </p:sp>
     </p:spTree>
     <p:extLst>
       <p:ext uri="{BB962C8B-B14F-4D97-AF65-F5344CB8AC3E}">
@@ -4385,12 +5376,12 @@
         <p:spPr>
           <a:xfrm>
             <a:off x="838200" y="1452471"/>
-            <a:ext cx="10515600" cy="4351338"/>
+            <a:ext cx="4017264" cy="4351338"/>
           </a:xfrm>
         </p:spPr>
         <p:txBody>
           <a:bodyPr>
-            <a:normAutofit/>
+            <a:normAutofit fontScale="92500" lnSpcReduction="10000"/>
           </a:bodyPr>
           <a:lstStyle/>
           <a:p>
@@ -4431,6 +5422,46 @@
                 </a:solidFill>
               </a:rPr>
               <a:t>Python</a:t>
+            </a:r>
+          </a:p>
+          <a:p>
+            <a:r>
+              <a:rPr lang="en-US" sz="3500" dirty="0">
+                <a:solidFill>
+                  <a:srgbClr val="777777"/>
+                </a:solidFill>
+              </a:rPr>
+              <a:t>Pandas</a:t>
+            </a:r>
+          </a:p>
+          <a:p>
+            <a:r>
+              <a:rPr lang="en-US" sz="3500" dirty="0">
+                <a:solidFill>
+                  <a:srgbClr val="777777"/>
+                </a:solidFill>
+              </a:rPr>
+              <a:t>SciPy</a:t>
+            </a:r>
+          </a:p>
+          <a:p>
+            <a:r>
+              <a:rPr lang="en-US" sz="3500" dirty="0">
+                <a:solidFill>
+                  <a:srgbClr val="777777"/>
+                </a:solidFill>
+              </a:rPr>
+              <a:t>Matplotlib</a:t>
+            </a:r>
+          </a:p>
+          <a:p>
+            <a:r>
+              <a:rPr lang="en-US" sz="3500" dirty="0">
+                <a:solidFill>
+                  <a:srgbClr val="777777"/>
+                </a:solidFill>
+              </a:rPr>
+              <a:t>Datetime</a:t>
             </a:r>
           </a:p>
           <a:p>
@@ -4448,6 +5479,13 @@
             </a:endParaRPr>
           </a:p>
           <a:p>
+            <a:endParaRPr lang="en-US" sz="3500" dirty="0">
+              <a:solidFill>
+                <a:srgbClr val="777777"/>
+              </a:solidFill>
+            </a:endParaRPr>
+          </a:p>
+          <a:p>
             <a:endParaRPr lang="en-US" dirty="0">
               <a:solidFill>
                 <a:srgbClr val="777777"/>
@@ -4460,6 +5498,581 @@
                 <a:srgbClr val="777777"/>
               </a:solidFill>
             </a:endParaRPr>
+          </a:p>
+        </p:txBody>
+      </p:sp>
+      <p:pic>
+        <p:nvPicPr>
+          <p:cNvPr id="9" name="Picture 8">
+            <a:extLst>
+              <a:ext uri="{FF2B5EF4-FFF2-40B4-BE49-F238E27FC236}">
+                <a16:creationId xmlns:a16="http://schemas.microsoft.com/office/drawing/2014/main" id="{E650F557-F3E9-4E7C-8843-A754598BD04D}"/>
+              </a:ext>
+            </a:extLst>
+          </p:cNvPr>
+          <p:cNvPicPr>
+            <a:picLocks noChangeAspect="1"/>
+          </p:cNvPicPr>
+          <p:nvPr/>
+        </p:nvPicPr>
+        <p:blipFill>
+          <a:blip r:embed="rId4">
+            <a:extLst>
+              <a:ext uri="{28A0092B-C50C-407E-A947-70E740481C1C}">
+                <a14:useLocalDpi xmlns:a14="http://schemas.microsoft.com/office/drawing/2010/main" val="0"/>
+              </a:ext>
+            </a:extLst>
+          </a:blip>
+          <a:stretch>
+            <a:fillRect/>
+          </a:stretch>
+        </p:blipFill>
+        <p:spPr>
+          <a:xfrm>
+            <a:off x="838200" y="6119040"/>
+            <a:ext cx="476190" cy="476190"/>
+          </a:xfrm>
+          <a:prstGeom prst="rect">
+            <a:avLst/>
+          </a:prstGeom>
+        </p:spPr>
+      </p:pic>
+      <p:pic>
+        <p:nvPicPr>
+          <p:cNvPr id="11" name="Picture 10">
+            <a:extLst>
+              <a:ext uri="{FF2B5EF4-FFF2-40B4-BE49-F238E27FC236}">
+                <a16:creationId xmlns:a16="http://schemas.microsoft.com/office/drawing/2014/main" id="{18F4A641-F538-40AA-95EB-30E4BED78BDC}"/>
+              </a:ext>
+            </a:extLst>
+          </p:cNvPr>
+          <p:cNvPicPr>
+            <a:picLocks noChangeAspect="1"/>
+          </p:cNvPicPr>
+          <p:nvPr/>
+        </p:nvPicPr>
+        <p:blipFill>
+          <a:blip r:embed="rId4">
+            <a:extLst>
+              <a:ext uri="{28A0092B-C50C-407E-A947-70E740481C1C}">
+                <a14:useLocalDpi xmlns:a14="http://schemas.microsoft.com/office/drawing/2010/main" val="0"/>
+              </a:ext>
+            </a:extLst>
+          </a:blip>
+          <a:stretch>
+            <a:fillRect/>
+          </a:stretch>
+        </p:blipFill>
+        <p:spPr>
+          <a:xfrm>
+            <a:off x="1388875" y="6119040"/>
+            <a:ext cx="476190" cy="476190"/>
+          </a:xfrm>
+          <a:prstGeom prst="rect">
+            <a:avLst/>
+          </a:prstGeom>
+        </p:spPr>
+      </p:pic>
+      <p:pic>
+        <p:nvPicPr>
+          <p:cNvPr id="12" name="Picture 11">
+            <a:extLst>
+              <a:ext uri="{FF2B5EF4-FFF2-40B4-BE49-F238E27FC236}">
+                <a16:creationId xmlns:a16="http://schemas.microsoft.com/office/drawing/2014/main" id="{084449FC-DACC-4538-B161-CD54B73FFA58}"/>
+              </a:ext>
+            </a:extLst>
+          </p:cNvPr>
+          <p:cNvPicPr>
+            <a:picLocks noChangeAspect="1"/>
+          </p:cNvPicPr>
+          <p:nvPr/>
+        </p:nvPicPr>
+        <p:blipFill>
+          <a:blip r:embed="rId4">
+            <a:extLst>
+              <a:ext uri="{28A0092B-C50C-407E-A947-70E740481C1C}">
+                <a14:useLocalDpi xmlns:a14="http://schemas.microsoft.com/office/drawing/2010/main" val="0"/>
+              </a:ext>
+            </a:extLst>
+          </a:blip>
+          <a:stretch>
+            <a:fillRect/>
+          </a:stretch>
+        </p:blipFill>
+        <p:spPr>
+          <a:xfrm>
+            <a:off x="1939550" y="6130590"/>
+            <a:ext cx="476190" cy="476190"/>
+          </a:xfrm>
+          <a:prstGeom prst="rect">
+            <a:avLst/>
+          </a:prstGeom>
+        </p:spPr>
+      </p:pic>
+      <p:pic>
+        <p:nvPicPr>
+          <p:cNvPr id="4" name="Picture 3">
+            <a:extLst>
+              <a:ext uri="{FF2B5EF4-FFF2-40B4-BE49-F238E27FC236}">
+                <a16:creationId xmlns:a16="http://schemas.microsoft.com/office/drawing/2014/main" id="{F5FA054B-7C99-44AC-A424-489431127710}"/>
+              </a:ext>
+            </a:extLst>
+          </p:cNvPr>
+          <p:cNvPicPr>
+            <a:picLocks noChangeAspect="1"/>
+          </p:cNvPicPr>
+          <p:nvPr/>
+        </p:nvPicPr>
+        <p:blipFill>
+          <a:blip r:embed="rId5">
+            <a:extLst>
+              <a:ext uri="{28A0092B-C50C-407E-A947-70E740481C1C}">
+                <a14:useLocalDpi xmlns:a14="http://schemas.microsoft.com/office/drawing/2010/main" val="0"/>
+              </a:ext>
+            </a:extLst>
+          </a:blip>
+          <a:stretch>
+            <a:fillRect/>
+          </a:stretch>
+        </p:blipFill>
+        <p:spPr>
+          <a:xfrm>
+            <a:off x="9253896" y="5468121"/>
+            <a:ext cx="1319352" cy="1301838"/>
+          </a:xfrm>
+          <a:prstGeom prst="rect">
+            <a:avLst/>
+          </a:prstGeom>
+        </p:spPr>
+      </p:pic>
+      <p:sp>
+        <p:nvSpPr>
+          <p:cNvPr id="16" name="Content Placeholder 2">
+            <a:extLst>
+              <a:ext uri="{FF2B5EF4-FFF2-40B4-BE49-F238E27FC236}">
+                <a16:creationId xmlns:a16="http://schemas.microsoft.com/office/drawing/2014/main" id="{E249390B-63C9-4828-90FF-638E13EA9D4E}"/>
+              </a:ext>
+            </a:extLst>
+          </p:cNvPr>
+          <p:cNvSpPr txBox="1">
+            <a:spLocks/>
+          </p:cNvSpPr>
+          <p:nvPr/>
+        </p:nvSpPr>
+        <p:spPr>
+          <a:xfrm>
+            <a:off x="5236632" y="1399053"/>
+            <a:ext cx="4017264" cy="4969632"/>
+          </a:xfrm>
+          <a:prstGeom prst="rect">
+            <a:avLst/>
+          </a:prstGeom>
+        </p:spPr>
+        <p:txBody>
+          <a:bodyPr vert="horz" lIns="91440" tIns="45720" rIns="91440" bIns="45720" rtlCol="0">
+            <a:normAutofit fontScale="92500" lnSpcReduction="20000"/>
+          </a:bodyPr>
+          <a:lstStyle>
+            <a:lvl1pPr marL="228600" indent="-228600" algn="l" defTabSz="914400" rtl="0" eaLnBrk="1" latinLnBrk="0" hangingPunct="1">
+              <a:lnSpc>
+                <a:spcPct val="90000"/>
+              </a:lnSpc>
+              <a:spcBef>
+                <a:spcPts val="1000"/>
+              </a:spcBef>
+              <a:buFont typeface="Arial" panose="020B0604020202020204" pitchFamily="34" charset="0"/>
+              <a:buChar char="•"/>
+              <a:defRPr sz="2800" kern="1200">
+                <a:solidFill>
+                  <a:schemeClr val="tx1"/>
+                </a:solidFill>
+                <a:latin typeface="+mn-lt"/>
+                <a:ea typeface="+mn-ea"/>
+                <a:cs typeface="+mn-cs"/>
+              </a:defRPr>
+            </a:lvl1pPr>
+            <a:lvl2pPr marL="685800" indent="-228600" algn="l" defTabSz="914400" rtl="0" eaLnBrk="1" latinLnBrk="0" hangingPunct="1">
+              <a:lnSpc>
+                <a:spcPct val="90000"/>
+              </a:lnSpc>
+              <a:spcBef>
+                <a:spcPts val="500"/>
+              </a:spcBef>
+              <a:buFont typeface="Arial" panose="020B0604020202020204" pitchFamily="34" charset="0"/>
+              <a:buChar char="•"/>
+              <a:defRPr sz="2400" kern="1200">
+                <a:solidFill>
+                  <a:schemeClr val="tx1"/>
+                </a:solidFill>
+                <a:latin typeface="+mn-lt"/>
+                <a:ea typeface="+mn-ea"/>
+                <a:cs typeface="+mn-cs"/>
+              </a:defRPr>
+            </a:lvl2pPr>
+            <a:lvl3pPr marL="1143000" indent="-228600" algn="l" defTabSz="914400" rtl="0" eaLnBrk="1" latinLnBrk="0" hangingPunct="1">
+              <a:lnSpc>
+                <a:spcPct val="90000"/>
+              </a:lnSpc>
+              <a:spcBef>
+                <a:spcPts val="500"/>
+              </a:spcBef>
+              <a:buFont typeface="Arial" panose="020B0604020202020204" pitchFamily="34" charset="0"/>
+              <a:buChar char="•"/>
+              <a:defRPr sz="2000" kern="1200">
+                <a:solidFill>
+                  <a:schemeClr val="tx1"/>
+                </a:solidFill>
+                <a:latin typeface="+mn-lt"/>
+                <a:ea typeface="+mn-ea"/>
+                <a:cs typeface="+mn-cs"/>
+              </a:defRPr>
+            </a:lvl3pPr>
+            <a:lvl4pPr marL="1600200" indent="-228600" algn="l" defTabSz="914400" rtl="0" eaLnBrk="1" latinLnBrk="0" hangingPunct="1">
+              <a:lnSpc>
+                <a:spcPct val="90000"/>
+              </a:lnSpc>
+              <a:spcBef>
+                <a:spcPts val="500"/>
+              </a:spcBef>
+              <a:buFont typeface="Arial" panose="020B0604020202020204" pitchFamily="34" charset="0"/>
+              <a:buChar char="•"/>
+              <a:defRPr sz="1800" kern="1200">
+                <a:solidFill>
+                  <a:schemeClr val="tx1"/>
+                </a:solidFill>
+                <a:latin typeface="+mn-lt"/>
+                <a:ea typeface="+mn-ea"/>
+                <a:cs typeface="+mn-cs"/>
+              </a:defRPr>
+            </a:lvl4pPr>
+            <a:lvl5pPr marL="2057400" indent="-228600" algn="l" defTabSz="914400" rtl="0" eaLnBrk="1" latinLnBrk="0" hangingPunct="1">
+              <a:lnSpc>
+                <a:spcPct val="90000"/>
+              </a:lnSpc>
+              <a:spcBef>
+                <a:spcPts val="500"/>
+              </a:spcBef>
+              <a:buFont typeface="Arial" panose="020B0604020202020204" pitchFamily="34" charset="0"/>
+              <a:buChar char="•"/>
+              <a:defRPr sz="1800" kern="1200">
+                <a:solidFill>
+                  <a:schemeClr val="tx1"/>
+                </a:solidFill>
+                <a:latin typeface="+mn-lt"/>
+                <a:ea typeface="+mn-ea"/>
+                <a:cs typeface="+mn-cs"/>
+              </a:defRPr>
+            </a:lvl5pPr>
+            <a:lvl6pPr marL="2514600" indent="-228600" algn="l" defTabSz="914400" rtl="0" eaLnBrk="1" latinLnBrk="0" hangingPunct="1">
+              <a:lnSpc>
+                <a:spcPct val="90000"/>
+              </a:lnSpc>
+              <a:spcBef>
+                <a:spcPts val="500"/>
+              </a:spcBef>
+              <a:buFont typeface="Arial" panose="020B0604020202020204" pitchFamily="34" charset="0"/>
+              <a:buChar char="•"/>
+              <a:defRPr sz="1800" kern="1200">
+                <a:solidFill>
+                  <a:schemeClr val="tx1"/>
+                </a:solidFill>
+                <a:latin typeface="+mn-lt"/>
+                <a:ea typeface="+mn-ea"/>
+                <a:cs typeface="+mn-cs"/>
+              </a:defRPr>
+            </a:lvl6pPr>
+            <a:lvl7pPr marL="2971800" indent="-228600" algn="l" defTabSz="914400" rtl="0" eaLnBrk="1" latinLnBrk="0" hangingPunct="1">
+              <a:lnSpc>
+                <a:spcPct val="90000"/>
+              </a:lnSpc>
+              <a:spcBef>
+                <a:spcPts val="500"/>
+              </a:spcBef>
+              <a:buFont typeface="Arial" panose="020B0604020202020204" pitchFamily="34" charset="0"/>
+              <a:buChar char="•"/>
+              <a:defRPr sz="1800" kern="1200">
+                <a:solidFill>
+                  <a:schemeClr val="tx1"/>
+                </a:solidFill>
+                <a:latin typeface="+mn-lt"/>
+                <a:ea typeface="+mn-ea"/>
+                <a:cs typeface="+mn-cs"/>
+              </a:defRPr>
+            </a:lvl7pPr>
+            <a:lvl8pPr marL="3429000" indent="-228600" algn="l" defTabSz="914400" rtl="0" eaLnBrk="1" latinLnBrk="0" hangingPunct="1">
+              <a:lnSpc>
+                <a:spcPct val="90000"/>
+              </a:lnSpc>
+              <a:spcBef>
+                <a:spcPts val="500"/>
+              </a:spcBef>
+              <a:buFont typeface="Arial" panose="020B0604020202020204" pitchFamily="34" charset="0"/>
+              <a:buChar char="•"/>
+              <a:defRPr sz="1800" kern="1200">
+                <a:solidFill>
+                  <a:schemeClr val="tx1"/>
+                </a:solidFill>
+                <a:latin typeface="+mn-lt"/>
+                <a:ea typeface="+mn-ea"/>
+                <a:cs typeface="+mn-cs"/>
+              </a:defRPr>
+            </a:lvl8pPr>
+            <a:lvl9pPr marL="3886200" indent="-228600" algn="l" defTabSz="914400" rtl="0" eaLnBrk="1" latinLnBrk="0" hangingPunct="1">
+              <a:lnSpc>
+                <a:spcPct val="90000"/>
+              </a:lnSpc>
+              <a:spcBef>
+                <a:spcPts val="500"/>
+              </a:spcBef>
+              <a:buFont typeface="Arial" panose="020B0604020202020204" pitchFamily="34" charset="0"/>
+              <a:buChar char="•"/>
+              <a:defRPr sz="1800" kern="1200">
+                <a:solidFill>
+                  <a:schemeClr val="tx1"/>
+                </a:solidFill>
+                <a:latin typeface="+mn-lt"/>
+                <a:ea typeface="+mn-ea"/>
+                <a:cs typeface="+mn-cs"/>
+              </a:defRPr>
+            </a:lvl9pPr>
+          </a:lstStyle>
+          <a:p>
+            <a:r>
+              <a:rPr lang="en-US" sz="3500" dirty="0">
+                <a:solidFill>
+                  <a:srgbClr val="777777"/>
+                </a:solidFill>
+              </a:rPr>
+              <a:t>Selenium</a:t>
+            </a:r>
+          </a:p>
+          <a:p>
+            <a:r>
+              <a:rPr lang="en-US" sz="3500" dirty="0">
+                <a:solidFill>
+                  <a:srgbClr val="777777"/>
+                </a:solidFill>
+              </a:rPr>
+              <a:t>Splinter</a:t>
+            </a:r>
+          </a:p>
+          <a:p>
+            <a:r>
+              <a:rPr lang="en-US" sz="3500" dirty="0">
+                <a:solidFill>
+                  <a:srgbClr val="777777"/>
+                </a:solidFill>
+              </a:rPr>
+              <a:t>BeautifulSoup</a:t>
+            </a:r>
+          </a:p>
+          <a:p>
+            <a:r>
+              <a:rPr lang="en-US" sz="3500" dirty="0">
+                <a:solidFill>
+                  <a:srgbClr val="777777"/>
+                </a:solidFill>
+              </a:rPr>
+              <a:t>Requests</a:t>
+            </a:r>
+          </a:p>
+          <a:p>
+            <a:r>
+              <a:rPr lang="en-US" sz="3500" dirty="0">
+                <a:solidFill>
+                  <a:srgbClr val="777777"/>
+                </a:solidFill>
+              </a:rPr>
+              <a:t>Time </a:t>
+            </a:r>
+          </a:p>
+          <a:p>
+            <a:r>
+              <a:rPr lang="en-US" sz="3500" dirty="0">
+                <a:solidFill>
+                  <a:srgbClr val="777777"/>
+                </a:solidFill>
+              </a:rPr>
+              <a:t>Math</a:t>
+            </a:r>
+          </a:p>
+          <a:p>
+            <a:r>
+              <a:rPr lang="en-US" sz="3500" dirty="0">
+                <a:solidFill>
+                  <a:srgbClr val="777777"/>
+                </a:solidFill>
+              </a:rPr>
+              <a:t>SciKitLearn</a:t>
+            </a:r>
+          </a:p>
+          <a:p>
+            <a:r>
+              <a:rPr lang="en-US" sz="3500" dirty="0">
+                <a:solidFill>
+                  <a:srgbClr val="777777"/>
+                </a:solidFill>
+              </a:rPr>
+              <a:t>NumPy</a:t>
+            </a:r>
+          </a:p>
+          <a:p>
+            <a:r>
+              <a:rPr lang="en-US" sz="3500" dirty="0">
+                <a:solidFill>
+                  <a:srgbClr val="777777"/>
+                </a:solidFill>
+              </a:rPr>
+              <a:t>Pickle</a:t>
+            </a:r>
+          </a:p>
+          <a:p>
+            <a:r>
+              <a:rPr lang="en-US" sz="3500" dirty="0">
+                <a:solidFill>
+                  <a:srgbClr val="777777"/>
+                </a:solidFill>
+              </a:rPr>
+              <a:t>MySQL</a:t>
+            </a:r>
+          </a:p>
+          <a:p>
+            <a:endParaRPr lang="en-US" sz="3500" dirty="0">
+              <a:solidFill>
+                <a:srgbClr val="777777"/>
+              </a:solidFill>
+            </a:endParaRPr>
+          </a:p>
+          <a:p>
+            <a:endParaRPr lang="en-US" sz="3500" dirty="0">
+              <a:solidFill>
+                <a:srgbClr val="777777"/>
+              </a:solidFill>
+            </a:endParaRPr>
+          </a:p>
+          <a:p>
+            <a:endParaRPr lang="en-US" sz="3500" dirty="0">
+              <a:solidFill>
+                <a:srgbClr val="777777"/>
+              </a:solidFill>
+            </a:endParaRPr>
+          </a:p>
+          <a:p>
+            <a:endParaRPr lang="en-US" dirty="0">
+              <a:solidFill>
+                <a:srgbClr val="777777"/>
+              </a:solidFill>
+            </a:endParaRPr>
+          </a:p>
+          <a:p>
+            <a:endParaRPr lang="en-US" dirty="0">
+              <a:solidFill>
+                <a:srgbClr val="777777"/>
+              </a:solidFill>
+            </a:endParaRPr>
+          </a:p>
+        </p:txBody>
+      </p:sp>
+      <p:sp>
+        <p:nvSpPr>
+          <p:cNvPr id="13" name="TextBox 12">
+            <a:extLst>
+              <a:ext uri="{FF2B5EF4-FFF2-40B4-BE49-F238E27FC236}">
+                <a16:creationId xmlns:a16="http://schemas.microsoft.com/office/drawing/2014/main" id="{57955C18-69F7-4502-B2E5-BE11DE54FB1B}"/>
+              </a:ext>
+            </a:extLst>
+          </p:cNvPr>
+          <p:cNvSpPr txBox="1"/>
+          <p:nvPr/>
+        </p:nvSpPr>
+        <p:spPr>
+          <a:xfrm>
+            <a:off x="3630268" y="6447235"/>
+            <a:ext cx="5623628" cy="246221"/>
+          </a:xfrm>
+          <a:prstGeom prst="rect">
+            <a:avLst/>
+          </a:prstGeom>
+          <a:noFill/>
+        </p:spPr>
+        <p:txBody>
+          <a:bodyPr wrap="square" rtlCol="0">
+            <a:spAutoFit/>
+          </a:bodyPr>
+          <a:lstStyle/>
+          <a:p>
+            <a:pPr algn="r"/>
+            <a:r>
+              <a:rPr lang="en-US" sz="1000" b="0" i="1" dirty="0">
+                <a:solidFill>
+                  <a:srgbClr val="202124"/>
+                </a:solidFill>
+                <a:effectLst/>
+                <a:latin typeface="arial" panose="020B0604020202020204" pitchFamily="34" charset="0"/>
+              </a:rPr>
+              <a:t>Scientists believe </a:t>
+            </a:r>
+            <a:r>
+              <a:rPr lang="en-US" sz="1000" b="1" i="1" dirty="0">
+                <a:solidFill>
+                  <a:srgbClr val="202124"/>
+                </a:solidFill>
+                <a:effectLst/>
+                <a:latin typeface="arial" panose="020B0604020202020204" pitchFamily="34" charset="0"/>
+              </a:rPr>
+              <a:t>there</a:t>
+            </a:r>
+            <a:r>
+              <a:rPr lang="en-US" sz="1000" b="0" i="1" dirty="0">
+                <a:solidFill>
+                  <a:srgbClr val="202124"/>
+                </a:solidFill>
+                <a:effectLst/>
+                <a:latin typeface="arial" panose="020B0604020202020204" pitchFamily="34" charset="0"/>
+              </a:rPr>
+              <a:t> may be around 100 or more </a:t>
+            </a:r>
+            <a:r>
+              <a:rPr lang="en-US" sz="1000" b="1" i="1" dirty="0">
+                <a:solidFill>
+                  <a:srgbClr val="202124"/>
+                </a:solidFill>
+                <a:effectLst/>
+                <a:latin typeface="arial" panose="020B0604020202020204" pitchFamily="34" charset="0"/>
+              </a:rPr>
+              <a:t>Aye</a:t>
+            </a:r>
+            <a:r>
+              <a:rPr lang="en-US" sz="1000" b="0" i="1" dirty="0">
+                <a:solidFill>
+                  <a:srgbClr val="202124"/>
+                </a:solidFill>
+                <a:effectLst/>
+                <a:latin typeface="arial" panose="020B0604020202020204" pitchFamily="34" charset="0"/>
+              </a:rPr>
+              <a:t>-</a:t>
+            </a:r>
+            <a:r>
+              <a:rPr lang="en-US" sz="1000" b="1" i="1" dirty="0">
+                <a:solidFill>
+                  <a:srgbClr val="202124"/>
+                </a:solidFill>
+                <a:effectLst/>
+                <a:latin typeface="arial" panose="020B0604020202020204" pitchFamily="34" charset="0"/>
+              </a:rPr>
+              <a:t>Aye left</a:t>
+            </a:r>
+            <a:r>
+              <a:rPr lang="en-US" sz="1000" b="0" i="1" dirty="0">
+                <a:solidFill>
+                  <a:srgbClr val="202124"/>
+                </a:solidFill>
+                <a:effectLst/>
+                <a:latin typeface="arial" panose="020B0604020202020204" pitchFamily="34" charset="0"/>
+              </a:rPr>
+              <a:t> in the wild.</a:t>
+            </a:r>
+            <a:endParaRPr lang="en-US" sz="1000" i="1" dirty="0"/>
           </a:p>
         </p:txBody>
       </p:sp>
@@ -4659,7 +6272,7 @@
         </p:spPr>
         <p:txBody>
           <a:bodyPr>
-            <a:normAutofit fontScale="92500" lnSpcReduction="10000"/>
+            <a:normAutofit/>
           </a:bodyPr>
           <a:lstStyle/>
           <a:p>
@@ -4679,6 +6292,16 @@
                   <a:srgbClr val="777777"/>
                 </a:solidFill>
               </a:rPr>
+              <a:t>Integration of zip code level demographics</a:t>
+            </a:r>
+          </a:p>
+          <a:p>
+            <a:r>
+              <a:rPr lang="en-US" dirty="0">
+                <a:solidFill>
+                  <a:srgbClr val="777777"/>
+                </a:solidFill>
+              </a:rPr>
               <a:t>Data Hurdles</a:t>
             </a:r>
           </a:p>
@@ -4712,8 +6335,40 @@
                   <a:srgbClr val="777777"/>
                 </a:solidFill>
               </a:rPr>
-              <a:t>Major outliers</a:t>
-            </a:r>
+              <a:t>Major outliers for price, both high and low</a:t>
+            </a:r>
+          </a:p>
+          <a:p>
+            <a:pPr lvl="1"/>
+            <a:r>
+              <a:rPr lang="en-US" dirty="0">
+                <a:solidFill>
+                  <a:srgbClr val="777777"/>
+                </a:solidFill>
+              </a:rPr>
+              <a:t>Duplicated MLS numbers (120)</a:t>
+            </a:r>
+          </a:p>
+          <a:p>
+            <a:pPr lvl="1"/>
+            <a:r>
+              <a:rPr lang="en-US" dirty="0">
+                <a:solidFill>
+                  <a:srgbClr val="777777"/>
+                </a:solidFill>
+              </a:rPr>
+              <a:t>Listing out side of St. Louis City and County</a:t>
+            </a:r>
+          </a:p>
+          <a:p>
+            <a:pPr marL="457200" lvl="1" indent="0">
+              <a:buNone/>
+            </a:pPr>
+            <a:endParaRPr lang="en-US" dirty="0">
+              <a:solidFill>
+                <a:srgbClr val="777777"/>
+              </a:solidFill>
+            </a:endParaRPr>
           </a:p>
           <a:p>
             <a:pPr lvl="1"/>
@@ -4724,6 +6379,432 @@
             </a:endParaRPr>
           </a:p>
           <a:p>
+            <a:endParaRPr lang="en-US" sz="3500" dirty="0">
+              <a:solidFill>
+                <a:srgbClr val="777777"/>
+              </a:solidFill>
+            </a:endParaRPr>
+          </a:p>
+          <a:p>
+            <a:endParaRPr lang="en-US" sz="3500" dirty="0">
+              <a:solidFill>
+                <a:srgbClr val="777777"/>
+              </a:solidFill>
+            </a:endParaRPr>
+          </a:p>
+          <a:p>
+            <a:endParaRPr lang="en-US" dirty="0">
+              <a:solidFill>
+                <a:srgbClr val="777777"/>
+              </a:solidFill>
+            </a:endParaRPr>
+          </a:p>
+          <a:p>
+            <a:endParaRPr lang="en-US" dirty="0">
+              <a:solidFill>
+                <a:srgbClr val="777777"/>
+              </a:solidFill>
+            </a:endParaRPr>
+          </a:p>
+        </p:txBody>
+      </p:sp>
+      <p:pic>
+        <p:nvPicPr>
+          <p:cNvPr id="9" name="Picture 8">
+            <a:extLst>
+              <a:ext uri="{FF2B5EF4-FFF2-40B4-BE49-F238E27FC236}">
+                <a16:creationId xmlns:a16="http://schemas.microsoft.com/office/drawing/2014/main" id="{53554AA0-9657-46C8-BC8A-EF6404AD3D89}"/>
+              </a:ext>
+            </a:extLst>
+          </p:cNvPr>
+          <p:cNvPicPr>
+            <a:picLocks noChangeAspect="1"/>
+          </p:cNvPicPr>
+          <p:nvPr/>
+        </p:nvPicPr>
+        <p:blipFill>
+          <a:blip r:embed="rId4">
+            <a:extLst>
+              <a:ext uri="{28A0092B-C50C-407E-A947-70E740481C1C}">
+                <a14:useLocalDpi xmlns:a14="http://schemas.microsoft.com/office/drawing/2010/main" val="0"/>
+              </a:ext>
+            </a:extLst>
+          </a:blip>
+          <a:stretch>
+            <a:fillRect/>
+          </a:stretch>
+        </p:blipFill>
+        <p:spPr>
+          <a:xfrm>
+            <a:off x="838200" y="6119040"/>
+            <a:ext cx="476190" cy="476190"/>
+          </a:xfrm>
+          <a:prstGeom prst="rect">
+            <a:avLst/>
+          </a:prstGeom>
+        </p:spPr>
+      </p:pic>
+      <p:pic>
+        <p:nvPicPr>
+          <p:cNvPr id="11" name="Picture 10">
+            <a:extLst>
+              <a:ext uri="{FF2B5EF4-FFF2-40B4-BE49-F238E27FC236}">
+                <a16:creationId xmlns:a16="http://schemas.microsoft.com/office/drawing/2014/main" id="{6A914B30-4EB6-4805-9773-1EC500ADCB6C}"/>
+              </a:ext>
+            </a:extLst>
+          </p:cNvPr>
+          <p:cNvPicPr>
+            <a:picLocks noChangeAspect="1"/>
+          </p:cNvPicPr>
+          <p:nvPr/>
+        </p:nvPicPr>
+        <p:blipFill>
+          <a:blip r:embed="rId4">
+            <a:extLst>
+              <a:ext uri="{28A0092B-C50C-407E-A947-70E740481C1C}">
+                <a14:useLocalDpi xmlns:a14="http://schemas.microsoft.com/office/drawing/2010/main" val="0"/>
+              </a:ext>
+            </a:extLst>
+          </a:blip>
+          <a:stretch>
+            <a:fillRect/>
+          </a:stretch>
+        </p:blipFill>
+        <p:spPr>
+          <a:xfrm>
+            <a:off x="1388875" y="6119040"/>
+            <a:ext cx="476190" cy="476190"/>
+          </a:xfrm>
+          <a:prstGeom prst="rect">
+            <a:avLst/>
+          </a:prstGeom>
+        </p:spPr>
+      </p:pic>
+      <p:pic>
+        <p:nvPicPr>
+          <p:cNvPr id="12" name="Picture 11">
+            <a:extLst>
+              <a:ext uri="{FF2B5EF4-FFF2-40B4-BE49-F238E27FC236}">
+                <a16:creationId xmlns:a16="http://schemas.microsoft.com/office/drawing/2014/main" id="{AD78F74E-3885-4DCF-9468-F8A2333ED915}"/>
+              </a:ext>
+            </a:extLst>
+          </p:cNvPr>
+          <p:cNvPicPr>
+            <a:picLocks noChangeAspect="1"/>
+          </p:cNvPicPr>
+          <p:nvPr/>
+        </p:nvPicPr>
+        <p:blipFill>
+          <a:blip r:embed="rId4">
+            <a:extLst>
+              <a:ext uri="{28A0092B-C50C-407E-A947-70E740481C1C}">
+                <a14:useLocalDpi xmlns:a14="http://schemas.microsoft.com/office/drawing/2010/main" val="0"/>
+              </a:ext>
+            </a:extLst>
+          </a:blip>
+          <a:stretch>
+            <a:fillRect/>
+          </a:stretch>
+        </p:blipFill>
+        <p:spPr>
+          <a:xfrm>
+            <a:off x="1939550" y="6130590"/>
+            <a:ext cx="476190" cy="476190"/>
+          </a:xfrm>
+          <a:prstGeom prst="rect">
+            <a:avLst/>
+          </a:prstGeom>
+        </p:spPr>
+      </p:pic>
+      <p:pic>
+        <p:nvPicPr>
+          <p:cNvPr id="4" name="Picture 3">
+            <a:extLst>
+              <a:ext uri="{FF2B5EF4-FFF2-40B4-BE49-F238E27FC236}">
+                <a16:creationId xmlns:a16="http://schemas.microsoft.com/office/drawing/2014/main" id="{84A46F36-B410-4AF8-8999-758CB6FE26CE}"/>
+              </a:ext>
+            </a:extLst>
+          </p:cNvPr>
+          <p:cNvPicPr>
+            <a:picLocks noChangeAspect="1"/>
+          </p:cNvPicPr>
+          <p:nvPr/>
+        </p:nvPicPr>
+        <p:blipFill>
+          <a:blip r:embed="rId5">
+            <a:extLst>
+              <a:ext uri="{28A0092B-C50C-407E-A947-70E740481C1C}">
+                <a14:useLocalDpi xmlns:a14="http://schemas.microsoft.com/office/drawing/2010/main" val="0"/>
+              </a:ext>
+            </a:extLst>
+          </a:blip>
+          <a:stretch>
+            <a:fillRect/>
+          </a:stretch>
+        </p:blipFill>
+        <p:spPr>
+          <a:xfrm>
+            <a:off x="9020800" y="5890619"/>
+            <a:ext cx="1567542" cy="877824"/>
+          </a:xfrm>
+          <a:prstGeom prst="rect">
+            <a:avLst/>
+          </a:prstGeom>
+        </p:spPr>
+      </p:pic>
+      <p:sp>
+        <p:nvSpPr>
+          <p:cNvPr id="13" name="TextBox 12">
+            <a:extLst>
+              <a:ext uri="{FF2B5EF4-FFF2-40B4-BE49-F238E27FC236}">
+                <a16:creationId xmlns:a16="http://schemas.microsoft.com/office/drawing/2014/main" id="{08C29542-F90D-4C58-B30E-F6AB0EC8EF45}"/>
+              </a:ext>
+            </a:extLst>
+          </p:cNvPr>
+          <p:cNvSpPr txBox="1"/>
+          <p:nvPr/>
+        </p:nvSpPr>
+        <p:spPr>
+          <a:xfrm>
+            <a:off x="3306418" y="6447235"/>
+            <a:ext cx="5623628" cy="246221"/>
+          </a:xfrm>
+          <a:prstGeom prst="rect">
+            <a:avLst/>
+          </a:prstGeom>
+          <a:noFill/>
+        </p:spPr>
+        <p:txBody>
+          <a:bodyPr wrap="square" rtlCol="0">
+            <a:spAutoFit/>
+          </a:bodyPr>
+          <a:lstStyle/>
+          <a:p>
+            <a:pPr algn="r"/>
+            <a:r>
+              <a:rPr lang="en-US" sz="1000" i="1" dirty="0">
+                <a:solidFill>
+                  <a:srgbClr val="202124"/>
+                </a:solidFill>
+                <a:effectLst/>
+                <a:latin typeface="arial" panose="020B0604020202020204" pitchFamily="34" charset="0"/>
+              </a:rPr>
+              <a:t>AYE means "Yes".</a:t>
+            </a:r>
+            <a:endParaRPr lang="en-US" sz="1000" i="1" dirty="0"/>
+          </a:p>
+        </p:txBody>
+      </p:sp>
+    </p:spTree>
+    <p:extLst>
+      <p:ext uri="{BB962C8B-B14F-4D97-AF65-F5344CB8AC3E}">
+        <p14:creationId xmlns:p14="http://schemas.microsoft.com/office/powerpoint/2010/main" val="4037639536"/>
+      </p:ext>
+    </p:extLst>
+  </p:cSld>
+  <p:clrMapOvr>
+    <a:masterClrMapping/>
+  </p:clrMapOvr>
+</p:sld>
+</file>
+
+<file path=ppt/slides/slide6.xml><?xml version="1.0" encoding="utf-8"?>
+<p:sld xmlns:a="http://schemas.openxmlformats.org/drawingml/2006/main" xmlns:r="http://schemas.openxmlformats.org/officeDocument/2006/relationships" xmlns:p="http://schemas.openxmlformats.org/presentationml/2006/main">
+  <p:cSld>
+    <p:spTree>
+      <p:nvGrpSpPr>
+        <p:cNvPr id="1" name=""/>
+        <p:cNvGrpSpPr/>
+        <p:nvPr/>
+      </p:nvGrpSpPr>
+      <p:grpSpPr>
+        <a:xfrm>
+          <a:off x="0" y="0"/>
+          <a:ext cx="0" cy="0"/>
+          <a:chOff x="0" y="0"/>
+          <a:chExt cx="0" cy="0"/>
+        </a:xfrm>
+      </p:grpSpPr>
+      <p:pic>
+        <p:nvPicPr>
+          <p:cNvPr id="5" name="Picture 4">
+            <a:extLst>
+              <a:ext uri="{FF2B5EF4-FFF2-40B4-BE49-F238E27FC236}">
+                <a16:creationId xmlns:a16="http://schemas.microsoft.com/office/drawing/2014/main" id="{4E1D6A53-CCB1-448E-B73A-C24A6B7FA7F5}"/>
+              </a:ext>
+            </a:extLst>
+          </p:cNvPr>
+          <p:cNvPicPr>
+            <a:picLocks noChangeAspect="1"/>
+          </p:cNvPicPr>
+          <p:nvPr/>
+        </p:nvPicPr>
+        <p:blipFill>
+          <a:blip r:embed="rId2">
+            <a:extLst>
+              <a:ext uri="{28A0092B-C50C-407E-A947-70E740481C1C}">
+                <a14:useLocalDpi xmlns:a14="http://schemas.microsoft.com/office/drawing/2010/main" val="0"/>
+              </a:ext>
+            </a:extLst>
+          </a:blip>
+          <a:stretch>
+            <a:fillRect/>
+          </a:stretch>
+        </p:blipFill>
+        <p:spPr>
+          <a:xfrm rot="16200000">
+            <a:off x="-2711636" y="3002718"/>
+            <a:ext cx="6591625" cy="1026863"/>
+          </a:xfrm>
+          <a:prstGeom prst="rect">
+            <a:avLst/>
+          </a:prstGeom>
+        </p:spPr>
+      </p:pic>
+      <p:sp>
+        <p:nvSpPr>
+          <p:cNvPr id="2" name="Title 1">
+            <a:extLst>
+              <a:ext uri="{FF2B5EF4-FFF2-40B4-BE49-F238E27FC236}">
+                <a16:creationId xmlns:a16="http://schemas.microsoft.com/office/drawing/2014/main" id="{B78BD6CC-06EC-41F0-A49E-9914B3569BBB}"/>
+              </a:ext>
+            </a:extLst>
+          </p:cNvPr>
+          <p:cNvSpPr>
+            <a:spLocks noGrp="1"/>
+          </p:cNvSpPr>
+          <p:nvPr>
+            <p:ph type="title"/>
+          </p:nvPr>
+        </p:nvSpPr>
+        <p:spPr/>
+        <p:txBody>
+          <a:bodyPr>
+            <a:normAutofit/>
+          </a:bodyPr>
+          <a:lstStyle/>
+          <a:p>
+            <a:r>
+              <a:rPr lang="en-US" sz="4800" b="1" dirty="0">
+                <a:solidFill>
+                  <a:srgbClr val="777777"/>
+                </a:solidFill>
+              </a:rPr>
+              <a:t>Data – Code Examples</a:t>
+            </a:r>
+          </a:p>
+        </p:txBody>
+      </p:sp>
+      <p:pic>
+        <p:nvPicPr>
+          <p:cNvPr id="7" name="Picture 6">
+            <a:extLst>
+              <a:ext uri="{FF2B5EF4-FFF2-40B4-BE49-F238E27FC236}">
+                <a16:creationId xmlns:a16="http://schemas.microsoft.com/office/drawing/2014/main" id="{31756008-26B5-498C-B4BB-EDA072BEC72A}"/>
+              </a:ext>
+            </a:extLst>
+          </p:cNvPr>
+          <p:cNvPicPr>
+            <a:picLocks noChangeAspect="1"/>
+          </p:cNvPicPr>
+          <p:nvPr/>
+        </p:nvPicPr>
+        <p:blipFill>
+          <a:blip r:embed="rId2">
+            <a:extLst>
+              <a:ext uri="{28A0092B-C50C-407E-A947-70E740481C1C}">
+                <a14:useLocalDpi xmlns:a14="http://schemas.microsoft.com/office/drawing/2010/main" val="0"/>
+              </a:ext>
+            </a:extLst>
+          </a:blip>
+          <a:stretch>
+            <a:fillRect/>
+          </a:stretch>
+        </p:blipFill>
+        <p:spPr>
+          <a:xfrm>
+            <a:off x="650232" y="262770"/>
+            <a:ext cx="4137525" cy="476190"/>
+          </a:xfrm>
+          <a:prstGeom prst="rect">
+            <a:avLst/>
+          </a:prstGeom>
+        </p:spPr>
+      </p:pic>
+      <p:pic>
+        <p:nvPicPr>
+          <p:cNvPr id="8" name="Picture 7">
+            <a:extLst>
+              <a:ext uri="{FF2B5EF4-FFF2-40B4-BE49-F238E27FC236}">
+                <a16:creationId xmlns:a16="http://schemas.microsoft.com/office/drawing/2014/main" id="{41B0AE2E-BC4F-4A32-96E8-B504B231A753}"/>
+              </a:ext>
+            </a:extLst>
+          </p:cNvPr>
+          <p:cNvPicPr>
+            <a:picLocks noChangeAspect="1"/>
+          </p:cNvPicPr>
+          <p:nvPr/>
+        </p:nvPicPr>
+        <p:blipFill>
+          <a:blip r:embed="rId3">
+            <a:extLst>
+              <a:ext uri="{28A0092B-C50C-407E-A947-70E740481C1C}">
+                <a14:useLocalDpi xmlns:a14="http://schemas.microsoft.com/office/drawing/2010/main" val="0"/>
+              </a:ext>
+            </a:extLst>
+          </a:blip>
+          <a:stretch>
+            <a:fillRect/>
+          </a:stretch>
+        </p:blipFill>
+        <p:spPr>
+          <a:xfrm>
+            <a:off x="9037115" y="5803809"/>
+            <a:ext cx="3154334" cy="1051444"/>
+          </a:xfrm>
+          <a:prstGeom prst="rect">
+            <a:avLst/>
+          </a:prstGeom>
+        </p:spPr>
+      </p:pic>
+      <p:sp>
+        <p:nvSpPr>
+          <p:cNvPr id="10" name="Content Placeholder 2">
+            <a:extLst>
+              <a:ext uri="{FF2B5EF4-FFF2-40B4-BE49-F238E27FC236}">
+                <a16:creationId xmlns:a16="http://schemas.microsoft.com/office/drawing/2014/main" id="{1C9D4C57-2F9A-43AE-8677-9502474D110C}"/>
+              </a:ext>
+            </a:extLst>
+          </p:cNvPr>
+          <p:cNvSpPr>
+            <a:spLocks noGrp="1"/>
+          </p:cNvSpPr>
+          <p:nvPr>
+            <p:ph idx="1"/>
+          </p:nvPr>
+        </p:nvSpPr>
+        <p:spPr>
+          <a:xfrm>
+            <a:off x="838200" y="1452471"/>
+            <a:ext cx="10515600" cy="4351338"/>
+          </a:xfrm>
+        </p:spPr>
+        <p:txBody>
+          <a:bodyPr>
+            <a:normAutofit/>
+          </a:bodyPr>
+          <a:lstStyle/>
+          <a:p>
+            <a:pPr marL="457200" lvl="1" indent="0">
+              <a:buNone/>
+            </a:pPr>
+            <a:endParaRPr lang="en-US" dirty="0">
+              <a:solidFill>
+                <a:srgbClr val="777777"/>
+              </a:solidFill>
+            </a:endParaRPr>
+          </a:p>
+          <a:p>
             <a:pPr lvl="1"/>
             <a:endParaRPr lang="en-US" dirty="0">
               <a:solidFill>
@@ -4732,6 +6813,452 @@
             </a:endParaRPr>
           </a:p>
           <a:p>
+            <a:endParaRPr lang="en-US" sz="3500" dirty="0">
+              <a:solidFill>
+                <a:srgbClr val="777777"/>
+              </a:solidFill>
+            </a:endParaRPr>
+          </a:p>
+          <a:p>
+            <a:endParaRPr lang="en-US" sz="3500" dirty="0">
+              <a:solidFill>
+                <a:srgbClr val="777777"/>
+              </a:solidFill>
+            </a:endParaRPr>
+          </a:p>
+          <a:p>
+            <a:endParaRPr lang="en-US" dirty="0">
+              <a:solidFill>
+                <a:srgbClr val="777777"/>
+              </a:solidFill>
+            </a:endParaRPr>
+          </a:p>
+          <a:p>
+            <a:endParaRPr lang="en-US" dirty="0">
+              <a:solidFill>
+                <a:srgbClr val="777777"/>
+              </a:solidFill>
+            </a:endParaRPr>
+          </a:p>
+        </p:txBody>
+      </p:sp>
+      <p:pic>
+        <p:nvPicPr>
+          <p:cNvPr id="9" name="Picture 8">
+            <a:extLst>
+              <a:ext uri="{FF2B5EF4-FFF2-40B4-BE49-F238E27FC236}">
+                <a16:creationId xmlns:a16="http://schemas.microsoft.com/office/drawing/2014/main" id="{53554AA0-9657-46C8-BC8A-EF6404AD3D89}"/>
+              </a:ext>
+            </a:extLst>
+          </p:cNvPr>
+          <p:cNvPicPr>
+            <a:picLocks noChangeAspect="1"/>
+          </p:cNvPicPr>
+          <p:nvPr/>
+        </p:nvPicPr>
+        <p:blipFill>
+          <a:blip r:embed="rId4">
+            <a:extLst>
+              <a:ext uri="{28A0092B-C50C-407E-A947-70E740481C1C}">
+                <a14:useLocalDpi xmlns:a14="http://schemas.microsoft.com/office/drawing/2010/main" val="0"/>
+              </a:ext>
+            </a:extLst>
+          </a:blip>
+          <a:stretch>
+            <a:fillRect/>
+          </a:stretch>
+        </p:blipFill>
+        <p:spPr>
+          <a:xfrm>
+            <a:off x="838200" y="6119040"/>
+            <a:ext cx="476190" cy="476190"/>
+          </a:xfrm>
+          <a:prstGeom prst="rect">
+            <a:avLst/>
+          </a:prstGeom>
+        </p:spPr>
+      </p:pic>
+      <p:pic>
+        <p:nvPicPr>
+          <p:cNvPr id="11" name="Picture 10">
+            <a:extLst>
+              <a:ext uri="{FF2B5EF4-FFF2-40B4-BE49-F238E27FC236}">
+                <a16:creationId xmlns:a16="http://schemas.microsoft.com/office/drawing/2014/main" id="{6A914B30-4EB6-4805-9773-1EC500ADCB6C}"/>
+              </a:ext>
+            </a:extLst>
+          </p:cNvPr>
+          <p:cNvPicPr>
+            <a:picLocks noChangeAspect="1"/>
+          </p:cNvPicPr>
+          <p:nvPr/>
+        </p:nvPicPr>
+        <p:blipFill>
+          <a:blip r:embed="rId4">
+            <a:extLst>
+              <a:ext uri="{28A0092B-C50C-407E-A947-70E740481C1C}">
+                <a14:useLocalDpi xmlns:a14="http://schemas.microsoft.com/office/drawing/2010/main" val="0"/>
+              </a:ext>
+            </a:extLst>
+          </a:blip>
+          <a:stretch>
+            <a:fillRect/>
+          </a:stretch>
+        </p:blipFill>
+        <p:spPr>
+          <a:xfrm>
+            <a:off x="1388875" y="6119040"/>
+            <a:ext cx="476190" cy="476190"/>
+          </a:xfrm>
+          <a:prstGeom prst="rect">
+            <a:avLst/>
+          </a:prstGeom>
+        </p:spPr>
+      </p:pic>
+      <p:pic>
+        <p:nvPicPr>
+          <p:cNvPr id="12" name="Picture 11">
+            <a:extLst>
+              <a:ext uri="{FF2B5EF4-FFF2-40B4-BE49-F238E27FC236}">
+                <a16:creationId xmlns:a16="http://schemas.microsoft.com/office/drawing/2014/main" id="{AD78F74E-3885-4DCF-9468-F8A2333ED915}"/>
+              </a:ext>
+            </a:extLst>
+          </p:cNvPr>
+          <p:cNvPicPr>
+            <a:picLocks noChangeAspect="1"/>
+          </p:cNvPicPr>
+          <p:nvPr/>
+        </p:nvPicPr>
+        <p:blipFill>
+          <a:blip r:embed="rId4">
+            <a:extLst>
+              <a:ext uri="{28A0092B-C50C-407E-A947-70E740481C1C}">
+                <a14:useLocalDpi xmlns:a14="http://schemas.microsoft.com/office/drawing/2010/main" val="0"/>
+              </a:ext>
+            </a:extLst>
+          </a:blip>
+          <a:stretch>
+            <a:fillRect/>
+          </a:stretch>
+        </p:blipFill>
+        <p:spPr>
+          <a:xfrm>
+            <a:off x="1939550" y="6130590"/>
+            <a:ext cx="476190" cy="476190"/>
+          </a:xfrm>
+          <a:prstGeom prst="rect">
+            <a:avLst/>
+          </a:prstGeom>
+        </p:spPr>
+      </p:pic>
+      <p:pic>
+        <p:nvPicPr>
+          <p:cNvPr id="14" name="Picture 13">
+            <a:extLst>
+              <a:ext uri="{FF2B5EF4-FFF2-40B4-BE49-F238E27FC236}">
+                <a16:creationId xmlns:a16="http://schemas.microsoft.com/office/drawing/2014/main" id="{80195E36-606D-4D60-B5A8-6C32EF009D63}"/>
+              </a:ext>
+            </a:extLst>
+          </p:cNvPr>
+          <p:cNvPicPr>
+            <a:picLocks noChangeAspect="1"/>
+          </p:cNvPicPr>
+          <p:nvPr/>
+        </p:nvPicPr>
+        <p:blipFill>
+          <a:blip r:embed="rId5">
+            <a:extLst>
+              <a:ext uri="{28A0092B-C50C-407E-A947-70E740481C1C}">
+                <a14:useLocalDpi xmlns:a14="http://schemas.microsoft.com/office/drawing/2010/main" val="0"/>
+              </a:ext>
+            </a:extLst>
+          </a:blip>
+          <a:stretch>
+            <a:fillRect/>
+          </a:stretch>
+        </p:blipFill>
+        <p:spPr>
+          <a:xfrm>
+            <a:off x="9236634" y="5405529"/>
+            <a:ext cx="1338816" cy="1368970"/>
+          </a:xfrm>
+          <a:prstGeom prst="rect">
+            <a:avLst/>
+          </a:prstGeom>
+        </p:spPr>
+      </p:pic>
+      <p:sp>
+        <p:nvSpPr>
+          <p:cNvPr id="13" name="TextBox 12">
+            <a:extLst>
+              <a:ext uri="{FF2B5EF4-FFF2-40B4-BE49-F238E27FC236}">
+                <a16:creationId xmlns:a16="http://schemas.microsoft.com/office/drawing/2014/main" id="{7C507F63-91CA-48E2-8C6E-7C39FACDEFBB}"/>
+              </a:ext>
+            </a:extLst>
+          </p:cNvPr>
+          <p:cNvSpPr txBox="1"/>
+          <p:nvPr/>
+        </p:nvSpPr>
+        <p:spPr>
+          <a:xfrm>
+            <a:off x="3154886" y="6447235"/>
+            <a:ext cx="5937085" cy="246221"/>
+          </a:xfrm>
+          <a:prstGeom prst="rect">
+            <a:avLst/>
+          </a:prstGeom>
+          <a:noFill/>
+        </p:spPr>
+        <p:txBody>
+          <a:bodyPr wrap="square" rtlCol="0">
+            <a:spAutoFit/>
+          </a:bodyPr>
+          <a:lstStyle/>
+          <a:p>
+            <a:pPr algn="r"/>
+            <a:r>
+              <a:rPr lang="en-US" sz="1000" b="0" i="1" dirty="0">
+                <a:solidFill>
+                  <a:srgbClr val="202124"/>
+                </a:solidFill>
+                <a:effectLst/>
+                <a:latin typeface="arial" panose="020B0604020202020204" pitchFamily="34" charset="0"/>
+              </a:rPr>
+              <a:t>The aye-aye is a lemur native to the island of </a:t>
+            </a:r>
+            <a:r>
+              <a:rPr lang="en-US" sz="1000" b="1" i="1" dirty="0">
+                <a:solidFill>
+                  <a:srgbClr val="202124"/>
+                </a:solidFill>
+                <a:effectLst/>
+                <a:latin typeface="arial" panose="020B0604020202020204" pitchFamily="34" charset="0"/>
+              </a:rPr>
+              <a:t>Madagascar</a:t>
+            </a:r>
+            <a:r>
+              <a:rPr lang="en-US" sz="1000" b="0" i="1" dirty="0">
+                <a:solidFill>
+                  <a:srgbClr val="202124"/>
+                </a:solidFill>
+                <a:effectLst/>
+                <a:latin typeface="arial" panose="020B0604020202020204" pitchFamily="34" charset="0"/>
+              </a:rPr>
+              <a:t> and the world's biggest nocturnal primate.</a:t>
+            </a:r>
+            <a:endParaRPr lang="en-US" sz="1000" i="1" dirty="0"/>
+          </a:p>
+        </p:txBody>
+      </p:sp>
+    </p:spTree>
+    <p:extLst>
+      <p:ext uri="{BB962C8B-B14F-4D97-AF65-F5344CB8AC3E}">
+        <p14:creationId xmlns:p14="http://schemas.microsoft.com/office/powerpoint/2010/main" val="2078309450"/>
+      </p:ext>
+    </p:extLst>
+  </p:cSld>
+  <p:clrMapOvr>
+    <a:masterClrMapping/>
+  </p:clrMapOvr>
+</p:sld>
+</file>
+
+<file path=ppt/slides/slide7.xml><?xml version="1.0" encoding="utf-8"?>
+<p:sld xmlns:a="http://schemas.openxmlformats.org/drawingml/2006/main" xmlns:r="http://schemas.openxmlformats.org/officeDocument/2006/relationships" xmlns:p="http://schemas.openxmlformats.org/presentationml/2006/main">
+  <p:cSld>
+    <p:spTree>
+      <p:nvGrpSpPr>
+        <p:cNvPr id="1" name=""/>
+        <p:cNvGrpSpPr/>
+        <p:nvPr/>
+      </p:nvGrpSpPr>
+      <p:grpSpPr>
+        <a:xfrm>
+          <a:off x="0" y="0"/>
+          <a:ext cx="0" cy="0"/>
+          <a:chOff x="0" y="0"/>
+          <a:chExt cx="0" cy="0"/>
+        </a:xfrm>
+      </p:grpSpPr>
+      <p:pic>
+        <p:nvPicPr>
+          <p:cNvPr id="5" name="Picture 4">
+            <a:extLst>
+              <a:ext uri="{FF2B5EF4-FFF2-40B4-BE49-F238E27FC236}">
+                <a16:creationId xmlns:a16="http://schemas.microsoft.com/office/drawing/2014/main" id="{4E1D6A53-CCB1-448E-B73A-C24A6B7FA7F5}"/>
+              </a:ext>
+            </a:extLst>
+          </p:cNvPr>
+          <p:cNvPicPr>
+            <a:picLocks noChangeAspect="1"/>
+          </p:cNvPicPr>
+          <p:nvPr/>
+        </p:nvPicPr>
+        <p:blipFill>
+          <a:blip r:embed="rId2">
+            <a:extLst>
+              <a:ext uri="{28A0092B-C50C-407E-A947-70E740481C1C}">
+                <a14:useLocalDpi xmlns:a14="http://schemas.microsoft.com/office/drawing/2010/main" val="0"/>
+              </a:ext>
+            </a:extLst>
+          </a:blip>
+          <a:stretch>
+            <a:fillRect/>
+          </a:stretch>
+        </p:blipFill>
+        <p:spPr>
+          <a:xfrm rot="16200000">
+            <a:off x="-2711636" y="3002718"/>
+            <a:ext cx="6591625" cy="1026863"/>
+          </a:xfrm>
+          <a:prstGeom prst="rect">
+            <a:avLst/>
+          </a:prstGeom>
+        </p:spPr>
+      </p:pic>
+      <p:sp>
+        <p:nvSpPr>
+          <p:cNvPr id="2" name="Title 1">
+            <a:extLst>
+              <a:ext uri="{FF2B5EF4-FFF2-40B4-BE49-F238E27FC236}">
+                <a16:creationId xmlns:a16="http://schemas.microsoft.com/office/drawing/2014/main" id="{B78BD6CC-06EC-41F0-A49E-9914B3569BBB}"/>
+              </a:ext>
+            </a:extLst>
+          </p:cNvPr>
+          <p:cNvSpPr>
+            <a:spLocks noGrp="1"/>
+          </p:cNvSpPr>
+          <p:nvPr>
+            <p:ph type="title"/>
+          </p:nvPr>
+        </p:nvSpPr>
+        <p:spPr/>
+        <p:txBody>
+          <a:bodyPr>
+            <a:normAutofit/>
+          </a:bodyPr>
+          <a:lstStyle/>
+          <a:p>
+            <a:r>
+              <a:rPr lang="en-US" sz="4800" b="1" dirty="0">
+                <a:solidFill>
+                  <a:srgbClr val="777777"/>
+                </a:solidFill>
+              </a:rPr>
+              <a:t>Data Analysis</a:t>
+            </a:r>
+          </a:p>
+        </p:txBody>
+      </p:sp>
+      <p:pic>
+        <p:nvPicPr>
+          <p:cNvPr id="7" name="Picture 6">
+            <a:extLst>
+              <a:ext uri="{FF2B5EF4-FFF2-40B4-BE49-F238E27FC236}">
+                <a16:creationId xmlns:a16="http://schemas.microsoft.com/office/drawing/2014/main" id="{31756008-26B5-498C-B4BB-EDA072BEC72A}"/>
+              </a:ext>
+            </a:extLst>
+          </p:cNvPr>
+          <p:cNvPicPr>
+            <a:picLocks noChangeAspect="1"/>
+          </p:cNvPicPr>
+          <p:nvPr/>
+        </p:nvPicPr>
+        <p:blipFill>
+          <a:blip r:embed="rId2">
+            <a:extLst>
+              <a:ext uri="{28A0092B-C50C-407E-A947-70E740481C1C}">
+                <a14:useLocalDpi xmlns:a14="http://schemas.microsoft.com/office/drawing/2010/main" val="0"/>
+              </a:ext>
+            </a:extLst>
+          </a:blip>
+          <a:stretch>
+            <a:fillRect/>
+          </a:stretch>
+        </p:blipFill>
+        <p:spPr>
+          <a:xfrm>
+            <a:off x="650232" y="262770"/>
+            <a:ext cx="4137525" cy="476190"/>
+          </a:xfrm>
+          <a:prstGeom prst="rect">
+            <a:avLst/>
+          </a:prstGeom>
+        </p:spPr>
+      </p:pic>
+      <p:pic>
+        <p:nvPicPr>
+          <p:cNvPr id="8" name="Picture 7">
+            <a:extLst>
+              <a:ext uri="{FF2B5EF4-FFF2-40B4-BE49-F238E27FC236}">
+                <a16:creationId xmlns:a16="http://schemas.microsoft.com/office/drawing/2014/main" id="{41B0AE2E-BC4F-4A32-96E8-B504B231A753}"/>
+              </a:ext>
+            </a:extLst>
+          </p:cNvPr>
+          <p:cNvPicPr>
+            <a:picLocks noChangeAspect="1"/>
+          </p:cNvPicPr>
+          <p:nvPr/>
+        </p:nvPicPr>
+        <p:blipFill>
+          <a:blip r:embed="rId3">
+            <a:extLst>
+              <a:ext uri="{28A0092B-C50C-407E-A947-70E740481C1C}">
+                <a14:useLocalDpi xmlns:a14="http://schemas.microsoft.com/office/drawing/2010/main" val="0"/>
+              </a:ext>
+            </a:extLst>
+          </a:blip>
+          <a:stretch>
+            <a:fillRect/>
+          </a:stretch>
+        </p:blipFill>
+        <p:spPr>
+          <a:xfrm>
+            <a:off x="9037115" y="5803809"/>
+            <a:ext cx="3154334" cy="1051444"/>
+          </a:xfrm>
+          <a:prstGeom prst="rect">
+            <a:avLst/>
+          </a:prstGeom>
+        </p:spPr>
+      </p:pic>
+      <p:sp>
+        <p:nvSpPr>
+          <p:cNvPr id="10" name="Content Placeholder 2">
+            <a:extLst>
+              <a:ext uri="{FF2B5EF4-FFF2-40B4-BE49-F238E27FC236}">
+                <a16:creationId xmlns:a16="http://schemas.microsoft.com/office/drawing/2014/main" id="{1C9D4C57-2F9A-43AE-8677-9502474D110C}"/>
+              </a:ext>
+            </a:extLst>
+          </p:cNvPr>
+          <p:cNvSpPr>
+            <a:spLocks noGrp="1"/>
+          </p:cNvSpPr>
+          <p:nvPr>
+            <p:ph idx="1"/>
+          </p:nvPr>
+        </p:nvSpPr>
+        <p:spPr>
+          <a:xfrm>
+            <a:off x="838200" y="1452471"/>
+            <a:ext cx="10515600" cy="4351338"/>
+          </a:xfrm>
+        </p:spPr>
+        <p:txBody>
+          <a:bodyPr>
+            <a:normAutofit/>
+          </a:bodyPr>
+          <a:lstStyle/>
+          <a:p>
+            <a:pPr marL="457200" lvl="1" indent="0">
+              <a:buNone/>
+            </a:pPr>
+            <a:endParaRPr lang="en-US" dirty="0">
+              <a:solidFill>
+                <a:srgbClr val="777777"/>
+              </a:solidFill>
+            </a:endParaRPr>
+          </a:p>
+          <a:p>
             <a:pPr lvl="1"/>
             <a:endParaRPr lang="en-US" dirty="0">
               <a:solidFill>
@@ -4740,36 +7267,6 @@
             </a:endParaRPr>
           </a:p>
           <a:p>
-            <a:r>
-              <a:rPr lang="en-US" dirty="0">
-                <a:solidFill>
-                  <a:srgbClr val="777777"/>
-                </a:solidFill>
-              </a:rPr>
-              <a:t>Tableau</a:t>
-            </a:r>
-          </a:p>
-          <a:p>
-            <a:r>
-              <a:rPr lang="en-US" dirty="0">
-                <a:solidFill>
-                  <a:srgbClr val="777777"/>
-                </a:solidFill>
-              </a:rPr>
-              <a:t>JavaScript</a:t>
-            </a:r>
-          </a:p>
-          <a:p>
-            <a:r>
-              <a:rPr lang="en-US" dirty="0">
-                <a:solidFill>
-                  <a:srgbClr val="777777"/>
-                </a:solidFill>
-              </a:rPr>
-              <a:t>Python</a:t>
-            </a:r>
-          </a:p>
-          <a:p>
             <a:endParaRPr lang="en-US" sz="3500" dirty="0">
               <a:solidFill>
                 <a:srgbClr val="777777"/>
@@ -4799,10 +7296,1206 @@
           </a:p>
         </p:txBody>
       </p:sp>
+      <p:pic>
+        <p:nvPicPr>
+          <p:cNvPr id="9" name="Picture 8">
+            <a:extLst>
+              <a:ext uri="{FF2B5EF4-FFF2-40B4-BE49-F238E27FC236}">
+                <a16:creationId xmlns:a16="http://schemas.microsoft.com/office/drawing/2014/main" id="{53554AA0-9657-46C8-BC8A-EF6404AD3D89}"/>
+              </a:ext>
+            </a:extLst>
+          </p:cNvPr>
+          <p:cNvPicPr>
+            <a:picLocks noChangeAspect="1"/>
+          </p:cNvPicPr>
+          <p:nvPr/>
+        </p:nvPicPr>
+        <p:blipFill>
+          <a:blip r:embed="rId4">
+            <a:extLst>
+              <a:ext uri="{28A0092B-C50C-407E-A947-70E740481C1C}">
+                <a14:useLocalDpi xmlns:a14="http://schemas.microsoft.com/office/drawing/2010/main" val="0"/>
+              </a:ext>
+            </a:extLst>
+          </a:blip>
+          <a:stretch>
+            <a:fillRect/>
+          </a:stretch>
+        </p:blipFill>
+        <p:spPr>
+          <a:xfrm>
+            <a:off x="838200" y="6119040"/>
+            <a:ext cx="476190" cy="476190"/>
+          </a:xfrm>
+          <a:prstGeom prst="rect">
+            <a:avLst/>
+          </a:prstGeom>
+        </p:spPr>
+      </p:pic>
+      <p:pic>
+        <p:nvPicPr>
+          <p:cNvPr id="11" name="Picture 10">
+            <a:extLst>
+              <a:ext uri="{FF2B5EF4-FFF2-40B4-BE49-F238E27FC236}">
+                <a16:creationId xmlns:a16="http://schemas.microsoft.com/office/drawing/2014/main" id="{6A914B30-4EB6-4805-9773-1EC500ADCB6C}"/>
+              </a:ext>
+            </a:extLst>
+          </p:cNvPr>
+          <p:cNvPicPr>
+            <a:picLocks noChangeAspect="1"/>
+          </p:cNvPicPr>
+          <p:nvPr/>
+        </p:nvPicPr>
+        <p:blipFill>
+          <a:blip r:embed="rId4">
+            <a:extLst>
+              <a:ext uri="{28A0092B-C50C-407E-A947-70E740481C1C}">
+                <a14:useLocalDpi xmlns:a14="http://schemas.microsoft.com/office/drawing/2010/main" val="0"/>
+              </a:ext>
+            </a:extLst>
+          </a:blip>
+          <a:stretch>
+            <a:fillRect/>
+          </a:stretch>
+        </p:blipFill>
+        <p:spPr>
+          <a:xfrm>
+            <a:off x="1388875" y="6119040"/>
+            <a:ext cx="476190" cy="476190"/>
+          </a:xfrm>
+          <a:prstGeom prst="rect">
+            <a:avLst/>
+          </a:prstGeom>
+        </p:spPr>
+      </p:pic>
+      <p:pic>
+        <p:nvPicPr>
+          <p:cNvPr id="12" name="Picture 11">
+            <a:extLst>
+              <a:ext uri="{FF2B5EF4-FFF2-40B4-BE49-F238E27FC236}">
+                <a16:creationId xmlns:a16="http://schemas.microsoft.com/office/drawing/2014/main" id="{AD78F74E-3885-4DCF-9468-F8A2333ED915}"/>
+              </a:ext>
+            </a:extLst>
+          </p:cNvPr>
+          <p:cNvPicPr>
+            <a:picLocks noChangeAspect="1"/>
+          </p:cNvPicPr>
+          <p:nvPr/>
+        </p:nvPicPr>
+        <p:blipFill>
+          <a:blip r:embed="rId4">
+            <a:extLst>
+              <a:ext uri="{28A0092B-C50C-407E-A947-70E740481C1C}">
+                <a14:useLocalDpi xmlns:a14="http://schemas.microsoft.com/office/drawing/2010/main" val="0"/>
+              </a:ext>
+            </a:extLst>
+          </a:blip>
+          <a:stretch>
+            <a:fillRect/>
+          </a:stretch>
+        </p:blipFill>
+        <p:spPr>
+          <a:xfrm>
+            <a:off x="1939550" y="6130590"/>
+            <a:ext cx="476190" cy="476190"/>
+          </a:xfrm>
+          <a:prstGeom prst="rect">
+            <a:avLst/>
+          </a:prstGeom>
+        </p:spPr>
+      </p:pic>
+      <p:pic>
+        <p:nvPicPr>
+          <p:cNvPr id="6" name="Picture 5">
+            <a:extLst>
+              <a:ext uri="{FF2B5EF4-FFF2-40B4-BE49-F238E27FC236}">
+                <a16:creationId xmlns:a16="http://schemas.microsoft.com/office/drawing/2014/main" id="{3EB0DFE4-E805-4595-A0BA-37B7E69DEE3C}"/>
+              </a:ext>
+            </a:extLst>
+          </p:cNvPr>
+          <p:cNvPicPr>
+            <a:picLocks noChangeAspect="1"/>
+          </p:cNvPicPr>
+          <p:nvPr/>
+        </p:nvPicPr>
+        <p:blipFill>
+          <a:blip r:embed="rId5">
+            <a:extLst>
+              <a:ext uri="{28A0092B-C50C-407E-A947-70E740481C1C}">
+                <a14:useLocalDpi xmlns:a14="http://schemas.microsoft.com/office/drawing/2010/main" val="0"/>
+              </a:ext>
+            </a:extLst>
+          </a:blip>
+          <a:stretch>
+            <a:fillRect/>
+          </a:stretch>
+        </p:blipFill>
+        <p:spPr>
+          <a:xfrm>
+            <a:off x="9062408" y="5468075"/>
+            <a:ext cx="1484326" cy="1301930"/>
+          </a:xfrm>
+          <a:prstGeom prst="rect">
+            <a:avLst/>
+          </a:prstGeom>
+        </p:spPr>
+      </p:pic>
+      <p:sp>
+        <p:nvSpPr>
+          <p:cNvPr id="13" name="TextBox 12">
+            <a:extLst>
+              <a:ext uri="{FF2B5EF4-FFF2-40B4-BE49-F238E27FC236}">
+                <a16:creationId xmlns:a16="http://schemas.microsoft.com/office/drawing/2014/main" id="{EE4FE1DD-028C-4778-BF5E-5A83C89F4C51}"/>
+              </a:ext>
+            </a:extLst>
+          </p:cNvPr>
+          <p:cNvSpPr txBox="1"/>
+          <p:nvPr/>
+        </p:nvSpPr>
+        <p:spPr>
+          <a:xfrm>
+            <a:off x="3154886" y="6213020"/>
+            <a:ext cx="5937085" cy="400110"/>
+          </a:xfrm>
+          <a:prstGeom prst="rect">
+            <a:avLst/>
+          </a:prstGeom>
+          <a:noFill/>
+        </p:spPr>
+        <p:txBody>
+          <a:bodyPr wrap="square" rtlCol="0">
+            <a:spAutoFit/>
+          </a:bodyPr>
+          <a:lstStyle/>
+          <a:p>
+            <a:pPr algn="r"/>
+            <a:r>
+              <a:rPr lang="en-US" sz="1000" b="1" i="1" dirty="0">
+                <a:solidFill>
+                  <a:srgbClr val="202124"/>
+                </a:solidFill>
+                <a:effectLst/>
+                <a:latin typeface="Roboto"/>
+              </a:rPr>
+              <a:t>Aye</a:t>
+            </a:r>
+            <a:r>
+              <a:rPr lang="en-US" sz="1000" b="0" i="1" dirty="0">
+                <a:solidFill>
+                  <a:srgbClr val="202124"/>
+                </a:solidFill>
+                <a:effectLst/>
+                <a:latin typeface="Roboto"/>
+              </a:rPr>
+              <a:t>-</a:t>
+            </a:r>
+            <a:r>
+              <a:rPr lang="en-US" sz="1000" b="1" i="1" dirty="0">
+                <a:solidFill>
+                  <a:srgbClr val="202124"/>
+                </a:solidFill>
+                <a:effectLst/>
+                <a:latin typeface="Roboto"/>
+              </a:rPr>
+              <a:t>ayes</a:t>
+            </a:r>
+            <a:r>
+              <a:rPr lang="en-US" sz="1000" b="0" i="1" dirty="0">
+                <a:solidFill>
+                  <a:srgbClr val="202124"/>
+                </a:solidFill>
+                <a:effectLst/>
+                <a:latin typeface="Roboto"/>
+              </a:rPr>
+              <a:t> are the only primates thought to use echolocation to find prey. </a:t>
+            </a:r>
+            <a:r>
+              <a:rPr lang="en-US" sz="1000" b="1" i="1" dirty="0">
+                <a:solidFill>
+                  <a:srgbClr val="202124"/>
+                </a:solidFill>
+                <a:effectLst/>
+                <a:latin typeface="Roboto"/>
+              </a:rPr>
+              <a:t>Aye</a:t>
+            </a:r>
+            <a:r>
+              <a:rPr lang="en-US" sz="1000" b="0" i="1" dirty="0">
+                <a:solidFill>
+                  <a:srgbClr val="202124"/>
+                </a:solidFill>
+                <a:effectLst/>
+                <a:latin typeface="Roboto"/>
+              </a:rPr>
+              <a:t>-</a:t>
+            </a:r>
+            <a:r>
+              <a:rPr lang="en-US" sz="1000" b="1" i="1" dirty="0">
+                <a:solidFill>
+                  <a:srgbClr val="202124"/>
+                </a:solidFill>
+                <a:effectLst/>
+                <a:latin typeface="Roboto"/>
+              </a:rPr>
+              <a:t>ayes</a:t>
+            </a:r>
+            <a:r>
+              <a:rPr lang="en-US" sz="1000" b="0" i="1" dirty="0">
+                <a:solidFill>
+                  <a:srgbClr val="202124"/>
+                </a:solidFill>
+                <a:effectLst/>
+                <a:latin typeface="Roboto"/>
+              </a:rPr>
+              <a:t> tap </a:t>
+            </a:r>
+            <a:r>
+              <a:rPr lang="en-US" sz="1000" b="1" i="1" dirty="0">
+                <a:solidFill>
+                  <a:srgbClr val="202124"/>
+                </a:solidFill>
+                <a:effectLst/>
+                <a:latin typeface="Roboto"/>
+              </a:rPr>
+              <a:t>a long</a:t>
+            </a:r>
+            <a:r>
+              <a:rPr lang="en-US" sz="1000" b="0" i="1" dirty="0">
+                <a:solidFill>
+                  <a:srgbClr val="202124"/>
+                </a:solidFill>
+                <a:effectLst/>
+                <a:latin typeface="Roboto"/>
+              </a:rPr>
+              <a:t> finger on tree bark, feeling for the vibrations of insect larvae.</a:t>
+            </a:r>
+            <a:endParaRPr lang="en-US" sz="1000" i="1" dirty="0"/>
+          </a:p>
+        </p:txBody>
+      </p:sp>
     </p:spTree>
     <p:extLst>
       <p:ext uri="{BB962C8B-B14F-4D97-AF65-F5344CB8AC3E}">
-        <p14:creationId xmlns:p14="http://schemas.microsoft.com/office/powerpoint/2010/main" val="4037639536"/>
+        <p14:creationId xmlns:p14="http://schemas.microsoft.com/office/powerpoint/2010/main" val="2249013987"/>
+      </p:ext>
+    </p:extLst>
+  </p:cSld>
+  <p:clrMapOvr>
+    <a:masterClrMapping/>
+  </p:clrMapOvr>
+</p:sld>
+</file>
+
+<file path=ppt/slides/slide8.xml><?xml version="1.0" encoding="utf-8"?>
+<p:sld xmlns:a="http://schemas.openxmlformats.org/drawingml/2006/main" xmlns:r="http://schemas.openxmlformats.org/officeDocument/2006/relationships" xmlns:p="http://schemas.openxmlformats.org/presentationml/2006/main">
+  <p:cSld>
+    <p:spTree>
+      <p:nvGrpSpPr>
+        <p:cNvPr id="1" name=""/>
+        <p:cNvGrpSpPr/>
+        <p:nvPr/>
+      </p:nvGrpSpPr>
+      <p:grpSpPr>
+        <a:xfrm>
+          <a:off x="0" y="0"/>
+          <a:ext cx="0" cy="0"/>
+          <a:chOff x="0" y="0"/>
+          <a:chExt cx="0" cy="0"/>
+        </a:xfrm>
+      </p:grpSpPr>
+      <p:pic>
+        <p:nvPicPr>
+          <p:cNvPr id="5" name="Picture 4">
+            <a:extLst>
+              <a:ext uri="{FF2B5EF4-FFF2-40B4-BE49-F238E27FC236}">
+                <a16:creationId xmlns:a16="http://schemas.microsoft.com/office/drawing/2014/main" id="{4E1D6A53-CCB1-448E-B73A-C24A6B7FA7F5}"/>
+              </a:ext>
+            </a:extLst>
+          </p:cNvPr>
+          <p:cNvPicPr>
+            <a:picLocks noChangeAspect="1"/>
+          </p:cNvPicPr>
+          <p:nvPr/>
+        </p:nvPicPr>
+        <p:blipFill>
+          <a:blip r:embed="rId2">
+            <a:extLst>
+              <a:ext uri="{28A0092B-C50C-407E-A947-70E740481C1C}">
+                <a14:useLocalDpi xmlns:a14="http://schemas.microsoft.com/office/drawing/2010/main" val="0"/>
+              </a:ext>
+            </a:extLst>
+          </a:blip>
+          <a:stretch>
+            <a:fillRect/>
+          </a:stretch>
+        </p:blipFill>
+        <p:spPr>
+          <a:xfrm rot="16200000">
+            <a:off x="-2711636" y="3002718"/>
+            <a:ext cx="6591625" cy="1026863"/>
+          </a:xfrm>
+          <a:prstGeom prst="rect">
+            <a:avLst/>
+          </a:prstGeom>
+        </p:spPr>
+      </p:pic>
+      <p:sp>
+        <p:nvSpPr>
+          <p:cNvPr id="2" name="Title 1">
+            <a:extLst>
+              <a:ext uri="{FF2B5EF4-FFF2-40B4-BE49-F238E27FC236}">
+                <a16:creationId xmlns:a16="http://schemas.microsoft.com/office/drawing/2014/main" id="{B78BD6CC-06EC-41F0-A49E-9914B3569BBB}"/>
+              </a:ext>
+            </a:extLst>
+          </p:cNvPr>
+          <p:cNvSpPr>
+            <a:spLocks noGrp="1"/>
+          </p:cNvSpPr>
+          <p:nvPr>
+            <p:ph type="title"/>
+          </p:nvPr>
+        </p:nvSpPr>
+        <p:spPr/>
+        <p:txBody>
+          <a:bodyPr>
+            <a:normAutofit/>
+          </a:bodyPr>
+          <a:lstStyle/>
+          <a:p>
+            <a:r>
+              <a:rPr lang="en-US" sz="4800" b="1" dirty="0">
+                <a:solidFill>
+                  <a:srgbClr val="777777"/>
+                </a:solidFill>
+              </a:rPr>
+              <a:t>Machine Learning</a:t>
+            </a:r>
+          </a:p>
+        </p:txBody>
+      </p:sp>
+      <p:pic>
+        <p:nvPicPr>
+          <p:cNvPr id="7" name="Picture 6">
+            <a:extLst>
+              <a:ext uri="{FF2B5EF4-FFF2-40B4-BE49-F238E27FC236}">
+                <a16:creationId xmlns:a16="http://schemas.microsoft.com/office/drawing/2014/main" id="{31756008-26B5-498C-B4BB-EDA072BEC72A}"/>
+              </a:ext>
+            </a:extLst>
+          </p:cNvPr>
+          <p:cNvPicPr>
+            <a:picLocks noChangeAspect="1"/>
+          </p:cNvPicPr>
+          <p:nvPr/>
+        </p:nvPicPr>
+        <p:blipFill>
+          <a:blip r:embed="rId2">
+            <a:extLst>
+              <a:ext uri="{28A0092B-C50C-407E-A947-70E740481C1C}">
+                <a14:useLocalDpi xmlns:a14="http://schemas.microsoft.com/office/drawing/2010/main" val="0"/>
+              </a:ext>
+            </a:extLst>
+          </a:blip>
+          <a:stretch>
+            <a:fillRect/>
+          </a:stretch>
+        </p:blipFill>
+        <p:spPr>
+          <a:xfrm>
+            <a:off x="650232" y="262770"/>
+            <a:ext cx="4137525" cy="476190"/>
+          </a:xfrm>
+          <a:prstGeom prst="rect">
+            <a:avLst/>
+          </a:prstGeom>
+        </p:spPr>
+      </p:pic>
+      <p:pic>
+        <p:nvPicPr>
+          <p:cNvPr id="8" name="Picture 7">
+            <a:extLst>
+              <a:ext uri="{FF2B5EF4-FFF2-40B4-BE49-F238E27FC236}">
+                <a16:creationId xmlns:a16="http://schemas.microsoft.com/office/drawing/2014/main" id="{41B0AE2E-BC4F-4A32-96E8-B504B231A753}"/>
+              </a:ext>
+            </a:extLst>
+          </p:cNvPr>
+          <p:cNvPicPr>
+            <a:picLocks noChangeAspect="1"/>
+          </p:cNvPicPr>
+          <p:nvPr/>
+        </p:nvPicPr>
+        <p:blipFill>
+          <a:blip r:embed="rId3">
+            <a:extLst>
+              <a:ext uri="{28A0092B-C50C-407E-A947-70E740481C1C}">
+                <a14:useLocalDpi xmlns:a14="http://schemas.microsoft.com/office/drawing/2010/main" val="0"/>
+              </a:ext>
+            </a:extLst>
+          </a:blip>
+          <a:stretch>
+            <a:fillRect/>
+          </a:stretch>
+        </p:blipFill>
+        <p:spPr>
+          <a:xfrm>
+            <a:off x="9037115" y="5803809"/>
+            <a:ext cx="3154334" cy="1051444"/>
+          </a:xfrm>
+          <a:prstGeom prst="rect">
+            <a:avLst/>
+          </a:prstGeom>
+        </p:spPr>
+      </p:pic>
+      <p:sp>
+        <p:nvSpPr>
+          <p:cNvPr id="10" name="Content Placeholder 2">
+            <a:extLst>
+              <a:ext uri="{FF2B5EF4-FFF2-40B4-BE49-F238E27FC236}">
+                <a16:creationId xmlns:a16="http://schemas.microsoft.com/office/drawing/2014/main" id="{1C9D4C57-2F9A-43AE-8677-9502474D110C}"/>
+              </a:ext>
+            </a:extLst>
+          </p:cNvPr>
+          <p:cNvSpPr>
+            <a:spLocks noGrp="1"/>
+          </p:cNvSpPr>
+          <p:nvPr>
+            <p:ph idx="1"/>
+          </p:nvPr>
+        </p:nvSpPr>
+        <p:spPr>
+          <a:xfrm>
+            <a:off x="838200" y="1452471"/>
+            <a:ext cx="10515600" cy="4351338"/>
+          </a:xfrm>
+        </p:spPr>
+        <p:txBody>
+          <a:bodyPr>
+            <a:normAutofit/>
+          </a:bodyPr>
+          <a:lstStyle/>
+          <a:p>
+            <a:pPr marL="457200" lvl="1" indent="0">
+              <a:buNone/>
+            </a:pPr>
+            <a:endParaRPr lang="en-US" dirty="0">
+              <a:solidFill>
+                <a:srgbClr val="777777"/>
+              </a:solidFill>
+            </a:endParaRPr>
+          </a:p>
+          <a:p>
+            <a:pPr lvl="1"/>
+            <a:endParaRPr lang="en-US" dirty="0">
+              <a:solidFill>
+                <a:srgbClr val="777777"/>
+              </a:solidFill>
+            </a:endParaRPr>
+          </a:p>
+          <a:p>
+            <a:endParaRPr lang="en-US" sz="3500" dirty="0">
+              <a:solidFill>
+                <a:srgbClr val="777777"/>
+              </a:solidFill>
+            </a:endParaRPr>
+          </a:p>
+          <a:p>
+            <a:endParaRPr lang="en-US" sz="3500" dirty="0">
+              <a:solidFill>
+                <a:srgbClr val="777777"/>
+              </a:solidFill>
+            </a:endParaRPr>
+          </a:p>
+          <a:p>
+            <a:endParaRPr lang="en-US" dirty="0">
+              <a:solidFill>
+                <a:srgbClr val="777777"/>
+              </a:solidFill>
+            </a:endParaRPr>
+          </a:p>
+          <a:p>
+            <a:endParaRPr lang="en-US" dirty="0">
+              <a:solidFill>
+                <a:srgbClr val="777777"/>
+              </a:solidFill>
+            </a:endParaRPr>
+          </a:p>
+        </p:txBody>
+      </p:sp>
+      <p:pic>
+        <p:nvPicPr>
+          <p:cNvPr id="9" name="Picture 8">
+            <a:extLst>
+              <a:ext uri="{FF2B5EF4-FFF2-40B4-BE49-F238E27FC236}">
+                <a16:creationId xmlns:a16="http://schemas.microsoft.com/office/drawing/2014/main" id="{53554AA0-9657-46C8-BC8A-EF6404AD3D89}"/>
+              </a:ext>
+            </a:extLst>
+          </p:cNvPr>
+          <p:cNvPicPr>
+            <a:picLocks noChangeAspect="1"/>
+          </p:cNvPicPr>
+          <p:nvPr/>
+        </p:nvPicPr>
+        <p:blipFill>
+          <a:blip r:embed="rId4">
+            <a:extLst>
+              <a:ext uri="{28A0092B-C50C-407E-A947-70E740481C1C}">
+                <a14:useLocalDpi xmlns:a14="http://schemas.microsoft.com/office/drawing/2010/main" val="0"/>
+              </a:ext>
+            </a:extLst>
+          </a:blip>
+          <a:stretch>
+            <a:fillRect/>
+          </a:stretch>
+        </p:blipFill>
+        <p:spPr>
+          <a:xfrm>
+            <a:off x="838200" y="6119040"/>
+            <a:ext cx="476190" cy="476190"/>
+          </a:xfrm>
+          <a:prstGeom prst="rect">
+            <a:avLst/>
+          </a:prstGeom>
+        </p:spPr>
+      </p:pic>
+      <p:pic>
+        <p:nvPicPr>
+          <p:cNvPr id="11" name="Picture 10">
+            <a:extLst>
+              <a:ext uri="{FF2B5EF4-FFF2-40B4-BE49-F238E27FC236}">
+                <a16:creationId xmlns:a16="http://schemas.microsoft.com/office/drawing/2014/main" id="{6A914B30-4EB6-4805-9773-1EC500ADCB6C}"/>
+              </a:ext>
+            </a:extLst>
+          </p:cNvPr>
+          <p:cNvPicPr>
+            <a:picLocks noChangeAspect="1"/>
+          </p:cNvPicPr>
+          <p:nvPr/>
+        </p:nvPicPr>
+        <p:blipFill>
+          <a:blip r:embed="rId4">
+            <a:extLst>
+              <a:ext uri="{28A0092B-C50C-407E-A947-70E740481C1C}">
+                <a14:useLocalDpi xmlns:a14="http://schemas.microsoft.com/office/drawing/2010/main" val="0"/>
+              </a:ext>
+            </a:extLst>
+          </a:blip>
+          <a:stretch>
+            <a:fillRect/>
+          </a:stretch>
+        </p:blipFill>
+        <p:spPr>
+          <a:xfrm>
+            <a:off x="1388875" y="6119040"/>
+            <a:ext cx="476190" cy="476190"/>
+          </a:xfrm>
+          <a:prstGeom prst="rect">
+            <a:avLst/>
+          </a:prstGeom>
+        </p:spPr>
+      </p:pic>
+      <p:pic>
+        <p:nvPicPr>
+          <p:cNvPr id="12" name="Picture 11">
+            <a:extLst>
+              <a:ext uri="{FF2B5EF4-FFF2-40B4-BE49-F238E27FC236}">
+                <a16:creationId xmlns:a16="http://schemas.microsoft.com/office/drawing/2014/main" id="{AD78F74E-3885-4DCF-9468-F8A2333ED915}"/>
+              </a:ext>
+            </a:extLst>
+          </p:cNvPr>
+          <p:cNvPicPr>
+            <a:picLocks noChangeAspect="1"/>
+          </p:cNvPicPr>
+          <p:nvPr/>
+        </p:nvPicPr>
+        <p:blipFill>
+          <a:blip r:embed="rId4">
+            <a:extLst>
+              <a:ext uri="{28A0092B-C50C-407E-A947-70E740481C1C}">
+                <a14:useLocalDpi xmlns:a14="http://schemas.microsoft.com/office/drawing/2010/main" val="0"/>
+              </a:ext>
+            </a:extLst>
+          </a:blip>
+          <a:stretch>
+            <a:fillRect/>
+          </a:stretch>
+        </p:blipFill>
+        <p:spPr>
+          <a:xfrm>
+            <a:off x="1939550" y="6130590"/>
+            <a:ext cx="476190" cy="476190"/>
+          </a:xfrm>
+          <a:prstGeom prst="rect">
+            <a:avLst/>
+          </a:prstGeom>
+        </p:spPr>
+      </p:pic>
+      <p:pic>
+        <p:nvPicPr>
+          <p:cNvPr id="13" name="Picture 12">
+            <a:extLst>
+              <a:ext uri="{FF2B5EF4-FFF2-40B4-BE49-F238E27FC236}">
+                <a16:creationId xmlns:a16="http://schemas.microsoft.com/office/drawing/2014/main" id="{9F711F4C-722D-4ACF-B23D-7245E23C642C}"/>
+              </a:ext>
+            </a:extLst>
+          </p:cNvPr>
+          <p:cNvPicPr>
+            <a:picLocks noChangeAspect="1"/>
+          </p:cNvPicPr>
+          <p:nvPr/>
+        </p:nvPicPr>
+        <p:blipFill>
+          <a:blip r:embed="rId5">
+            <a:extLst>
+              <a:ext uri="{28A0092B-C50C-407E-A947-70E740481C1C}">
+                <a14:useLocalDpi xmlns:a14="http://schemas.microsoft.com/office/drawing/2010/main" val="0"/>
+              </a:ext>
+            </a:extLst>
+          </a:blip>
+          <a:stretch>
+            <a:fillRect/>
+          </a:stretch>
+        </p:blipFill>
+        <p:spPr>
+          <a:xfrm>
+            <a:off x="8971099" y="5641740"/>
+            <a:ext cx="1613296" cy="1097278"/>
+          </a:xfrm>
+          <a:prstGeom prst="rect">
+            <a:avLst/>
+          </a:prstGeom>
+        </p:spPr>
+      </p:pic>
+      <p:sp>
+        <p:nvSpPr>
+          <p:cNvPr id="14" name="TextBox 13">
+            <a:extLst>
+              <a:ext uri="{FF2B5EF4-FFF2-40B4-BE49-F238E27FC236}">
+                <a16:creationId xmlns:a16="http://schemas.microsoft.com/office/drawing/2014/main" id="{BE6B62DC-CA7A-4FE1-BC66-A9198C476579}"/>
+              </a:ext>
+            </a:extLst>
+          </p:cNvPr>
+          <p:cNvSpPr txBox="1"/>
+          <p:nvPr/>
+        </p:nvSpPr>
+        <p:spPr>
+          <a:xfrm>
+            <a:off x="2964386" y="6213020"/>
+            <a:ext cx="5937085" cy="400110"/>
+          </a:xfrm>
+          <a:prstGeom prst="rect">
+            <a:avLst/>
+          </a:prstGeom>
+          <a:noFill/>
+        </p:spPr>
+        <p:txBody>
+          <a:bodyPr wrap="square" rtlCol="0">
+            <a:spAutoFit/>
+          </a:bodyPr>
+          <a:lstStyle/>
+          <a:p>
+            <a:pPr algn="r"/>
+            <a:r>
+              <a:rPr lang="en-US" sz="1000" b="0" i="1" dirty="0">
+                <a:solidFill>
+                  <a:srgbClr val="202124"/>
+                </a:solidFill>
+                <a:effectLst/>
+                <a:latin typeface="Roboto"/>
+              </a:rPr>
+              <a:t>The </a:t>
+            </a:r>
+            <a:r>
+              <a:rPr lang="en-US" sz="1000" b="1" i="1" dirty="0">
+                <a:solidFill>
+                  <a:srgbClr val="202124"/>
+                </a:solidFill>
+                <a:effectLst/>
+                <a:latin typeface="Roboto"/>
+              </a:rPr>
+              <a:t>aye</a:t>
+            </a:r>
+            <a:r>
+              <a:rPr lang="en-US" sz="1000" b="0" i="1" dirty="0">
+                <a:solidFill>
+                  <a:srgbClr val="202124"/>
+                </a:solidFill>
+                <a:effectLst/>
+                <a:latin typeface="Roboto"/>
+              </a:rPr>
+              <a:t>-</a:t>
+            </a:r>
+            <a:r>
+              <a:rPr lang="en-US" sz="1000" b="1" i="1" dirty="0">
+                <a:solidFill>
+                  <a:srgbClr val="202124"/>
+                </a:solidFill>
+                <a:effectLst/>
+                <a:latin typeface="Roboto"/>
+              </a:rPr>
+              <a:t>aye</a:t>
+            </a:r>
+            <a:r>
+              <a:rPr lang="en-US" sz="1000" b="0" i="1" dirty="0">
+                <a:solidFill>
+                  <a:srgbClr val="202124"/>
+                </a:solidFill>
+                <a:effectLst/>
+                <a:latin typeface="Roboto"/>
+              </a:rPr>
+              <a:t> is often viewed as a harbinger of evil and </a:t>
+            </a:r>
+            <a:r>
+              <a:rPr lang="en-US" sz="1000" b="1" i="1" dirty="0">
+                <a:solidFill>
+                  <a:srgbClr val="202124"/>
+                </a:solidFill>
+                <a:effectLst/>
+                <a:latin typeface="Roboto"/>
+              </a:rPr>
+              <a:t>killed</a:t>
+            </a:r>
+            <a:r>
+              <a:rPr lang="en-US" sz="1000" b="0" i="1" dirty="0">
+                <a:solidFill>
+                  <a:srgbClr val="202124"/>
+                </a:solidFill>
+                <a:effectLst/>
+                <a:latin typeface="Roboto"/>
+              </a:rPr>
+              <a:t> on sight. Others believe, if one points its narrowest finger at someone, they are marked for death.</a:t>
+            </a:r>
+            <a:endParaRPr lang="en-US" sz="1000" i="1" dirty="0"/>
+          </a:p>
+        </p:txBody>
+      </p:sp>
+    </p:spTree>
+    <p:extLst>
+      <p:ext uri="{BB962C8B-B14F-4D97-AF65-F5344CB8AC3E}">
+        <p14:creationId xmlns:p14="http://schemas.microsoft.com/office/powerpoint/2010/main" val="4129213164"/>
+      </p:ext>
+    </p:extLst>
+  </p:cSld>
+  <p:clrMapOvr>
+    <a:masterClrMapping/>
+  </p:clrMapOvr>
+</p:sld>
+</file>
+
+<file path=ppt/slides/slide9.xml><?xml version="1.0" encoding="utf-8"?>
+<p:sld xmlns:a="http://schemas.openxmlformats.org/drawingml/2006/main" xmlns:r="http://schemas.openxmlformats.org/officeDocument/2006/relationships" xmlns:p="http://schemas.openxmlformats.org/presentationml/2006/main">
+  <p:cSld>
+    <p:spTree>
+      <p:nvGrpSpPr>
+        <p:cNvPr id="1" name=""/>
+        <p:cNvGrpSpPr/>
+        <p:nvPr/>
+      </p:nvGrpSpPr>
+      <p:grpSpPr>
+        <a:xfrm>
+          <a:off x="0" y="0"/>
+          <a:ext cx="0" cy="0"/>
+          <a:chOff x="0" y="0"/>
+          <a:chExt cx="0" cy="0"/>
+        </a:xfrm>
+      </p:grpSpPr>
+      <p:pic>
+        <p:nvPicPr>
+          <p:cNvPr id="5" name="Picture 4">
+            <a:extLst>
+              <a:ext uri="{FF2B5EF4-FFF2-40B4-BE49-F238E27FC236}">
+                <a16:creationId xmlns:a16="http://schemas.microsoft.com/office/drawing/2014/main" id="{4E1D6A53-CCB1-448E-B73A-C24A6B7FA7F5}"/>
+              </a:ext>
+            </a:extLst>
+          </p:cNvPr>
+          <p:cNvPicPr>
+            <a:picLocks noChangeAspect="1"/>
+          </p:cNvPicPr>
+          <p:nvPr/>
+        </p:nvPicPr>
+        <p:blipFill>
+          <a:blip r:embed="rId2">
+            <a:extLst>
+              <a:ext uri="{28A0092B-C50C-407E-A947-70E740481C1C}">
+                <a14:useLocalDpi xmlns:a14="http://schemas.microsoft.com/office/drawing/2010/main" val="0"/>
+              </a:ext>
+            </a:extLst>
+          </a:blip>
+          <a:stretch>
+            <a:fillRect/>
+          </a:stretch>
+        </p:blipFill>
+        <p:spPr>
+          <a:xfrm rot="16200000">
+            <a:off x="-2711636" y="3002718"/>
+            <a:ext cx="6591625" cy="1026863"/>
+          </a:xfrm>
+          <a:prstGeom prst="rect">
+            <a:avLst/>
+          </a:prstGeom>
+        </p:spPr>
+      </p:pic>
+      <p:sp>
+        <p:nvSpPr>
+          <p:cNvPr id="2" name="Title 1">
+            <a:extLst>
+              <a:ext uri="{FF2B5EF4-FFF2-40B4-BE49-F238E27FC236}">
+                <a16:creationId xmlns:a16="http://schemas.microsoft.com/office/drawing/2014/main" id="{B78BD6CC-06EC-41F0-A49E-9914B3569BBB}"/>
+              </a:ext>
+            </a:extLst>
+          </p:cNvPr>
+          <p:cNvSpPr>
+            <a:spLocks noGrp="1"/>
+          </p:cNvSpPr>
+          <p:nvPr>
+            <p:ph type="title"/>
+          </p:nvPr>
+        </p:nvSpPr>
+        <p:spPr>
+          <a:xfrm>
+            <a:off x="883637" y="2568829"/>
+            <a:ext cx="10515600" cy="1325563"/>
+          </a:xfrm>
+        </p:spPr>
+        <p:txBody>
+          <a:bodyPr>
+            <a:normAutofit/>
+          </a:bodyPr>
+          <a:lstStyle/>
+          <a:p>
+            <a:pPr algn="ctr"/>
+            <a:r>
+              <a:rPr lang="en-US" sz="4800" b="1" dirty="0">
+                <a:solidFill>
+                  <a:srgbClr val="777777"/>
+                </a:solidFill>
+              </a:rPr>
+              <a:t>Website Demonstration</a:t>
+            </a:r>
+          </a:p>
+        </p:txBody>
+      </p:sp>
+      <p:pic>
+        <p:nvPicPr>
+          <p:cNvPr id="7" name="Picture 6">
+            <a:extLst>
+              <a:ext uri="{FF2B5EF4-FFF2-40B4-BE49-F238E27FC236}">
+                <a16:creationId xmlns:a16="http://schemas.microsoft.com/office/drawing/2014/main" id="{31756008-26B5-498C-B4BB-EDA072BEC72A}"/>
+              </a:ext>
+            </a:extLst>
+          </p:cNvPr>
+          <p:cNvPicPr>
+            <a:picLocks noChangeAspect="1"/>
+          </p:cNvPicPr>
+          <p:nvPr/>
+        </p:nvPicPr>
+        <p:blipFill>
+          <a:blip r:embed="rId2">
+            <a:extLst>
+              <a:ext uri="{28A0092B-C50C-407E-A947-70E740481C1C}">
+                <a14:useLocalDpi xmlns:a14="http://schemas.microsoft.com/office/drawing/2010/main" val="0"/>
+              </a:ext>
+            </a:extLst>
+          </a:blip>
+          <a:stretch>
+            <a:fillRect/>
+          </a:stretch>
+        </p:blipFill>
+        <p:spPr>
+          <a:xfrm>
+            <a:off x="650232" y="262770"/>
+            <a:ext cx="4137525" cy="476190"/>
+          </a:xfrm>
+          <a:prstGeom prst="rect">
+            <a:avLst/>
+          </a:prstGeom>
+        </p:spPr>
+      </p:pic>
+      <p:pic>
+        <p:nvPicPr>
+          <p:cNvPr id="8" name="Picture 7">
+            <a:extLst>
+              <a:ext uri="{FF2B5EF4-FFF2-40B4-BE49-F238E27FC236}">
+                <a16:creationId xmlns:a16="http://schemas.microsoft.com/office/drawing/2014/main" id="{41B0AE2E-BC4F-4A32-96E8-B504B231A753}"/>
+              </a:ext>
+            </a:extLst>
+          </p:cNvPr>
+          <p:cNvPicPr>
+            <a:picLocks noChangeAspect="1"/>
+          </p:cNvPicPr>
+          <p:nvPr/>
+        </p:nvPicPr>
+        <p:blipFill>
+          <a:blip r:embed="rId3">
+            <a:extLst>
+              <a:ext uri="{28A0092B-C50C-407E-A947-70E740481C1C}">
+                <a14:useLocalDpi xmlns:a14="http://schemas.microsoft.com/office/drawing/2010/main" val="0"/>
+              </a:ext>
+            </a:extLst>
+          </a:blip>
+          <a:stretch>
+            <a:fillRect/>
+          </a:stretch>
+        </p:blipFill>
+        <p:spPr>
+          <a:xfrm>
+            <a:off x="9037115" y="5803809"/>
+            <a:ext cx="3154334" cy="1051444"/>
+          </a:xfrm>
+          <a:prstGeom prst="rect">
+            <a:avLst/>
+          </a:prstGeom>
+        </p:spPr>
+      </p:pic>
+      <p:pic>
+        <p:nvPicPr>
+          <p:cNvPr id="9" name="Picture 8">
+            <a:extLst>
+              <a:ext uri="{FF2B5EF4-FFF2-40B4-BE49-F238E27FC236}">
+                <a16:creationId xmlns:a16="http://schemas.microsoft.com/office/drawing/2014/main" id="{53554AA0-9657-46C8-BC8A-EF6404AD3D89}"/>
+              </a:ext>
+            </a:extLst>
+          </p:cNvPr>
+          <p:cNvPicPr>
+            <a:picLocks noChangeAspect="1"/>
+          </p:cNvPicPr>
+          <p:nvPr/>
+        </p:nvPicPr>
+        <p:blipFill>
+          <a:blip r:embed="rId4">
+            <a:extLst>
+              <a:ext uri="{28A0092B-C50C-407E-A947-70E740481C1C}">
+                <a14:useLocalDpi xmlns:a14="http://schemas.microsoft.com/office/drawing/2010/main" val="0"/>
+              </a:ext>
+            </a:extLst>
+          </a:blip>
+          <a:stretch>
+            <a:fillRect/>
+          </a:stretch>
+        </p:blipFill>
+        <p:spPr>
+          <a:xfrm>
+            <a:off x="838200" y="6119040"/>
+            <a:ext cx="476190" cy="476190"/>
+          </a:xfrm>
+          <a:prstGeom prst="rect">
+            <a:avLst/>
+          </a:prstGeom>
+        </p:spPr>
+      </p:pic>
+      <p:pic>
+        <p:nvPicPr>
+          <p:cNvPr id="11" name="Picture 10">
+            <a:extLst>
+              <a:ext uri="{FF2B5EF4-FFF2-40B4-BE49-F238E27FC236}">
+                <a16:creationId xmlns:a16="http://schemas.microsoft.com/office/drawing/2014/main" id="{6A914B30-4EB6-4805-9773-1EC500ADCB6C}"/>
+              </a:ext>
+            </a:extLst>
+          </p:cNvPr>
+          <p:cNvPicPr>
+            <a:picLocks noChangeAspect="1"/>
+          </p:cNvPicPr>
+          <p:nvPr/>
+        </p:nvPicPr>
+        <p:blipFill>
+          <a:blip r:embed="rId4">
+            <a:extLst>
+              <a:ext uri="{28A0092B-C50C-407E-A947-70E740481C1C}">
+                <a14:useLocalDpi xmlns:a14="http://schemas.microsoft.com/office/drawing/2010/main" val="0"/>
+              </a:ext>
+            </a:extLst>
+          </a:blip>
+          <a:stretch>
+            <a:fillRect/>
+          </a:stretch>
+        </p:blipFill>
+        <p:spPr>
+          <a:xfrm>
+            <a:off x="1388875" y="6119040"/>
+            <a:ext cx="476190" cy="476190"/>
+          </a:xfrm>
+          <a:prstGeom prst="rect">
+            <a:avLst/>
+          </a:prstGeom>
+        </p:spPr>
+      </p:pic>
+      <p:pic>
+        <p:nvPicPr>
+          <p:cNvPr id="12" name="Picture 11">
+            <a:extLst>
+              <a:ext uri="{FF2B5EF4-FFF2-40B4-BE49-F238E27FC236}">
+                <a16:creationId xmlns:a16="http://schemas.microsoft.com/office/drawing/2014/main" id="{AD78F74E-3885-4DCF-9468-F8A2333ED915}"/>
+              </a:ext>
+            </a:extLst>
+          </p:cNvPr>
+          <p:cNvPicPr>
+            <a:picLocks noChangeAspect="1"/>
+          </p:cNvPicPr>
+          <p:nvPr/>
+        </p:nvPicPr>
+        <p:blipFill>
+          <a:blip r:embed="rId4">
+            <a:extLst>
+              <a:ext uri="{28A0092B-C50C-407E-A947-70E740481C1C}">
+                <a14:useLocalDpi xmlns:a14="http://schemas.microsoft.com/office/drawing/2010/main" val="0"/>
+              </a:ext>
+            </a:extLst>
+          </a:blip>
+          <a:stretch>
+            <a:fillRect/>
+          </a:stretch>
+        </p:blipFill>
+        <p:spPr>
+          <a:xfrm>
+            <a:off x="1939550" y="6130590"/>
+            <a:ext cx="476190" cy="476190"/>
+          </a:xfrm>
+          <a:prstGeom prst="rect">
+            <a:avLst/>
+          </a:prstGeom>
+        </p:spPr>
+      </p:pic>
+      <p:pic>
+        <p:nvPicPr>
+          <p:cNvPr id="16" name="Picture 15">
+            <a:extLst>
+              <a:ext uri="{FF2B5EF4-FFF2-40B4-BE49-F238E27FC236}">
+                <a16:creationId xmlns:a16="http://schemas.microsoft.com/office/drawing/2014/main" id="{0C375EE0-0C98-4AD8-BE72-ED19C8977127}"/>
+              </a:ext>
+            </a:extLst>
+          </p:cNvPr>
+          <p:cNvPicPr>
+            <a:picLocks noChangeAspect="1"/>
+          </p:cNvPicPr>
+          <p:nvPr/>
+        </p:nvPicPr>
+        <p:blipFill>
+          <a:blip r:embed="rId5">
+            <a:extLst>
+              <a:ext uri="{28A0092B-C50C-407E-A947-70E740481C1C}">
+                <a14:useLocalDpi xmlns:a14="http://schemas.microsoft.com/office/drawing/2010/main" val="0"/>
+              </a:ext>
+            </a:extLst>
+          </a:blip>
+          <a:stretch>
+            <a:fillRect/>
+          </a:stretch>
+        </p:blipFill>
+        <p:spPr>
+          <a:xfrm>
+            <a:off x="9283146" y="5495544"/>
+            <a:ext cx="1270092" cy="1270092"/>
+          </a:xfrm>
+          <a:prstGeom prst="rect">
+            <a:avLst/>
+          </a:prstGeom>
+        </p:spPr>
+      </p:pic>
+      <p:sp>
+        <p:nvSpPr>
+          <p:cNvPr id="10" name="TextBox 9">
+            <a:extLst>
+              <a:ext uri="{FF2B5EF4-FFF2-40B4-BE49-F238E27FC236}">
+                <a16:creationId xmlns:a16="http://schemas.microsoft.com/office/drawing/2014/main" id="{A11629CE-18A3-4B13-AA4E-07916937FCA3}"/>
+              </a:ext>
+            </a:extLst>
+          </p:cNvPr>
+          <p:cNvSpPr txBox="1"/>
+          <p:nvPr/>
+        </p:nvSpPr>
+        <p:spPr>
+          <a:xfrm>
+            <a:off x="3221561" y="6213020"/>
+            <a:ext cx="5937085" cy="246221"/>
+          </a:xfrm>
+          <a:prstGeom prst="rect">
+            <a:avLst/>
+          </a:prstGeom>
+          <a:noFill/>
+        </p:spPr>
+        <p:txBody>
+          <a:bodyPr wrap="square" rtlCol="0">
+            <a:spAutoFit/>
+          </a:bodyPr>
+          <a:lstStyle/>
+          <a:p>
+            <a:pPr algn="r"/>
+            <a:r>
+              <a:rPr lang="en-US" sz="1000" b="1" i="1" dirty="0">
+                <a:solidFill>
+                  <a:srgbClr val="202124"/>
+                </a:solidFill>
+                <a:effectLst/>
+                <a:latin typeface="Roboto"/>
+              </a:rPr>
+              <a:t>Aye </a:t>
+            </a:r>
+            <a:r>
+              <a:rPr lang="en-US" sz="1000" b="1" i="1" dirty="0" err="1">
+                <a:solidFill>
+                  <a:srgbClr val="202124"/>
+                </a:solidFill>
+                <a:effectLst/>
+                <a:latin typeface="Roboto"/>
+              </a:rPr>
+              <a:t>aye</a:t>
+            </a:r>
+            <a:r>
+              <a:rPr lang="en-US" sz="1000" b="0" i="1" dirty="0">
+                <a:solidFill>
+                  <a:srgbClr val="202124"/>
+                </a:solidFill>
+                <a:effectLst/>
+                <a:latin typeface="Roboto"/>
+              </a:rPr>
+              <a:t> come from the lemur family, and </a:t>
+            </a:r>
+            <a:r>
+              <a:rPr lang="en-US" sz="1000" b="1" i="1" dirty="0">
+                <a:solidFill>
+                  <a:srgbClr val="202124"/>
+                </a:solidFill>
+                <a:effectLst/>
+                <a:latin typeface="Roboto"/>
+              </a:rPr>
+              <a:t>baby aye ayes</a:t>
+            </a:r>
+            <a:r>
+              <a:rPr lang="en-US" sz="1000" b="0" i="1" dirty="0">
+                <a:solidFill>
+                  <a:srgbClr val="202124"/>
+                </a:solidFill>
+                <a:effectLst/>
+                <a:latin typeface="Roboto"/>
+              </a:rPr>
+              <a:t> are </a:t>
+            </a:r>
+            <a:r>
+              <a:rPr lang="en-US" sz="1000" b="1" i="1" dirty="0">
+                <a:solidFill>
+                  <a:srgbClr val="202124"/>
+                </a:solidFill>
+                <a:effectLst/>
+                <a:latin typeface="Roboto"/>
+              </a:rPr>
+              <a:t>known as</a:t>
+            </a:r>
+            <a:r>
+              <a:rPr lang="en-US" sz="1000" b="0" i="1" dirty="0">
+                <a:solidFill>
+                  <a:srgbClr val="202124"/>
+                </a:solidFill>
+                <a:effectLst/>
+                <a:latin typeface="Roboto"/>
+              </a:rPr>
+              <a:t> “infants”, just like you! </a:t>
+            </a:r>
+            <a:endParaRPr lang="en-US" sz="1000" i="1" dirty="0"/>
+          </a:p>
+        </p:txBody>
+      </p:sp>
+    </p:spTree>
+    <p:extLst>
+      <p:ext uri="{BB962C8B-B14F-4D97-AF65-F5344CB8AC3E}">
+        <p14:creationId xmlns:p14="http://schemas.microsoft.com/office/powerpoint/2010/main" val="461459708"/>
       </p:ext>
     </p:extLst>
   </p:cSld>

</xml_diff>

<commit_message>
Flask is rendering the website.
</commit_message>
<xml_diff>
--- a/Project3_Presentation.pptx
+++ b/Project3_Presentation.pptx
@@ -268,7 +268,7 @@
           <a:p>
             <a:fld id="{7827AB9E-CF3C-4C7C-8B51-C799DF2DBD52}" type="datetimeFigureOut">
               <a:rPr lang="en-US" smtClean="0"/>
-              <a:t>1/22/2021</a:t>
+              <a:t>1/23/2021</a:t>
             </a:fld>
             <a:endParaRPr lang="en-US"/>
           </a:p>
@@ -466,7 +466,7 @@
           <a:p>
             <a:fld id="{7827AB9E-CF3C-4C7C-8B51-C799DF2DBD52}" type="datetimeFigureOut">
               <a:rPr lang="en-US" smtClean="0"/>
-              <a:t>1/22/2021</a:t>
+              <a:t>1/23/2021</a:t>
             </a:fld>
             <a:endParaRPr lang="en-US"/>
           </a:p>
@@ -674,7 +674,7 @@
           <a:p>
             <a:fld id="{7827AB9E-CF3C-4C7C-8B51-C799DF2DBD52}" type="datetimeFigureOut">
               <a:rPr lang="en-US" smtClean="0"/>
-              <a:t>1/22/2021</a:t>
+              <a:t>1/23/2021</a:t>
             </a:fld>
             <a:endParaRPr lang="en-US"/>
           </a:p>
@@ -872,7 +872,7 @@
           <a:p>
             <a:fld id="{7827AB9E-CF3C-4C7C-8B51-C799DF2DBD52}" type="datetimeFigureOut">
               <a:rPr lang="en-US" smtClean="0"/>
-              <a:t>1/22/2021</a:t>
+              <a:t>1/23/2021</a:t>
             </a:fld>
             <a:endParaRPr lang="en-US"/>
           </a:p>
@@ -1147,7 +1147,7 @@
           <a:p>
             <a:fld id="{7827AB9E-CF3C-4C7C-8B51-C799DF2DBD52}" type="datetimeFigureOut">
               <a:rPr lang="en-US" smtClean="0"/>
-              <a:t>1/22/2021</a:t>
+              <a:t>1/23/2021</a:t>
             </a:fld>
             <a:endParaRPr lang="en-US"/>
           </a:p>
@@ -1412,7 +1412,7 @@
           <a:p>
             <a:fld id="{7827AB9E-CF3C-4C7C-8B51-C799DF2DBD52}" type="datetimeFigureOut">
               <a:rPr lang="en-US" smtClean="0"/>
-              <a:t>1/22/2021</a:t>
+              <a:t>1/23/2021</a:t>
             </a:fld>
             <a:endParaRPr lang="en-US"/>
           </a:p>
@@ -1824,7 +1824,7 @@
           <a:p>
             <a:fld id="{7827AB9E-CF3C-4C7C-8B51-C799DF2DBD52}" type="datetimeFigureOut">
               <a:rPr lang="en-US" smtClean="0"/>
-              <a:t>1/22/2021</a:t>
+              <a:t>1/23/2021</a:t>
             </a:fld>
             <a:endParaRPr lang="en-US"/>
           </a:p>
@@ -1965,7 +1965,7 @@
           <a:p>
             <a:fld id="{7827AB9E-CF3C-4C7C-8B51-C799DF2DBD52}" type="datetimeFigureOut">
               <a:rPr lang="en-US" smtClean="0"/>
-              <a:t>1/22/2021</a:t>
+              <a:t>1/23/2021</a:t>
             </a:fld>
             <a:endParaRPr lang="en-US"/>
           </a:p>
@@ -2078,7 +2078,7 @@
           <a:p>
             <a:fld id="{7827AB9E-CF3C-4C7C-8B51-C799DF2DBD52}" type="datetimeFigureOut">
               <a:rPr lang="en-US" smtClean="0"/>
-              <a:t>1/22/2021</a:t>
+              <a:t>1/23/2021</a:t>
             </a:fld>
             <a:endParaRPr lang="en-US"/>
           </a:p>
@@ -2389,7 +2389,7 @@
           <a:p>
             <a:fld id="{7827AB9E-CF3C-4C7C-8B51-C799DF2DBD52}" type="datetimeFigureOut">
               <a:rPr lang="en-US" smtClean="0"/>
-              <a:t>1/22/2021</a:t>
+              <a:t>1/23/2021</a:t>
             </a:fld>
             <a:endParaRPr lang="en-US"/>
           </a:p>
@@ -2677,7 +2677,7 @@
           <a:p>
             <a:fld id="{7827AB9E-CF3C-4C7C-8B51-C799DF2DBD52}" type="datetimeFigureOut">
               <a:rPr lang="en-US" smtClean="0"/>
-              <a:t>1/22/2021</a:t>
+              <a:t>1/23/2021</a:t>
             </a:fld>
             <a:endParaRPr lang="en-US"/>
           </a:p>
@@ -2918,7 +2918,7 @@
           <a:p>
             <a:fld id="{7827AB9E-CF3C-4C7C-8B51-C799DF2DBD52}" type="datetimeFigureOut">
               <a:rPr lang="en-US" smtClean="0"/>
-              <a:t>1/22/2021</a:t>
+              <a:t>1/23/2021</a:t>
             </a:fld>
             <a:endParaRPr lang="en-US"/>
           </a:p>
@@ -3379,7 +3379,7 @@
                   <a:srgbClr val="777777"/>
                 </a:solidFill>
               </a:rPr>
-              <a:t>St. Louis City and County </a:t>
+              <a:t>St. Louis County </a:t>
             </a:r>
             <a:br>
               <a:rPr lang="en-US" b="1" dirty="0">
@@ -6357,7 +6357,7 @@
                   <a:srgbClr val="777777"/>
                 </a:solidFill>
               </a:rPr>
-              <a:t>Listing out side of St. Louis City and County</a:t>
+              <a:t>Listing out side of St. Louis County</a:t>
             </a:r>
           </a:p>
           <a:p>

</xml_diff>

<commit_message>
Added a link to the logo section.
</commit_message>
<xml_diff>
--- a/Project3_Presentation.pptx
+++ b/Project3_Presentation.pptx
@@ -12,9 +12,11 @@
     <p:sldId id="260" r:id="rId6"/>
     <p:sldId id="261" r:id="rId7"/>
     <p:sldId id="262" r:id="rId8"/>
-    <p:sldId id="263" r:id="rId9"/>
-    <p:sldId id="264" r:id="rId10"/>
-    <p:sldId id="265" r:id="rId11"/>
+    <p:sldId id="266" r:id="rId9"/>
+    <p:sldId id="263" r:id="rId10"/>
+    <p:sldId id="264" r:id="rId11"/>
+    <p:sldId id="267" r:id="rId12"/>
+    <p:sldId id="265" r:id="rId13"/>
   </p:sldIdLst>
   <p:sldSz cx="12192000" cy="6858000"/>
   <p:notesSz cx="6858000" cy="9144000"/>
@@ -268,7 +270,7 @@
           <a:p>
             <a:fld id="{7827AB9E-CF3C-4C7C-8B51-C799DF2DBD52}" type="datetimeFigureOut">
               <a:rPr lang="en-US" smtClean="0"/>
-              <a:t>1/23/2021</a:t>
+              <a:t>1/25/2021</a:t>
             </a:fld>
             <a:endParaRPr lang="en-US"/>
           </a:p>
@@ -466,7 +468,7 @@
           <a:p>
             <a:fld id="{7827AB9E-CF3C-4C7C-8B51-C799DF2DBD52}" type="datetimeFigureOut">
               <a:rPr lang="en-US" smtClean="0"/>
-              <a:t>1/23/2021</a:t>
+              <a:t>1/25/2021</a:t>
             </a:fld>
             <a:endParaRPr lang="en-US"/>
           </a:p>
@@ -674,7 +676,7 @@
           <a:p>
             <a:fld id="{7827AB9E-CF3C-4C7C-8B51-C799DF2DBD52}" type="datetimeFigureOut">
               <a:rPr lang="en-US" smtClean="0"/>
-              <a:t>1/23/2021</a:t>
+              <a:t>1/25/2021</a:t>
             </a:fld>
             <a:endParaRPr lang="en-US"/>
           </a:p>
@@ -872,7 +874,7 @@
           <a:p>
             <a:fld id="{7827AB9E-CF3C-4C7C-8B51-C799DF2DBD52}" type="datetimeFigureOut">
               <a:rPr lang="en-US" smtClean="0"/>
-              <a:t>1/23/2021</a:t>
+              <a:t>1/25/2021</a:t>
             </a:fld>
             <a:endParaRPr lang="en-US"/>
           </a:p>
@@ -1147,7 +1149,7 @@
           <a:p>
             <a:fld id="{7827AB9E-CF3C-4C7C-8B51-C799DF2DBD52}" type="datetimeFigureOut">
               <a:rPr lang="en-US" smtClean="0"/>
-              <a:t>1/23/2021</a:t>
+              <a:t>1/25/2021</a:t>
             </a:fld>
             <a:endParaRPr lang="en-US"/>
           </a:p>
@@ -1412,7 +1414,7 @@
           <a:p>
             <a:fld id="{7827AB9E-CF3C-4C7C-8B51-C799DF2DBD52}" type="datetimeFigureOut">
               <a:rPr lang="en-US" smtClean="0"/>
-              <a:t>1/23/2021</a:t>
+              <a:t>1/25/2021</a:t>
             </a:fld>
             <a:endParaRPr lang="en-US"/>
           </a:p>
@@ -1824,7 +1826,7 @@
           <a:p>
             <a:fld id="{7827AB9E-CF3C-4C7C-8B51-C799DF2DBD52}" type="datetimeFigureOut">
               <a:rPr lang="en-US" smtClean="0"/>
-              <a:t>1/23/2021</a:t>
+              <a:t>1/25/2021</a:t>
             </a:fld>
             <a:endParaRPr lang="en-US"/>
           </a:p>
@@ -1965,7 +1967,7 @@
           <a:p>
             <a:fld id="{7827AB9E-CF3C-4C7C-8B51-C799DF2DBD52}" type="datetimeFigureOut">
               <a:rPr lang="en-US" smtClean="0"/>
-              <a:t>1/23/2021</a:t>
+              <a:t>1/25/2021</a:t>
             </a:fld>
             <a:endParaRPr lang="en-US"/>
           </a:p>
@@ -2078,7 +2080,7 @@
           <a:p>
             <a:fld id="{7827AB9E-CF3C-4C7C-8B51-C799DF2DBD52}" type="datetimeFigureOut">
               <a:rPr lang="en-US" smtClean="0"/>
-              <a:t>1/23/2021</a:t>
+              <a:t>1/25/2021</a:t>
             </a:fld>
             <a:endParaRPr lang="en-US"/>
           </a:p>
@@ -2389,7 +2391,7 @@
           <a:p>
             <a:fld id="{7827AB9E-CF3C-4C7C-8B51-C799DF2DBD52}" type="datetimeFigureOut">
               <a:rPr lang="en-US" smtClean="0"/>
-              <a:t>1/23/2021</a:t>
+              <a:t>1/25/2021</a:t>
             </a:fld>
             <a:endParaRPr lang="en-US"/>
           </a:p>
@@ -2677,7 +2679,7 @@
           <a:p>
             <a:fld id="{7827AB9E-CF3C-4C7C-8B51-C799DF2DBD52}" type="datetimeFigureOut">
               <a:rPr lang="en-US" smtClean="0"/>
-              <a:t>1/23/2021</a:t>
+              <a:t>1/25/2021</a:t>
             </a:fld>
             <a:endParaRPr lang="en-US"/>
           </a:p>
@@ -2918,7 +2920,7 @@
           <a:p>
             <a:fld id="{7827AB9E-CF3C-4C7C-8B51-C799DF2DBD52}" type="datetimeFigureOut">
               <a:rPr lang="en-US" smtClean="0"/>
-              <a:t>1/23/2021</a:t>
+              <a:t>1/25/2021</a:t>
             </a:fld>
             <a:endParaRPr lang="en-US"/>
           </a:p>
@@ -3691,10 +3693,10 @@
       </p:grpSpPr>
       <p:pic>
         <p:nvPicPr>
-          <p:cNvPr id="29" name="Picture 28">
-            <a:extLst>
-              <a:ext uri="{FF2B5EF4-FFF2-40B4-BE49-F238E27FC236}">
-                <a16:creationId xmlns:a16="http://schemas.microsoft.com/office/drawing/2014/main" id="{59772A1E-E566-408B-94A7-06A075AE2A37}"/>
+          <p:cNvPr id="5" name="Picture 4">
+            <a:extLst>
+              <a:ext uri="{FF2B5EF4-FFF2-40B4-BE49-F238E27FC236}">
+                <a16:creationId xmlns:a16="http://schemas.microsoft.com/office/drawing/2014/main" id="{4E1D6A53-CCB1-448E-B73A-C24A6B7FA7F5}"/>
               </a:ext>
             </a:extLst>
           </p:cNvPr>
@@ -3705,42 +3707,6 @@
         </p:nvPicPr>
         <p:blipFill>
           <a:blip r:embed="rId2">
-            <a:extLst>
-              <a:ext uri="{28A0092B-C50C-407E-A947-70E740481C1C}">
-                <a14:useLocalDpi xmlns:a14="http://schemas.microsoft.com/office/drawing/2010/main" val="0"/>
-              </a:ext>
-            </a:extLst>
-          </a:blip>
-          <a:stretch>
-            <a:fillRect/>
-          </a:stretch>
-        </p:blipFill>
-        <p:spPr>
-          <a:xfrm>
-            <a:off x="4002729" y="3416299"/>
-            <a:ext cx="4277416" cy="2566450"/>
-          </a:xfrm>
-          <a:prstGeom prst="rect">
-            <a:avLst/>
-          </a:prstGeom>
-        </p:spPr>
-      </p:pic>
-      <p:pic>
-        <p:nvPicPr>
-          <p:cNvPr id="5" name="Picture 4">
-            <a:extLst>
-              <a:ext uri="{FF2B5EF4-FFF2-40B4-BE49-F238E27FC236}">
-                <a16:creationId xmlns:a16="http://schemas.microsoft.com/office/drawing/2014/main" id="{4E1D6A53-CCB1-448E-B73A-C24A6B7FA7F5}"/>
-              </a:ext>
-            </a:extLst>
-          </p:cNvPr>
-          <p:cNvPicPr>
-            <a:picLocks noChangeAspect="1"/>
-          </p:cNvPicPr>
-          <p:nvPr/>
-        </p:nvPicPr>
-        <p:blipFill>
-          <a:blip r:embed="rId3">
             <a:extLst>
               <a:ext uri="{28A0092B-C50C-407E-A947-70E740481C1C}">
                 <a14:useLocalDpi xmlns:a14="http://schemas.microsoft.com/office/drawing/2010/main" val="0"/>
@@ -3779,7 +3745,7 @@
         </p:nvSpPr>
         <p:spPr>
           <a:xfrm>
-            <a:off x="883637" y="2568829"/>
+            <a:off x="932303" y="274185"/>
             <a:ext cx="10515600" cy="1325563"/>
           </a:xfrm>
         </p:spPr>
@@ -3796,7 +3762,7 @@
                   <a:srgbClr val="777777"/>
                 </a:solidFill>
               </a:rPr>
-              <a:t>Questions</a:t>
+              <a:t>Website Demonstration</a:t>
             </a:r>
           </a:p>
         </p:txBody>
@@ -3816,7 +3782,7 @@
           <p:nvPr/>
         </p:nvPicPr>
         <p:blipFill>
-          <a:blip r:embed="rId3">
+          <a:blip r:embed="rId2">
             <a:extLst>
               <a:ext uri="{28A0092B-C50C-407E-A947-70E740481C1C}">
                 <a14:useLocalDpi xmlns:a14="http://schemas.microsoft.com/office/drawing/2010/main" val="0"/>
@@ -3839,10 +3805,10 @@
       </p:pic>
       <p:pic>
         <p:nvPicPr>
-          <p:cNvPr id="9" name="Picture 8">
-            <a:extLst>
-              <a:ext uri="{FF2B5EF4-FFF2-40B4-BE49-F238E27FC236}">
-                <a16:creationId xmlns:a16="http://schemas.microsoft.com/office/drawing/2014/main" id="{53554AA0-9657-46C8-BC8A-EF6404AD3D89}"/>
+          <p:cNvPr id="8" name="Picture 7">
+            <a:extLst>
+              <a:ext uri="{FF2B5EF4-FFF2-40B4-BE49-F238E27FC236}">
+                <a16:creationId xmlns:a16="http://schemas.microsoft.com/office/drawing/2014/main" id="{41B0AE2E-BC4F-4A32-96E8-B504B231A753}"/>
               </a:ext>
             </a:extLst>
           </p:cNvPr>
@@ -3852,7 +3818,7 @@
           <p:nvPr/>
         </p:nvPicPr>
         <p:blipFill>
-          <a:blip r:embed="rId4">
+          <a:blip r:embed="rId3">
             <a:extLst>
               <a:ext uri="{28A0092B-C50C-407E-A947-70E740481C1C}">
                 <a14:useLocalDpi xmlns:a14="http://schemas.microsoft.com/office/drawing/2010/main" val="0"/>
@@ -3865,8 +3831,8 @@
         </p:blipFill>
         <p:spPr>
           <a:xfrm>
-            <a:off x="838200" y="6119040"/>
-            <a:ext cx="476190" cy="476190"/>
+            <a:off x="9037115" y="5803809"/>
+            <a:ext cx="3154334" cy="1051444"/>
           </a:xfrm>
           <a:prstGeom prst="rect">
             <a:avLst/>
@@ -3875,10 +3841,10 @@
       </p:pic>
       <p:pic>
         <p:nvPicPr>
-          <p:cNvPr id="11" name="Picture 10">
-            <a:extLst>
-              <a:ext uri="{FF2B5EF4-FFF2-40B4-BE49-F238E27FC236}">
-                <a16:creationId xmlns:a16="http://schemas.microsoft.com/office/drawing/2014/main" id="{6A914B30-4EB6-4805-9773-1EC500ADCB6C}"/>
+          <p:cNvPr id="9" name="Picture 8">
+            <a:extLst>
+              <a:ext uri="{FF2B5EF4-FFF2-40B4-BE49-F238E27FC236}">
+                <a16:creationId xmlns:a16="http://schemas.microsoft.com/office/drawing/2014/main" id="{53554AA0-9657-46C8-BC8A-EF6404AD3D89}"/>
               </a:ext>
             </a:extLst>
           </p:cNvPr>
@@ -3901,7 +3867,7 @@
         </p:blipFill>
         <p:spPr>
           <a:xfrm>
-            <a:off x="1388875" y="6119040"/>
+            <a:off x="838200" y="6119040"/>
             <a:ext cx="476190" cy="476190"/>
           </a:xfrm>
           <a:prstGeom prst="rect">
@@ -3911,10 +3877,10 @@
       </p:pic>
       <p:pic>
         <p:nvPicPr>
-          <p:cNvPr id="12" name="Picture 11">
-            <a:extLst>
-              <a:ext uri="{FF2B5EF4-FFF2-40B4-BE49-F238E27FC236}">
-                <a16:creationId xmlns:a16="http://schemas.microsoft.com/office/drawing/2014/main" id="{AD78F74E-3885-4DCF-9468-F8A2333ED915}"/>
+          <p:cNvPr id="11" name="Picture 10">
+            <a:extLst>
+              <a:ext uri="{FF2B5EF4-FFF2-40B4-BE49-F238E27FC236}">
+                <a16:creationId xmlns:a16="http://schemas.microsoft.com/office/drawing/2014/main" id="{6A914B30-4EB6-4805-9773-1EC500ADCB6C}"/>
               </a:ext>
             </a:extLst>
           </p:cNvPr>
@@ -3937,7 +3903,7 @@
         </p:blipFill>
         <p:spPr>
           <a:xfrm>
-            <a:off x="1939550" y="6130590"/>
+            <a:off x="1388875" y="6119040"/>
             <a:ext cx="476190" cy="476190"/>
           </a:xfrm>
           <a:prstGeom prst="rect">
@@ -3947,10 +3913,10 @@
       </p:pic>
       <p:pic>
         <p:nvPicPr>
-          <p:cNvPr id="10" name="Picture 9">
-            <a:extLst>
-              <a:ext uri="{FF2B5EF4-FFF2-40B4-BE49-F238E27FC236}">
-                <a16:creationId xmlns:a16="http://schemas.microsoft.com/office/drawing/2014/main" id="{8F280CB9-BE83-492C-A8EA-AFC285C29450}"/>
+          <p:cNvPr id="12" name="Picture 11">
+            <a:extLst>
+              <a:ext uri="{FF2B5EF4-FFF2-40B4-BE49-F238E27FC236}">
+                <a16:creationId xmlns:a16="http://schemas.microsoft.com/office/drawing/2014/main" id="{AD78F74E-3885-4DCF-9468-F8A2333ED915}"/>
               </a:ext>
             </a:extLst>
           </p:cNvPr>
@@ -3960,7 +3926,7 @@
           <p:nvPr/>
         </p:nvPicPr>
         <p:blipFill>
-          <a:blip r:embed="rId5">
+          <a:blip r:embed="rId4">
             <a:extLst>
               <a:ext uri="{28A0092B-C50C-407E-A947-70E740481C1C}">
                 <a14:useLocalDpi xmlns:a14="http://schemas.microsoft.com/office/drawing/2010/main" val="0"/>
@@ -3973,8 +3939,8 @@
         </p:blipFill>
         <p:spPr>
           <a:xfrm>
-            <a:off x="3724182" y="761053"/>
-            <a:ext cx="1262116" cy="1684990"/>
+            <a:off x="1939550" y="6130590"/>
+            <a:ext cx="476190" cy="476190"/>
           </a:xfrm>
           <a:prstGeom prst="rect">
             <a:avLst/>
@@ -3983,10 +3949,10 @@
       </p:pic>
       <p:pic>
         <p:nvPicPr>
-          <p:cNvPr id="17" name="Picture 16">
-            <a:extLst>
-              <a:ext uri="{FF2B5EF4-FFF2-40B4-BE49-F238E27FC236}">
-                <a16:creationId xmlns:a16="http://schemas.microsoft.com/office/drawing/2014/main" id="{9D0CED4E-704C-4F3C-81AB-B833A19FE62B}"/>
+          <p:cNvPr id="16" name="Picture 15">
+            <a:extLst>
+              <a:ext uri="{FF2B5EF4-FFF2-40B4-BE49-F238E27FC236}">
+                <a16:creationId xmlns:a16="http://schemas.microsoft.com/office/drawing/2014/main" id="{0C375EE0-0C98-4AD8-BE72-ED19C8977127}"/>
               </a:ext>
             </a:extLst>
           </p:cNvPr>
@@ -3996,7 +3962,7 @@
           <p:nvPr/>
         </p:nvPicPr>
         <p:blipFill>
-          <a:blip r:embed="rId6">
+          <a:blip r:embed="rId5">
             <a:extLst>
               <a:ext uri="{28A0092B-C50C-407E-A947-70E740481C1C}">
                 <a14:useLocalDpi xmlns:a14="http://schemas.microsoft.com/office/drawing/2010/main" val="0"/>
@@ -4009,20 +3975,133 @@
         </p:blipFill>
         <p:spPr>
           <a:xfrm>
-            <a:off x="1661719" y="1098832"/>
-            <a:ext cx="2114550" cy="2162175"/>
+            <a:off x="9283146" y="5495544"/>
+            <a:ext cx="1270092" cy="1270092"/>
           </a:xfrm>
           <a:prstGeom prst="rect">
             <a:avLst/>
           </a:prstGeom>
         </p:spPr>
       </p:pic>
+      <p:sp>
+        <p:nvSpPr>
+          <p:cNvPr id="10" name="TextBox 9">
+            <a:extLst>
+              <a:ext uri="{FF2B5EF4-FFF2-40B4-BE49-F238E27FC236}">
+                <a16:creationId xmlns:a16="http://schemas.microsoft.com/office/drawing/2014/main" id="{A11629CE-18A3-4B13-AA4E-07916937FCA3}"/>
+              </a:ext>
+            </a:extLst>
+          </p:cNvPr>
+          <p:cNvSpPr txBox="1"/>
+          <p:nvPr/>
+        </p:nvSpPr>
+        <p:spPr>
+          <a:xfrm>
+            <a:off x="3221561" y="6213020"/>
+            <a:ext cx="5937085" cy="246221"/>
+          </a:xfrm>
+          <a:prstGeom prst="rect">
+            <a:avLst/>
+          </a:prstGeom>
+          <a:noFill/>
+        </p:spPr>
+        <p:txBody>
+          <a:bodyPr wrap="square" rtlCol="0">
+            <a:spAutoFit/>
+          </a:bodyPr>
+          <a:lstStyle/>
+          <a:p>
+            <a:pPr algn="r"/>
+            <a:r>
+              <a:rPr lang="en-US" sz="1000" b="1" i="1" dirty="0">
+                <a:solidFill>
+                  <a:srgbClr val="202124"/>
+                </a:solidFill>
+                <a:effectLst/>
+                <a:latin typeface="Roboto"/>
+              </a:rPr>
+              <a:t>Aye </a:t>
+            </a:r>
+            <a:r>
+              <a:rPr lang="en-US" sz="1000" b="1" i="1" dirty="0" err="1">
+                <a:solidFill>
+                  <a:srgbClr val="202124"/>
+                </a:solidFill>
+                <a:effectLst/>
+                <a:latin typeface="Roboto"/>
+              </a:rPr>
+              <a:t>aye</a:t>
+            </a:r>
+            <a:r>
+              <a:rPr lang="en-US" sz="1000" b="0" i="1" dirty="0">
+                <a:solidFill>
+                  <a:srgbClr val="202124"/>
+                </a:solidFill>
+                <a:effectLst/>
+                <a:latin typeface="Roboto"/>
+              </a:rPr>
+              <a:t> come from the lemur family, and </a:t>
+            </a:r>
+            <a:r>
+              <a:rPr lang="en-US" sz="1000" i="1" dirty="0">
+                <a:solidFill>
+                  <a:srgbClr val="202124"/>
+                </a:solidFill>
+                <a:effectLst/>
+                <a:latin typeface="Roboto"/>
+              </a:rPr>
+              <a:t>baby</a:t>
+            </a:r>
+            <a:r>
+              <a:rPr lang="en-US" sz="1000" b="1" i="1" dirty="0">
+                <a:solidFill>
+                  <a:srgbClr val="202124"/>
+                </a:solidFill>
+                <a:effectLst/>
+                <a:latin typeface="Roboto"/>
+              </a:rPr>
+              <a:t> aye ayes</a:t>
+            </a:r>
+            <a:r>
+              <a:rPr lang="en-US" sz="1000" b="0" i="1" dirty="0">
+                <a:solidFill>
+                  <a:srgbClr val="202124"/>
+                </a:solidFill>
+                <a:effectLst/>
+                <a:latin typeface="Roboto"/>
+              </a:rPr>
+              <a:t> are </a:t>
+            </a:r>
+            <a:r>
+              <a:rPr lang="en-US" sz="1000" i="1" dirty="0">
+                <a:solidFill>
+                  <a:srgbClr val="202124"/>
+                </a:solidFill>
+                <a:effectLst/>
+                <a:latin typeface="Roboto"/>
+              </a:rPr>
+              <a:t>known as </a:t>
+            </a:r>
+            <a:r>
+              <a:rPr lang="en-US" sz="1000" b="0" i="1" dirty="0">
+                <a:solidFill>
+                  <a:srgbClr val="202124"/>
+                </a:solidFill>
+                <a:effectLst/>
+                <a:latin typeface="Roboto"/>
+              </a:rPr>
+              <a:t>“infants”, just like you! </a:t>
+            </a:r>
+            <a:endParaRPr lang="en-US" sz="1000" i="1" dirty="0"/>
+          </a:p>
+        </p:txBody>
+      </p:sp>
       <p:pic>
         <p:nvPicPr>
-          <p:cNvPr id="25" name="Picture 24">
-            <a:extLst>
-              <a:ext uri="{FF2B5EF4-FFF2-40B4-BE49-F238E27FC236}">
-                <a16:creationId xmlns:a16="http://schemas.microsoft.com/office/drawing/2014/main" id="{9CAC5799-7FB2-4E0C-9105-60376B31BF7F}"/>
+          <p:cNvPr id="4" name="Picture 3">
+            <a:extLst>
+              <a:ext uri="{FF2B5EF4-FFF2-40B4-BE49-F238E27FC236}">
+                <a16:creationId xmlns:a16="http://schemas.microsoft.com/office/drawing/2014/main" id="{83E28B3E-9154-4210-B875-CB82B3BE7370}"/>
               </a:ext>
             </a:extLst>
           </p:cNvPr>
@@ -4032,7 +4111,72 @@
           <p:nvPr/>
         </p:nvPicPr>
         <p:blipFill>
-          <a:blip r:embed="rId7">
+          <a:blip r:embed="rId6"/>
+          <a:stretch>
+            <a:fillRect/>
+          </a:stretch>
+        </p:blipFill>
+        <p:spPr>
+          <a:xfrm>
+            <a:off x="2569688" y="1283233"/>
+            <a:ext cx="7406136" cy="4007706"/>
+          </a:xfrm>
+          <a:prstGeom prst="rect">
+            <a:avLst/>
+          </a:prstGeom>
+          <a:ln>
+            <a:solidFill>
+              <a:schemeClr val="tx1"/>
+            </a:solidFill>
+          </a:ln>
+        </p:spPr>
+      </p:pic>
+    </p:spTree>
+    <p:extLst>
+      <p:ext uri="{BB962C8B-B14F-4D97-AF65-F5344CB8AC3E}">
+        <p14:creationId xmlns:p14="http://schemas.microsoft.com/office/powerpoint/2010/main" val="461459708"/>
+      </p:ext>
+    </p:extLst>
+  </p:cSld>
+  <p:clrMapOvr>
+    <a:masterClrMapping/>
+  </p:clrMapOvr>
+</p:sld>
+</file>
+
+<file path=ppt/slides/slide11.xml><?xml version="1.0" encoding="utf-8"?>
+<p:sld xmlns:a="http://schemas.openxmlformats.org/drawingml/2006/main" xmlns:r="http://schemas.openxmlformats.org/officeDocument/2006/relationships" xmlns:p="http://schemas.openxmlformats.org/presentationml/2006/main">
+  <p:cSld>
+    <p:spTree>
+      <p:nvGrpSpPr>
+        <p:cNvPr id="1" name=""/>
+        <p:cNvGrpSpPr/>
+        <p:nvPr/>
+      </p:nvGrpSpPr>
+      <p:grpSpPr>
+        <a:xfrm>
+          <a:off x="0" y="0"/>
+          <a:ext cx="0" cy="0"/>
+          <a:chOff x="0" y="0"/>
+          <a:chExt cx="0" cy="0"/>
+        </a:xfrm>
+      </p:grpSpPr>
+      <p:pic>
+        <p:nvPicPr>
+          <p:cNvPr id="5" name="Picture 4">
+            <a:extLst>
+              <a:ext uri="{FF2B5EF4-FFF2-40B4-BE49-F238E27FC236}">
+                <a16:creationId xmlns:a16="http://schemas.microsoft.com/office/drawing/2014/main" id="{4E1D6A53-CCB1-448E-B73A-C24A6B7FA7F5}"/>
+              </a:ext>
+            </a:extLst>
+          </p:cNvPr>
+          <p:cNvPicPr>
+            <a:picLocks noChangeAspect="1"/>
+          </p:cNvPicPr>
+          <p:nvPr/>
+        </p:nvPicPr>
+        <p:blipFill>
+          <a:blip r:embed="rId2">
             <a:extLst>
               <a:ext uri="{28A0092B-C50C-407E-A947-70E740481C1C}">
                 <a14:useLocalDpi xmlns:a14="http://schemas.microsoft.com/office/drawing/2010/main" val="0"/>
@@ -4044,21 +4188,55 @@
           </a:stretch>
         </p:blipFill>
         <p:spPr>
-          <a:xfrm>
-            <a:off x="6641270" y="829057"/>
-            <a:ext cx="2857500" cy="1600200"/>
+          <a:xfrm rot="16200000">
+            <a:off x="-2711636" y="3002718"/>
+            <a:ext cx="6591625" cy="1026863"/>
           </a:xfrm>
           <a:prstGeom prst="rect">
             <a:avLst/>
           </a:prstGeom>
         </p:spPr>
       </p:pic>
+      <p:sp>
+        <p:nvSpPr>
+          <p:cNvPr id="2" name="Title 1">
+            <a:extLst>
+              <a:ext uri="{FF2B5EF4-FFF2-40B4-BE49-F238E27FC236}">
+                <a16:creationId xmlns:a16="http://schemas.microsoft.com/office/drawing/2014/main" id="{B78BD6CC-06EC-41F0-A49E-9914B3569BBB}"/>
+              </a:ext>
+            </a:extLst>
+          </p:cNvPr>
+          <p:cNvSpPr>
+            <a:spLocks noGrp="1"/>
+          </p:cNvSpPr>
+          <p:nvPr>
+            <p:ph type="title"/>
+          </p:nvPr>
+        </p:nvSpPr>
+        <p:spPr/>
+        <p:txBody>
+          <a:bodyPr>
+            <a:normAutofit/>
+          </a:bodyPr>
+          <a:lstStyle/>
+          <a:p>
+            <a:r>
+              <a:rPr lang="en-US" sz="4800" b="1" dirty="0">
+                <a:solidFill>
+                  <a:srgbClr val="777777"/>
+                </a:solidFill>
+              </a:rPr>
+              <a:t>Reflection</a:t>
+            </a:r>
+          </a:p>
+        </p:txBody>
+      </p:sp>
       <p:pic>
         <p:nvPicPr>
-          <p:cNvPr id="27" name="Picture 26">
-            <a:extLst>
-              <a:ext uri="{FF2B5EF4-FFF2-40B4-BE49-F238E27FC236}">
-                <a16:creationId xmlns:a16="http://schemas.microsoft.com/office/drawing/2014/main" id="{AA765A7E-6133-4128-B4D1-1B733C77AD90}"/>
+          <p:cNvPr id="7" name="Picture 6">
+            <a:extLst>
+              <a:ext uri="{FF2B5EF4-FFF2-40B4-BE49-F238E27FC236}">
+                <a16:creationId xmlns:a16="http://schemas.microsoft.com/office/drawing/2014/main" id="{31756008-26B5-498C-B4BB-EDA072BEC72A}"/>
               </a:ext>
             </a:extLst>
           </p:cNvPr>
@@ -4068,7 +4246,7 @@
           <p:nvPr/>
         </p:nvPicPr>
         <p:blipFill>
-          <a:blip r:embed="rId8">
+          <a:blip r:embed="rId2">
             <a:extLst>
               <a:ext uri="{28A0092B-C50C-407E-A947-70E740481C1C}">
                 <a14:useLocalDpi xmlns:a14="http://schemas.microsoft.com/office/drawing/2010/main" val="0"/>
@@ -4081,8 +4259,8 @@
         </p:blipFill>
         <p:spPr>
           <a:xfrm>
-            <a:off x="9181185" y="597497"/>
-            <a:ext cx="2152650" cy="2124075"/>
+            <a:off x="650232" y="262770"/>
+            <a:ext cx="4137525" cy="476190"/>
           </a:xfrm>
           <a:prstGeom prst="rect">
             <a:avLst/>
@@ -4091,10 +4269,10 @@
       </p:pic>
       <p:pic>
         <p:nvPicPr>
-          <p:cNvPr id="23" name="Picture 22">
-            <a:extLst>
-              <a:ext uri="{FF2B5EF4-FFF2-40B4-BE49-F238E27FC236}">
-                <a16:creationId xmlns:a16="http://schemas.microsoft.com/office/drawing/2014/main" id="{C20BA4F3-BF16-43C6-9030-12E84373123F}"/>
+          <p:cNvPr id="8" name="Picture 7">
+            <a:extLst>
+              <a:ext uri="{FF2B5EF4-FFF2-40B4-BE49-F238E27FC236}">
+                <a16:creationId xmlns:a16="http://schemas.microsoft.com/office/drawing/2014/main" id="{41B0AE2E-BC4F-4A32-96E8-B504B231A753}"/>
               </a:ext>
             </a:extLst>
           </p:cNvPr>
@@ -4104,7 +4282,7 @@
           <p:nvPr/>
         </p:nvPicPr>
         <p:blipFill>
-          <a:blip r:embed="rId9">
+          <a:blip r:embed="rId3">
             <a:extLst>
               <a:ext uri="{28A0092B-C50C-407E-A947-70E740481C1C}">
                 <a14:useLocalDpi xmlns:a14="http://schemas.microsoft.com/office/drawing/2010/main" val="0"/>
@@ -4117,20 +4295,95 @@
         </p:blipFill>
         <p:spPr>
           <a:xfrm>
-            <a:off x="4954407" y="214769"/>
-            <a:ext cx="1828800" cy="2495550"/>
+            <a:off x="9037115" y="5803809"/>
+            <a:ext cx="3154334" cy="1051444"/>
           </a:xfrm>
           <a:prstGeom prst="rect">
             <a:avLst/>
           </a:prstGeom>
         </p:spPr>
       </p:pic>
+      <p:sp>
+        <p:nvSpPr>
+          <p:cNvPr id="10" name="Content Placeholder 2">
+            <a:extLst>
+              <a:ext uri="{FF2B5EF4-FFF2-40B4-BE49-F238E27FC236}">
+                <a16:creationId xmlns:a16="http://schemas.microsoft.com/office/drawing/2014/main" id="{1C9D4C57-2F9A-43AE-8677-9502474D110C}"/>
+              </a:ext>
+            </a:extLst>
+          </p:cNvPr>
+          <p:cNvSpPr>
+            <a:spLocks noGrp="1"/>
+          </p:cNvSpPr>
+          <p:nvPr>
+            <p:ph idx="1"/>
+          </p:nvPr>
+        </p:nvSpPr>
+        <p:spPr>
+          <a:xfrm>
+            <a:off x="838200" y="1452471"/>
+            <a:ext cx="10515600" cy="4351338"/>
+          </a:xfrm>
+        </p:spPr>
+        <p:txBody>
+          <a:bodyPr>
+            <a:normAutofit/>
+          </a:bodyPr>
+          <a:lstStyle/>
+          <a:p>
+            <a:pPr marL="457200" lvl="1" indent="0">
+              <a:buNone/>
+            </a:pPr>
+            <a:endParaRPr lang="en-US" dirty="0">
+              <a:solidFill>
+                <a:srgbClr val="777777"/>
+              </a:solidFill>
+            </a:endParaRPr>
+          </a:p>
+          <a:p>
+            <a:pPr lvl="1"/>
+            <a:endParaRPr lang="en-US" dirty="0">
+              <a:solidFill>
+                <a:srgbClr val="777777"/>
+              </a:solidFill>
+            </a:endParaRPr>
+          </a:p>
+          <a:p>
+            <a:endParaRPr lang="en-US" sz="3500" dirty="0">
+              <a:solidFill>
+                <a:srgbClr val="777777"/>
+              </a:solidFill>
+            </a:endParaRPr>
+          </a:p>
+          <a:p>
+            <a:endParaRPr lang="en-US" sz="3500" dirty="0">
+              <a:solidFill>
+                <a:srgbClr val="777777"/>
+              </a:solidFill>
+            </a:endParaRPr>
+          </a:p>
+          <a:p>
+            <a:endParaRPr lang="en-US" dirty="0">
+              <a:solidFill>
+                <a:srgbClr val="777777"/>
+              </a:solidFill>
+            </a:endParaRPr>
+          </a:p>
+          <a:p>
+            <a:endParaRPr lang="en-US" dirty="0">
+              <a:solidFill>
+                <a:srgbClr val="777777"/>
+              </a:solidFill>
+            </a:endParaRPr>
+          </a:p>
+        </p:txBody>
+      </p:sp>
       <p:pic>
         <p:nvPicPr>
-          <p:cNvPr id="19" name="Picture 18">
-            <a:extLst>
-              <a:ext uri="{FF2B5EF4-FFF2-40B4-BE49-F238E27FC236}">
-                <a16:creationId xmlns:a16="http://schemas.microsoft.com/office/drawing/2014/main" id="{729B3C39-2481-4818-AFA2-9F05D6691E27}"/>
+          <p:cNvPr id="9" name="Picture 8">
+            <a:extLst>
+              <a:ext uri="{FF2B5EF4-FFF2-40B4-BE49-F238E27FC236}">
+                <a16:creationId xmlns:a16="http://schemas.microsoft.com/office/drawing/2014/main" id="{53554AA0-9657-46C8-BC8A-EF6404AD3D89}"/>
               </a:ext>
             </a:extLst>
           </p:cNvPr>
@@ -4140,7 +4393,7 @@
           <p:nvPr/>
         </p:nvPicPr>
         <p:blipFill>
-          <a:blip r:embed="rId10">
+          <a:blip r:embed="rId4">
             <a:extLst>
               <a:ext uri="{28A0092B-C50C-407E-A947-70E740481C1C}">
                 <a14:useLocalDpi xmlns:a14="http://schemas.microsoft.com/office/drawing/2010/main" val="0"/>
@@ -4153,8 +4406,8 @@
         </p:blipFill>
         <p:spPr>
           <a:xfrm>
-            <a:off x="883637" y="2865692"/>
-            <a:ext cx="2219325" cy="2057400"/>
+            <a:off x="838200" y="6119040"/>
+            <a:ext cx="476190" cy="476190"/>
           </a:xfrm>
           <a:prstGeom prst="rect">
             <a:avLst/>
@@ -4163,10 +4416,10 @@
       </p:pic>
       <p:pic>
         <p:nvPicPr>
-          <p:cNvPr id="4" name="Picture 3">
-            <a:extLst>
-              <a:ext uri="{FF2B5EF4-FFF2-40B4-BE49-F238E27FC236}">
-                <a16:creationId xmlns:a16="http://schemas.microsoft.com/office/drawing/2014/main" id="{98D0CD13-CD46-49F0-B9C9-6EBDC734B600}"/>
+          <p:cNvPr id="11" name="Picture 10">
+            <a:extLst>
+              <a:ext uri="{FF2B5EF4-FFF2-40B4-BE49-F238E27FC236}">
+                <a16:creationId xmlns:a16="http://schemas.microsoft.com/office/drawing/2014/main" id="{6A914B30-4EB6-4805-9773-1EC500ADCB6C}"/>
               </a:ext>
             </a:extLst>
           </p:cNvPr>
@@ -4176,7 +4429,7 @@
           <p:nvPr/>
         </p:nvPicPr>
         <p:blipFill>
-          <a:blip r:embed="rId11">
+          <a:blip r:embed="rId4">
             <a:extLst>
               <a:ext uri="{28A0092B-C50C-407E-A947-70E740481C1C}">
                 <a14:useLocalDpi xmlns:a14="http://schemas.microsoft.com/office/drawing/2010/main" val="0"/>
@@ -4189,8 +4442,8 @@
         </p:blipFill>
         <p:spPr>
           <a:xfrm>
-            <a:off x="2561225" y="2372951"/>
-            <a:ext cx="1717318" cy="1717318"/>
+            <a:off x="1388875" y="6119040"/>
+            <a:ext cx="476190" cy="476190"/>
           </a:xfrm>
           <a:prstGeom prst="rect">
             <a:avLst/>
@@ -4199,10 +4452,10 @@
       </p:pic>
       <p:pic>
         <p:nvPicPr>
-          <p:cNvPr id="14" name="Picture 13">
-            <a:extLst>
-              <a:ext uri="{FF2B5EF4-FFF2-40B4-BE49-F238E27FC236}">
-                <a16:creationId xmlns:a16="http://schemas.microsoft.com/office/drawing/2014/main" id="{F80B4489-8E4C-4050-929D-5264D2059D1F}"/>
+          <p:cNvPr id="12" name="Picture 11">
+            <a:extLst>
+              <a:ext uri="{FF2B5EF4-FFF2-40B4-BE49-F238E27FC236}">
+                <a16:creationId xmlns:a16="http://schemas.microsoft.com/office/drawing/2014/main" id="{AD78F74E-3885-4DCF-9468-F8A2333ED915}"/>
               </a:ext>
             </a:extLst>
           </p:cNvPr>
@@ -4212,7 +4465,7 @@
           <p:nvPr/>
         </p:nvPicPr>
         <p:blipFill>
-          <a:blip r:embed="rId12">
+          <a:blip r:embed="rId4">
             <a:extLst>
               <a:ext uri="{28A0092B-C50C-407E-A947-70E740481C1C}">
                 <a14:useLocalDpi xmlns:a14="http://schemas.microsoft.com/office/drawing/2010/main" val="0"/>
@@ -4225,20 +4478,436 @@
         </p:blipFill>
         <p:spPr>
           <a:xfrm>
-            <a:off x="9645364" y="3103957"/>
-            <a:ext cx="2247900" cy="1971675"/>
+            <a:off x="1939550" y="6130590"/>
+            <a:ext cx="476190" cy="476190"/>
           </a:xfrm>
           <a:prstGeom prst="rect">
             <a:avLst/>
           </a:prstGeom>
         </p:spPr>
       </p:pic>
+      <p:sp>
+        <p:nvSpPr>
+          <p:cNvPr id="14" name="TextBox 13">
+            <a:extLst>
+              <a:ext uri="{FF2B5EF4-FFF2-40B4-BE49-F238E27FC236}">
+                <a16:creationId xmlns:a16="http://schemas.microsoft.com/office/drawing/2014/main" id="{BE6B62DC-CA7A-4FE1-BC66-A9198C476579}"/>
+              </a:ext>
+            </a:extLst>
+          </p:cNvPr>
+          <p:cNvSpPr txBox="1"/>
+          <p:nvPr/>
+        </p:nvSpPr>
+        <p:spPr>
+          <a:xfrm>
+            <a:off x="2964386" y="6213020"/>
+            <a:ext cx="5937085" cy="246221"/>
+          </a:xfrm>
+          <a:prstGeom prst="rect">
+            <a:avLst/>
+          </a:prstGeom>
+          <a:noFill/>
+        </p:spPr>
+        <p:txBody>
+          <a:bodyPr wrap="square" rtlCol="0">
+            <a:spAutoFit/>
+          </a:bodyPr>
+          <a:lstStyle/>
+          <a:p>
+            <a:pPr algn="r"/>
+            <a:r>
+              <a:rPr lang="en-US" sz="1000" b="0" i="1" dirty="0">
+                <a:solidFill>
+                  <a:srgbClr val="202124"/>
+                </a:solidFill>
+                <a:effectLst/>
+                <a:latin typeface="Roboto"/>
+              </a:rPr>
+              <a:t>A full-grown </a:t>
+            </a:r>
+            <a:r>
+              <a:rPr lang="en-US" sz="1000" b="1" i="1" dirty="0">
+                <a:solidFill>
+                  <a:srgbClr val="202124"/>
+                </a:solidFill>
+                <a:effectLst/>
+                <a:latin typeface="Roboto"/>
+              </a:rPr>
+              <a:t>aye</a:t>
+            </a:r>
+            <a:r>
+              <a:rPr lang="en-US" sz="1000" b="0" i="1" dirty="0">
+                <a:solidFill>
+                  <a:srgbClr val="202124"/>
+                </a:solidFill>
+                <a:effectLst/>
+                <a:latin typeface="Roboto"/>
+              </a:rPr>
+              <a:t>-</a:t>
+            </a:r>
+            <a:r>
+              <a:rPr lang="en-US" sz="1000" b="1" i="1" dirty="0">
+                <a:solidFill>
+                  <a:srgbClr val="202124"/>
+                </a:solidFill>
+                <a:effectLst/>
+                <a:latin typeface="Roboto"/>
+              </a:rPr>
+              <a:t>aye</a:t>
+            </a:r>
+            <a:r>
+              <a:rPr lang="en-US" sz="1000" b="0" i="1" dirty="0">
+                <a:solidFill>
+                  <a:srgbClr val="202124"/>
+                </a:solidFill>
+                <a:effectLst/>
+                <a:latin typeface="Roboto"/>
+              </a:rPr>
+              <a:t> is usually about three feet long, with a tail as long as its body.</a:t>
+            </a:r>
+            <a:endParaRPr lang="en-US" sz="1000" i="1" dirty="0"/>
+          </a:p>
+        </p:txBody>
+      </p:sp>
+      <p:sp>
+        <p:nvSpPr>
+          <p:cNvPr id="15" name="Content Placeholder 2">
+            <a:extLst>
+              <a:ext uri="{FF2B5EF4-FFF2-40B4-BE49-F238E27FC236}">
+                <a16:creationId xmlns:a16="http://schemas.microsoft.com/office/drawing/2014/main" id="{2436BE30-1D54-4330-82D2-FD5E4E38F9D6}"/>
+              </a:ext>
+            </a:extLst>
+          </p:cNvPr>
+          <p:cNvSpPr txBox="1">
+            <a:spLocks/>
+          </p:cNvSpPr>
+          <p:nvPr/>
+        </p:nvSpPr>
+        <p:spPr>
+          <a:xfrm>
+            <a:off x="871720" y="1452471"/>
+            <a:ext cx="5684528" cy="4870088"/>
+          </a:xfrm>
+          <a:prstGeom prst="rect">
+            <a:avLst/>
+          </a:prstGeom>
+        </p:spPr>
+        <p:txBody>
+          <a:bodyPr vert="horz" lIns="91440" tIns="45720" rIns="91440" bIns="45720" rtlCol="0">
+            <a:normAutofit/>
+          </a:bodyPr>
+          <a:lstStyle>
+            <a:lvl1pPr marL="228600" indent="-228600" algn="l" defTabSz="914400" rtl="0" eaLnBrk="1" latinLnBrk="0" hangingPunct="1">
+              <a:lnSpc>
+                <a:spcPct val="90000"/>
+              </a:lnSpc>
+              <a:spcBef>
+                <a:spcPts val="1000"/>
+              </a:spcBef>
+              <a:buFont typeface="Arial" panose="020B0604020202020204" pitchFamily="34" charset="0"/>
+              <a:buChar char="•"/>
+              <a:defRPr sz="2800" kern="1200">
+                <a:solidFill>
+                  <a:schemeClr val="tx1"/>
+                </a:solidFill>
+                <a:latin typeface="+mn-lt"/>
+                <a:ea typeface="+mn-ea"/>
+                <a:cs typeface="+mn-cs"/>
+              </a:defRPr>
+            </a:lvl1pPr>
+            <a:lvl2pPr marL="685800" indent="-228600" algn="l" defTabSz="914400" rtl="0" eaLnBrk="1" latinLnBrk="0" hangingPunct="1">
+              <a:lnSpc>
+                <a:spcPct val="90000"/>
+              </a:lnSpc>
+              <a:spcBef>
+                <a:spcPts val="500"/>
+              </a:spcBef>
+              <a:buFont typeface="Arial" panose="020B0604020202020204" pitchFamily="34" charset="0"/>
+              <a:buChar char="•"/>
+              <a:defRPr sz="2400" kern="1200">
+                <a:solidFill>
+                  <a:schemeClr val="tx1"/>
+                </a:solidFill>
+                <a:latin typeface="+mn-lt"/>
+                <a:ea typeface="+mn-ea"/>
+                <a:cs typeface="+mn-cs"/>
+              </a:defRPr>
+            </a:lvl2pPr>
+            <a:lvl3pPr marL="1143000" indent="-228600" algn="l" defTabSz="914400" rtl="0" eaLnBrk="1" latinLnBrk="0" hangingPunct="1">
+              <a:lnSpc>
+                <a:spcPct val="90000"/>
+              </a:lnSpc>
+              <a:spcBef>
+                <a:spcPts val="500"/>
+              </a:spcBef>
+              <a:buFont typeface="Arial" panose="020B0604020202020204" pitchFamily="34" charset="0"/>
+              <a:buChar char="•"/>
+              <a:defRPr sz="2000" kern="1200">
+                <a:solidFill>
+                  <a:schemeClr val="tx1"/>
+                </a:solidFill>
+                <a:latin typeface="+mn-lt"/>
+                <a:ea typeface="+mn-ea"/>
+                <a:cs typeface="+mn-cs"/>
+              </a:defRPr>
+            </a:lvl3pPr>
+            <a:lvl4pPr marL="1600200" indent="-228600" algn="l" defTabSz="914400" rtl="0" eaLnBrk="1" latinLnBrk="0" hangingPunct="1">
+              <a:lnSpc>
+                <a:spcPct val="90000"/>
+              </a:lnSpc>
+              <a:spcBef>
+                <a:spcPts val="500"/>
+              </a:spcBef>
+              <a:buFont typeface="Arial" panose="020B0604020202020204" pitchFamily="34" charset="0"/>
+              <a:buChar char="•"/>
+              <a:defRPr sz="1800" kern="1200">
+                <a:solidFill>
+                  <a:schemeClr val="tx1"/>
+                </a:solidFill>
+                <a:latin typeface="+mn-lt"/>
+                <a:ea typeface="+mn-ea"/>
+                <a:cs typeface="+mn-cs"/>
+              </a:defRPr>
+            </a:lvl4pPr>
+            <a:lvl5pPr marL="2057400" indent="-228600" algn="l" defTabSz="914400" rtl="0" eaLnBrk="1" latinLnBrk="0" hangingPunct="1">
+              <a:lnSpc>
+                <a:spcPct val="90000"/>
+              </a:lnSpc>
+              <a:spcBef>
+                <a:spcPts val="500"/>
+              </a:spcBef>
+              <a:buFont typeface="Arial" panose="020B0604020202020204" pitchFamily="34" charset="0"/>
+              <a:buChar char="•"/>
+              <a:defRPr sz="1800" kern="1200">
+                <a:solidFill>
+                  <a:schemeClr val="tx1"/>
+                </a:solidFill>
+                <a:latin typeface="+mn-lt"/>
+                <a:ea typeface="+mn-ea"/>
+                <a:cs typeface="+mn-cs"/>
+              </a:defRPr>
+            </a:lvl5pPr>
+            <a:lvl6pPr marL="2514600" indent="-228600" algn="l" defTabSz="914400" rtl="0" eaLnBrk="1" latinLnBrk="0" hangingPunct="1">
+              <a:lnSpc>
+                <a:spcPct val="90000"/>
+              </a:lnSpc>
+              <a:spcBef>
+                <a:spcPts val="500"/>
+              </a:spcBef>
+              <a:buFont typeface="Arial" panose="020B0604020202020204" pitchFamily="34" charset="0"/>
+              <a:buChar char="•"/>
+              <a:defRPr sz="1800" kern="1200">
+                <a:solidFill>
+                  <a:schemeClr val="tx1"/>
+                </a:solidFill>
+                <a:latin typeface="+mn-lt"/>
+                <a:ea typeface="+mn-ea"/>
+                <a:cs typeface="+mn-cs"/>
+              </a:defRPr>
+            </a:lvl6pPr>
+            <a:lvl7pPr marL="2971800" indent="-228600" algn="l" defTabSz="914400" rtl="0" eaLnBrk="1" latinLnBrk="0" hangingPunct="1">
+              <a:lnSpc>
+                <a:spcPct val="90000"/>
+              </a:lnSpc>
+              <a:spcBef>
+                <a:spcPts val="500"/>
+              </a:spcBef>
+              <a:buFont typeface="Arial" panose="020B0604020202020204" pitchFamily="34" charset="0"/>
+              <a:buChar char="•"/>
+              <a:defRPr sz="1800" kern="1200">
+                <a:solidFill>
+                  <a:schemeClr val="tx1"/>
+                </a:solidFill>
+                <a:latin typeface="+mn-lt"/>
+                <a:ea typeface="+mn-ea"/>
+                <a:cs typeface="+mn-cs"/>
+              </a:defRPr>
+            </a:lvl7pPr>
+            <a:lvl8pPr marL="3429000" indent="-228600" algn="l" defTabSz="914400" rtl="0" eaLnBrk="1" latinLnBrk="0" hangingPunct="1">
+              <a:lnSpc>
+                <a:spcPct val="90000"/>
+              </a:lnSpc>
+              <a:spcBef>
+                <a:spcPts val="500"/>
+              </a:spcBef>
+              <a:buFont typeface="Arial" panose="020B0604020202020204" pitchFamily="34" charset="0"/>
+              <a:buChar char="•"/>
+              <a:defRPr sz="1800" kern="1200">
+                <a:solidFill>
+                  <a:schemeClr val="tx1"/>
+                </a:solidFill>
+                <a:latin typeface="+mn-lt"/>
+                <a:ea typeface="+mn-ea"/>
+                <a:cs typeface="+mn-cs"/>
+              </a:defRPr>
+            </a:lvl8pPr>
+            <a:lvl9pPr marL="3886200" indent="-228600" algn="l" defTabSz="914400" rtl="0" eaLnBrk="1" latinLnBrk="0" hangingPunct="1">
+              <a:lnSpc>
+                <a:spcPct val="90000"/>
+              </a:lnSpc>
+              <a:spcBef>
+                <a:spcPts val="500"/>
+              </a:spcBef>
+              <a:buFont typeface="Arial" panose="020B0604020202020204" pitchFamily="34" charset="0"/>
+              <a:buChar char="•"/>
+              <a:defRPr sz="1800" kern="1200">
+                <a:solidFill>
+                  <a:schemeClr val="tx1"/>
+                </a:solidFill>
+                <a:latin typeface="+mn-lt"/>
+                <a:ea typeface="+mn-ea"/>
+                <a:cs typeface="+mn-cs"/>
+              </a:defRPr>
+            </a:lvl9pPr>
+          </a:lstStyle>
+          <a:p>
+            <a:r>
+              <a:rPr lang="en-US" sz="2500" dirty="0">
+                <a:solidFill>
+                  <a:srgbClr val="777777"/>
+                </a:solidFill>
+              </a:rPr>
+              <a:t>More Time</a:t>
+            </a:r>
+          </a:p>
+          <a:p>
+            <a:pPr lvl="1"/>
+            <a:r>
+              <a:rPr lang="en-US" sz="2000" dirty="0">
+                <a:solidFill>
+                  <a:srgbClr val="777777"/>
+                </a:solidFill>
+              </a:rPr>
+              <a:t>Brought in more areas surrounding St. Louis. ( St. Louis City, St. Charles County, Metro East)</a:t>
+            </a:r>
+          </a:p>
+          <a:p>
+            <a:r>
+              <a:rPr lang="en-US" sz="2400" dirty="0">
+                <a:solidFill>
+                  <a:srgbClr val="777777"/>
+                </a:solidFill>
+              </a:rPr>
+              <a:t>More Budget</a:t>
+            </a:r>
+          </a:p>
+          <a:p>
+            <a:pPr lvl="1"/>
+            <a:r>
+              <a:rPr lang="en-US" sz="2000" dirty="0">
+                <a:solidFill>
+                  <a:srgbClr val="777777"/>
+                </a:solidFill>
+              </a:rPr>
+              <a:t>Would have either scraped or purchased latitude and longitude of all listings for more granular analysis.</a:t>
+            </a:r>
+          </a:p>
+          <a:p>
+            <a:r>
+              <a:rPr lang="en-US" sz="2400" dirty="0">
+                <a:solidFill>
+                  <a:srgbClr val="777777"/>
+                </a:solidFill>
+              </a:rPr>
+              <a:t>More Server Space</a:t>
+            </a:r>
+          </a:p>
+          <a:p>
+            <a:pPr lvl="1"/>
+            <a:r>
+              <a:rPr lang="en-US" sz="2000" dirty="0">
+                <a:solidFill>
+                  <a:srgbClr val="777777"/>
+                </a:solidFill>
+              </a:rPr>
+              <a:t>More machine learning models to attempt to increase accuracy.  </a:t>
+            </a:r>
+          </a:p>
+        </p:txBody>
+      </p:sp>
       <p:pic>
         <p:nvPicPr>
-          <p:cNvPr id="21" name="Picture 20">
-            <a:extLst>
-              <a:ext uri="{FF2B5EF4-FFF2-40B4-BE49-F238E27FC236}">
-                <a16:creationId xmlns:a16="http://schemas.microsoft.com/office/drawing/2014/main" id="{420C2504-F99E-44CE-A0B1-9DFB5E912FCF}"/>
+          <p:cNvPr id="2052" name="Picture 4" descr="In search of Madagascar's aye-aye | Wanderlust">
+            <a:extLst>
+              <a:ext uri="{FF2B5EF4-FFF2-40B4-BE49-F238E27FC236}">
+                <a16:creationId xmlns:a16="http://schemas.microsoft.com/office/drawing/2014/main" id="{BC01249A-3595-4A40-9AF8-7C5FF1A06141}"/>
+              </a:ext>
+            </a:extLst>
+          </p:cNvPr>
+          <p:cNvPicPr>
+            <a:picLocks noChangeAspect="1" noChangeArrowheads="1"/>
+          </p:cNvPicPr>
+          <p:nvPr/>
+        </p:nvPicPr>
+        <p:blipFill>
+          <a:blip r:embed="rId5">
+            <a:extLst>
+              <a:ext uri="{28A0092B-C50C-407E-A947-70E740481C1C}">
+                <a14:useLocalDpi xmlns:a14="http://schemas.microsoft.com/office/drawing/2010/main" val="0"/>
+              </a:ext>
+            </a:extLst>
+          </a:blip>
+          <a:srcRect/>
+          <a:stretch>
+            <a:fillRect/>
+          </a:stretch>
+        </p:blipFill>
+        <p:spPr bwMode="auto">
+          <a:xfrm>
+            <a:off x="9052079" y="5871064"/>
+            <a:ext cx="1504984" cy="902990"/>
+          </a:xfrm>
+          <a:prstGeom prst="rect">
+            <a:avLst/>
+          </a:prstGeom>
+          <a:noFill/>
+          <a:extLst>
+            <a:ext uri="{909E8E84-426E-40DD-AFC4-6F175D3DCCD1}">
+              <a14:hiddenFill xmlns:a14="http://schemas.microsoft.com/office/drawing/2010/main">
+                <a:solidFill>
+                  <a:srgbClr val="FFFFFF"/>
+                </a:solidFill>
+              </a14:hiddenFill>
+            </a:ext>
+          </a:extLst>
+        </p:spPr>
+      </p:pic>
+    </p:spTree>
+    <p:extLst>
+      <p:ext uri="{BB962C8B-B14F-4D97-AF65-F5344CB8AC3E}">
+        <p14:creationId xmlns:p14="http://schemas.microsoft.com/office/powerpoint/2010/main" val="1066609285"/>
+      </p:ext>
+    </p:extLst>
+  </p:cSld>
+  <p:clrMapOvr>
+    <a:masterClrMapping/>
+  </p:clrMapOvr>
+</p:sld>
+</file>
+
+<file path=ppt/slides/slide12.xml><?xml version="1.0" encoding="utf-8"?>
+<p:sld xmlns:a="http://schemas.openxmlformats.org/drawingml/2006/main" xmlns:r="http://schemas.openxmlformats.org/officeDocument/2006/relationships" xmlns:p="http://schemas.openxmlformats.org/presentationml/2006/main">
+  <p:cSld>
+    <p:spTree>
+      <p:nvGrpSpPr>
+        <p:cNvPr id="1" name=""/>
+        <p:cNvGrpSpPr/>
+        <p:nvPr/>
+      </p:nvGrpSpPr>
+      <p:grpSpPr>
+        <a:xfrm>
+          <a:off x="0" y="0"/>
+          <a:ext cx="0" cy="0"/>
+          <a:chOff x="0" y="0"/>
+          <a:chExt cx="0" cy="0"/>
+        </a:xfrm>
+      </p:grpSpPr>
+      <p:pic>
+        <p:nvPicPr>
+          <p:cNvPr id="29" name="Picture 28">
+            <a:extLst>
+              <a:ext uri="{FF2B5EF4-FFF2-40B4-BE49-F238E27FC236}">
+                <a16:creationId xmlns:a16="http://schemas.microsoft.com/office/drawing/2014/main" id="{59772A1E-E566-408B-94A7-06A075AE2A37}"/>
               </a:ext>
             </a:extLst>
           </p:cNvPr>
@@ -4248,7 +4917,7 @@
           <p:nvPr/>
         </p:nvPicPr>
         <p:blipFill>
-          <a:blip r:embed="rId13">
+          <a:blip r:embed="rId2">
             <a:extLst>
               <a:ext uri="{28A0092B-C50C-407E-A947-70E740481C1C}">
                 <a14:useLocalDpi xmlns:a14="http://schemas.microsoft.com/office/drawing/2010/main" val="0"/>
@@ -4261,7 +4930,645 @@
         </p:blipFill>
         <p:spPr>
           <a:xfrm>
-            <a:off x="7820383" y="2446043"/>
+            <a:off x="4002729" y="3416299"/>
+            <a:ext cx="4277416" cy="2566450"/>
+          </a:xfrm>
+          <a:prstGeom prst="rect">
+            <a:avLst/>
+          </a:prstGeom>
+        </p:spPr>
+      </p:pic>
+      <p:pic>
+        <p:nvPicPr>
+          <p:cNvPr id="5" name="Picture 4">
+            <a:extLst>
+              <a:ext uri="{FF2B5EF4-FFF2-40B4-BE49-F238E27FC236}">
+                <a16:creationId xmlns:a16="http://schemas.microsoft.com/office/drawing/2014/main" id="{4E1D6A53-CCB1-448E-B73A-C24A6B7FA7F5}"/>
+              </a:ext>
+            </a:extLst>
+          </p:cNvPr>
+          <p:cNvPicPr>
+            <a:picLocks noChangeAspect="1"/>
+          </p:cNvPicPr>
+          <p:nvPr/>
+        </p:nvPicPr>
+        <p:blipFill>
+          <a:blip r:embed="rId3">
+            <a:extLst>
+              <a:ext uri="{28A0092B-C50C-407E-A947-70E740481C1C}">
+                <a14:useLocalDpi xmlns:a14="http://schemas.microsoft.com/office/drawing/2010/main" val="0"/>
+              </a:ext>
+            </a:extLst>
+          </a:blip>
+          <a:stretch>
+            <a:fillRect/>
+          </a:stretch>
+        </p:blipFill>
+        <p:spPr>
+          <a:xfrm rot="16200000">
+            <a:off x="-2711636" y="3002718"/>
+            <a:ext cx="6591625" cy="1026863"/>
+          </a:xfrm>
+          <a:prstGeom prst="rect">
+            <a:avLst/>
+          </a:prstGeom>
+        </p:spPr>
+      </p:pic>
+      <p:sp>
+        <p:nvSpPr>
+          <p:cNvPr id="2" name="Title 1">
+            <a:extLst>
+              <a:ext uri="{FF2B5EF4-FFF2-40B4-BE49-F238E27FC236}">
+                <a16:creationId xmlns:a16="http://schemas.microsoft.com/office/drawing/2014/main" id="{B78BD6CC-06EC-41F0-A49E-9914B3569BBB}"/>
+              </a:ext>
+            </a:extLst>
+          </p:cNvPr>
+          <p:cNvSpPr>
+            <a:spLocks noGrp="1"/>
+          </p:cNvSpPr>
+          <p:nvPr>
+            <p:ph type="title"/>
+          </p:nvPr>
+        </p:nvSpPr>
+        <p:spPr>
+          <a:xfrm>
+            <a:off x="883637" y="2568829"/>
+            <a:ext cx="10515600" cy="1325563"/>
+          </a:xfrm>
+        </p:spPr>
+        <p:txBody>
+          <a:bodyPr>
+            <a:normAutofit/>
+          </a:bodyPr>
+          <a:lstStyle/>
+          <a:p>
+            <a:pPr algn="ctr"/>
+            <a:r>
+              <a:rPr lang="en-US" sz="4800" b="1" dirty="0">
+                <a:solidFill>
+                  <a:srgbClr val="777777"/>
+                </a:solidFill>
+              </a:rPr>
+              <a:t>Questions</a:t>
+            </a:r>
+          </a:p>
+        </p:txBody>
+      </p:sp>
+      <p:pic>
+        <p:nvPicPr>
+          <p:cNvPr id="7" name="Picture 6">
+            <a:extLst>
+              <a:ext uri="{FF2B5EF4-FFF2-40B4-BE49-F238E27FC236}">
+                <a16:creationId xmlns:a16="http://schemas.microsoft.com/office/drawing/2014/main" id="{31756008-26B5-498C-B4BB-EDA072BEC72A}"/>
+              </a:ext>
+            </a:extLst>
+          </p:cNvPr>
+          <p:cNvPicPr>
+            <a:picLocks noChangeAspect="1"/>
+          </p:cNvPicPr>
+          <p:nvPr/>
+        </p:nvPicPr>
+        <p:blipFill>
+          <a:blip r:embed="rId3">
+            <a:extLst>
+              <a:ext uri="{28A0092B-C50C-407E-A947-70E740481C1C}">
+                <a14:useLocalDpi xmlns:a14="http://schemas.microsoft.com/office/drawing/2010/main" val="0"/>
+              </a:ext>
+            </a:extLst>
+          </a:blip>
+          <a:stretch>
+            <a:fillRect/>
+          </a:stretch>
+        </p:blipFill>
+        <p:spPr>
+          <a:xfrm>
+            <a:off x="650232" y="262770"/>
+            <a:ext cx="4137525" cy="476190"/>
+          </a:xfrm>
+          <a:prstGeom prst="rect">
+            <a:avLst/>
+          </a:prstGeom>
+        </p:spPr>
+      </p:pic>
+      <p:pic>
+        <p:nvPicPr>
+          <p:cNvPr id="9" name="Picture 8">
+            <a:extLst>
+              <a:ext uri="{FF2B5EF4-FFF2-40B4-BE49-F238E27FC236}">
+                <a16:creationId xmlns:a16="http://schemas.microsoft.com/office/drawing/2014/main" id="{53554AA0-9657-46C8-BC8A-EF6404AD3D89}"/>
+              </a:ext>
+            </a:extLst>
+          </p:cNvPr>
+          <p:cNvPicPr>
+            <a:picLocks noChangeAspect="1"/>
+          </p:cNvPicPr>
+          <p:nvPr/>
+        </p:nvPicPr>
+        <p:blipFill>
+          <a:blip r:embed="rId4">
+            <a:extLst>
+              <a:ext uri="{28A0092B-C50C-407E-A947-70E740481C1C}">
+                <a14:useLocalDpi xmlns:a14="http://schemas.microsoft.com/office/drawing/2010/main" val="0"/>
+              </a:ext>
+            </a:extLst>
+          </a:blip>
+          <a:stretch>
+            <a:fillRect/>
+          </a:stretch>
+        </p:blipFill>
+        <p:spPr>
+          <a:xfrm>
+            <a:off x="838200" y="6119040"/>
+            <a:ext cx="476190" cy="476190"/>
+          </a:xfrm>
+          <a:prstGeom prst="rect">
+            <a:avLst/>
+          </a:prstGeom>
+        </p:spPr>
+      </p:pic>
+      <p:pic>
+        <p:nvPicPr>
+          <p:cNvPr id="11" name="Picture 10">
+            <a:extLst>
+              <a:ext uri="{FF2B5EF4-FFF2-40B4-BE49-F238E27FC236}">
+                <a16:creationId xmlns:a16="http://schemas.microsoft.com/office/drawing/2014/main" id="{6A914B30-4EB6-4805-9773-1EC500ADCB6C}"/>
+              </a:ext>
+            </a:extLst>
+          </p:cNvPr>
+          <p:cNvPicPr>
+            <a:picLocks noChangeAspect="1"/>
+          </p:cNvPicPr>
+          <p:nvPr/>
+        </p:nvPicPr>
+        <p:blipFill>
+          <a:blip r:embed="rId4">
+            <a:extLst>
+              <a:ext uri="{28A0092B-C50C-407E-A947-70E740481C1C}">
+                <a14:useLocalDpi xmlns:a14="http://schemas.microsoft.com/office/drawing/2010/main" val="0"/>
+              </a:ext>
+            </a:extLst>
+          </a:blip>
+          <a:stretch>
+            <a:fillRect/>
+          </a:stretch>
+        </p:blipFill>
+        <p:spPr>
+          <a:xfrm>
+            <a:off x="1388875" y="6119040"/>
+            <a:ext cx="476190" cy="476190"/>
+          </a:xfrm>
+          <a:prstGeom prst="rect">
+            <a:avLst/>
+          </a:prstGeom>
+        </p:spPr>
+      </p:pic>
+      <p:pic>
+        <p:nvPicPr>
+          <p:cNvPr id="12" name="Picture 11">
+            <a:extLst>
+              <a:ext uri="{FF2B5EF4-FFF2-40B4-BE49-F238E27FC236}">
+                <a16:creationId xmlns:a16="http://schemas.microsoft.com/office/drawing/2014/main" id="{AD78F74E-3885-4DCF-9468-F8A2333ED915}"/>
+              </a:ext>
+            </a:extLst>
+          </p:cNvPr>
+          <p:cNvPicPr>
+            <a:picLocks noChangeAspect="1"/>
+          </p:cNvPicPr>
+          <p:nvPr/>
+        </p:nvPicPr>
+        <p:blipFill>
+          <a:blip r:embed="rId4">
+            <a:extLst>
+              <a:ext uri="{28A0092B-C50C-407E-A947-70E740481C1C}">
+                <a14:useLocalDpi xmlns:a14="http://schemas.microsoft.com/office/drawing/2010/main" val="0"/>
+              </a:ext>
+            </a:extLst>
+          </a:blip>
+          <a:stretch>
+            <a:fillRect/>
+          </a:stretch>
+        </p:blipFill>
+        <p:spPr>
+          <a:xfrm>
+            <a:off x="1939550" y="6130590"/>
+            <a:ext cx="476190" cy="476190"/>
+          </a:xfrm>
+          <a:prstGeom prst="rect">
+            <a:avLst/>
+          </a:prstGeom>
+        </p:spPr>
+      </p:pic>
+      <p:pic>
+        <p:nvPicPr>
+          <p:cNvPr id="10" name="Picture 9">
+            <a:extLst>
+              <a:ext uri="{FF2B5EF4-FFF2-40B4-BE49-F238E27FC236}">
+                <a16:creationId xmlns:a16="http://schemas.microsoft.com/office/drawing/2014/main" id="{8F280CB9-BE83-492C-A8EA-AFC285C29450}"/>
+              </a:ext>
+            </a:extLst>
+          </p:cNvPr>
+          <p:cNvPicPr>
+            <a:picLocks noChangeAspect="1"/>
+          </p:cNvPicPr>
+          <p:nvPr/>
+        </p:nvPicPr>
+        <p:blipFill>
+          <a:blip r:embed="rId5">
+            <a:extLst>
+              <a:ext uri="{28A0092B-C50C-407E-A947-70E740481C1C}">
+                <a14:useLocalDpi xmlns:a14="http://schemas.microsoft.com/office/drawing/2010/main" val="0"/>
+              </a:ext>
+            </a:extLst>
+          </a:blip>
+          <a:stretch>
+            <a:fillRect/>
+          </a:stretch>
+        </p:blipFill>
+        <p:spPr>
+          <a:xfrm>
+            <a:off x="3837095" y="769807"/>
+            <a:ext cx="1262116" cy="1684990"/>
+          </a:xfrm>
+          <a:prstGeom prst="rect">
+            <a:avLst/>
+          </a:prstGeom>
+        </p:spPr>
+      </p:pic>
+      <p:pic>
+        <p:nvPicPr>
+          <p:cNvPr id="17" name="Picture 16">
+            <a:extLst>
+              <a:ext uri="{FF2B5EF4-FFF2-40B4-BE49-F238E27FC236}">
+                <a16:creationId xmlns:a16="http://schemas.microsoft.com/office/drawing/2014/main" id="{9D0CED4E-704C-4F3C-81AB-B833A19FE62B}"/>
+              </a:ext>
+            </a:extLst>
+          </p:cNvPr>
+          <p:cNvPicPr>
+            <a:picLocks noChangeAspect="1"/>
+          </p:cNvPicPr>
+          <p:nvPr/>
+        </p:nvPicPr>
+        <p:blipFill>
+          <a:blip r:embed="rId6">
+            <a:extLst>
+              <a:ext uri="{28A0092B-C50C-407E-A947-70E740481C1C}">
+                <a14:useLocalDpi xmlns:a14="http://schemas.microsoft.com/office/drawing/2010/main" val="0"/>
+              </a:ext>
+            </a:extLst>
+          </a:blip>
+          <a:stretch>
+            <a:fillRect/>
+          </a:stretch>
+        </p:blipFill>
+        <p:spPr>
+          <a:xfrm>
+            <a:off x="1801305" y="1108017"/>
+            <a:ext cx="2114550" cy="2162175"/>
+          </a:xfrm>
+          <a:prstGeom prst="rect">
+            <a:avLst/>
+          </a:prstGeom>
+        </p:spPr>
+      </p:pic>
+      <p:pic>
+        <p:nvPicPr>
+          <p:cNvPr id="25" name="Picture 24">
+            <a:extLst>
+              <a:ext uri="{FF2B5EF4-FFF2-40B4-BE49-F238E27FC236}">
+                <a16:creationId xmlns:a16="http://schemas.microsoft.com/office/drawing/2014/main" id="{9CAC5799-7FB2-4E0C-9105-60376B31BF7F}"/>
+              </a:ext>
+            </a:extLst>
+          </p:cNvPr>
+          <p:cNvPicPr>
+            <a:picLocks noChangeAspect="1"/>
+          </p:cNvPicPr>
+          <p:nvPr/>
+        </p:nvPicPr>
+        <p:blipFill>
+          <a:blip r:embed="rId7">
+            <a:extLst>
+              <a:ext uri="{28A0092B-C50C-407E-A947-70E740481C1C}">
+                <a14:useLocalDpi xmlns:a14="http://schemas.microsoft.com/office/drawing/2010/main" val="0"/>
+              </a:ext>
+            </a:extLst>
+          </a:blip>
+          <a:stretch>
+            <a:fillRect/>
+          </a:stretch>
+        </p:blipFill>
+        <p:spPr>
+          <a:xfrm>
+            <a:off x="6641270" y="829057"/>
+            <a:ext cx="2857500" cy="1600200"/>
+          </a:xfrm>
+          <a:prstGeom prst="rect">
+            <a:avLst/>
+          </a:prstGeom>
+        </p:spPr>
+      </p:pic>
+      <p:pic>
+        <p:nvPicPr>
+          <p:cNvPr id="27" name="Picture 26">
+            <a:extLst>
+              <a:ext uri="{FF2B5EF4-FFF2-40B4-BE49-F238E27FC236}">
+                <a16:creationId xmlns:a16="http://schemas.microsoft.com/office/drawing/2014/main" id="{AA765A7E-6133-4128-B4D1-1B733C77AD90}"/>
+              </a:ext>
+            </a:extLst>
+          </p:cNvPr>
+          <p:cNvPicPr>
+            <a:picLocks noChangeAspect="1"/>
+          </p:cNvPicPr>
+          <p:nvPr/>
+        </p:nvPicPr>
+        <p:blipFill>
+          <a:blip r:embed="rId8">
+            <a:extLst>
+              <a:ext uri="{28A0092B-C50C-407E-A947-70E740481C1C}">
+                <a14:useLocalDpi xmlns:a14="http://schemas.microsoft.com/office/drawing/2010/main" val="0"/>
+              </a:ext>
+            </a:extLst>
+          </a:blip>
+          <a:stretch>
+            <a:fillRect/>
+          </a:stretch>
+        </p:blipFill>
+        <p:spPr>
+          <a:xfrm>
+            <a:off x="9181185" y="597497"/>
+            <a:ext cx="2152650" cy="2124075"/>
+          </a:xfrm>
+          <a:prstGeom prst="rect">
+            <a:avLst/>
+          </a:prstGeom>
+        </p:spPr>
+      </p:pic>
+      <p:pic>
+        <p:nvPicPr>
+          <p:cNvPr id="23" name="Picture 22">
+            <a:extLst>
+              <a:ext uri="{FF2B5EF4-FFF2-40B4-BE49-F238E27FC236}">
+                <a16:creationId xmlns:a16="http://schemas.microsoft.com/office/drawing/2014/main" id="{C20BA4F3-BF16-43C6-9030-12E84373123F}"/>
+              </a:ext>
+            </a:extLst>
+          </p:cNvPr>
+          <p:cNvPicPr>
+            <a:picLocks noChangeAspect="1"/>
+          </p:cNvPicPr>
+          <p:nvPr/>
+        </p:nvPicPr>
+        <p:blipFill>
+          <a:blip r:embed="rId9">
+            <a:extLst>
+              <a:ext uri="{28A0092B-C50C-407E-A947-70E740481C1C}">
+                <a14:useLocalDpi xmlns:a14="http://schemas.microsoft.com/office/drawing/2010/main" val="0"/>
+              </a:ext>
+            </a:extLst>
+          </a:blip>
+          <a:stretch>
+            <a:fillRect/>
+          </a:stretch>
+        </p:blipFill>
+        <p:spPr>
+          <a:xfrm>
+            <a:off x="5036314" y="226022"/>
+            <a:ext cx="1828800" cy="2495550"/>
+          </a:xfrm>
+          <a:prstGeom prst="rect">
+            <a:avLst/>
+          </a:prstGeom>
+        </p:spPr>
+      </p:pic>
+      <p:pic>
+        <p:nvPicPr>
+          <p:cNvPr id="19" name="Picture 18">
+            <a:extLst>
+              <a:ext uri="{FF2B5EF4-FFF2-40B4-BE49-F238E27FC236}">
+                <a16:creationId xmlns:a16="http://schemas.microsoft.com/office/drawing/2014/main" id="{729B3C39-2481-4818-AFA2-9F05D6691E27}"/>
+              </a:ext>
+            </a:extLst>
+          </p:cNvPr>
+          <p:cNvPicPr>
+            <a:picLocks noChangeAspect="1"/>
+          </p:cNvPicPr>
+          <p:nvPr/>
+        </p:nvPicPr>
+        <p:blipFill>
+          <a:blip r:embed="rId10">
+            <a:extLst>
+              <a:ext uri="{28A0092B-C50C-407E-A947-70E740481C1C}">
+                <a14:useLocalDpi xmlns:a14="http://schemas.microsoft.com/office/drawing/2010/main" val="0"/>
+              </a:ext>
+            </a:extLst>
+          </a:blip>
+          <a:stretch>
+            <a:fillRect/>
+          </a:stretch>
+        </p:blipFill>
+        <p:spPr>
+          <a:xfrm>
+            <a:off x="883637" y="2865692"/>
+            <a:ext cx="2219325" cy="2057400"/>
+          </a:xfrm>
+          <a:prstGeom prst="rect">
+            <a:avLst/>
+          </a:prstGeom>
+        </p:spPr>
+      </p:pic>
+      <p:pic>
+        <p:nvPicPr>
+          <p:cNvPr id="4" name="Picture 3">
+            <a:extLst>
+              <a:ext uri="{FF2B5EF4-FFF2-40B4-BE49-F238E27FC236}">
+                <a16:creationId xmlns:a16="http://schemas.microsoft.com/office/drawing/2014/main" id="{98D0CD13-CD46-49F0-B9C9-6EBDC734B600}"/>
+              </a:ext>
+            </a:extLst>
+          </p:cNvPr>
+          <p:cNvPicPr>
+            <a:picLocks noChangeAspect="1"/>
+          </p:cNvPicPr>
+          <p:nvPr/>
+        </p:nvPicPr>
+        <p:blipFill>
+          <a:blip r:embed="rId11">
+            <a:extLst>
+              <a:ext uri="{28A0092B-C50C-407E-A947-70E740481C1C}">
+                <a14:useLocalDpi xmlns:a14="http://schemas.microsoft.com/office/drawing/2010/main" val="0"/>
+              </a:ext>
+            </a:extLst>
+          </a:blip>
+          <a:stretch>
+            <a:fillRect/>
+          </a:stretch>
+        </p:blipFill>
+        <p:spPr>
+          <a:xfrm>
+            <a:off x="2561225" y="2372951"/>
+            <a:ext cx="1717318" cy="1717318"/>
+          </a:xfrm>
+          <a:prstGeom prst="rect">
+            <a:avLst/>
+          </a:prstGeom>
+        </p:spPr>
+      </p:pic>
+      <p:pic>
+        <p:nvPicPr>
+          <p:cNvPr id="18" name="Picture 2" descr="Strange long-fingered aye-aye lemur has a hidden SIXTH digit | Daily Mail  Online">
+            <a:extLst>
+              <a:ext uri="{FF2B5EF4-FFF2-40B4-BE49-F238E27FC236}">
+                <a16:creationId xmlns:a16="http://schemas.microsoft.com/office/drawing/2014/main" id="{648D4C66-692B-4D1D-A852-923E2C0573A1}"/>
+              </a:ext>
+            </a:extLst>
+          </p:cNvPr>
+          <p:cNvPicPr>
+            <a:picLocks noChangeAspect="1" noChangeArrowheads="1"/>
+          </p:cNvPicPr>
+          <p:nvPr/>
+        </p:nvPicPr>
+        <p:blipFill>
+          <a:blip r:embed="rId12">
+            <a:extLst>
+              <a:ext uri="{28A0092B-C50C-407E-A947-70E740481C1C}">
+                <a14:useLocalDpi xmlns:a14="http://schemas.microsoft.com/office/drawing/2010/main" val="0"/>
+              </a:ext>
+            </a:extLst>
+          </a:blip>
+          <a:srcRect/>
+          <a:stretch>
+            <a:fillRect/>
+          </a:stretch>
+        </p:blipFill>
+        <p:spPr bwMode="auto">
+          <a:xfrm>
+            <a:off x="1993299" y="4382038"/>
+            <a:ext cx="1471322" cy="1178228"/>
+          </a:xfrm>
+          <a:prstGeom prst="rect">
+            <a:avLst/>
+          </a:prstGeom>
+          <a:noFill/>
+          <a:extLst>
+            <a:ext uri="{909E8E84-426E-40DD-AFC4-6F175D3DCCD1}">
+              <a14:hiddenFill xmlns:a14="http://schemas.microsoft.com/office/drawing/2010/main">
+                <a:solidFill>
+                  <a:srgbClr val="FFFFFF"/>
+                </a:solidFill>
+              </a14:hiddenFill>
+            </a:ext>
+          </a:extLst>
+        </p:spPr>
+      </p:pic>
+      <p:pic>
+        <p:nvPicPr>
+          <p:cNvPr id="22" name="Picture 4" descr="In search of Madagascar's aye-aye | Wanderlust">
+            <a:extLst>
+              <a:ext uri="{FF2B5EF4-FFF2-40B4-BE49-F238E27FC236}">
+                <a16:creationId xmlns:a16="http://schemas.microsoft.com/office/drawing/2014/main" id="{7D5C7F7B-9282-4780-9F61-6796EA1D51A6}"/>
+              </a:ext>
+            </a:extLst>
+          </p:cNvPr>
+          <p:cNvPicPr>
+            <a:picLocks noChangeAspect="1" noChangeArrowheads="1"/>
+          </p:cNvPicPr>
+          <p:nvPr/>
+        </p:nvPicPr>
+        <p:blipFill>
+          <a:blip r:embed="rId13">
+            <a:extLst>
+              <a:ext uri="{28A0092B-C50C-407E-A947-70E740481C1C}">
+                <a14:useLocalDpi xmlns:a14="http://schemas.microsoft.com/office/drawing/2010/main" val="0"/>
+              </a:ext>
+            </a:extLst>
+          </a:blip>
+          <a:srcRect/>
+          <a:stretch>
+            <a:fillRect/>
+          </a:stretch>
+        </p:blipFill>
+        <p:spPr bwMode="auto">
+          <a:xfrm>
+            <a:off x="8324019" y="4399192"/>
+            <a:ext cx="1994328" cy="1196596"/>
+          </a:xfrm>
+          <a:prstGeom prst="rect">
+            <a:avLst/>
+          </a:prstGeom>
+          <a:noFill/>
+          <a:extLst>
+            <a:ext uri="{909E8E84-426E-40DD-AFC4-6F175D3DCCD1}">
+              <a14:hiddenFill xmlns:a14="http://schemas.microsoft.com/office/drawing/2010/main">
+                <a:solidFill>
+                  <a:srgbClr val="FFFFFF"/>
+                </a:solidFill>
+              </a14:hiddenFill>
+            </a:ext>
+          </a:extLst>
+        </p:spPr>
+      </p:pic>
+      <p:pic>
+        <p:nvPicPr>
+          <p:cNvPr id="14" name="Picture 13">
+            <a:extLst>
+              <a:ext uri="{FF2B5EF4-FFF2-40B4-BE49-F238E27FC236}">
+                <a16:creationId xmlns:a16="http://schemas.microsoft.com/office/drawing/2014/main" id="{F80B4489-8E4C-4050-929D-5264D2059D1F}"/>
+              </a:ext>
+            </a:extLst>
+          </p:cNvPr>
+          <p:cNvPicPr>
+            <a:picLocks noChangeAspect="1"/>
+          </p:cNvPicPr>
+          <p:nvPr/>
+        </p:nvPicPr>
+        <p:blipFill>
+          <a:blip r:embed="rId14">
+            <a:extLst>
+              <a:ext uri="{28A0092B-C50C-407E-A947-70E740481C1C}">
+                <a14:useLocalDpi xmlns:a14="http://schemas.microsoft.com/office/drawing/2010/main" val="0"/>
+              </a:ext>
+            </a:extLst>
+          </a:blip>
+          <a:stretch>
+            <a:fillRect/>
+          </a:stretch>
+        </p:blipFill>
+        <p:spPr>
+          <a:xfrm>
+            <a:off x="9963726" y="3922015"/>
+            <a:ext cx="2054736" cy="1802246"/>
+          </a:xfrm>
+          <a:prstGeom prst="rect">
+            <a:avLst/>
+          </a:prstGeom>
+        </p:spPr>
+      </p:pic>
+      <p:pic>
+        <p:nvPicPr>
+          <p:cNvPr id="21" name="Picture 20">
+            <a:extLst>
+              <a:ext uri="{FF2B5EF4-FFF2-40B4-BE49-F238E27FC236}">
+                <a16:creationId xmlns:a16="http://schemas.microsoft.com/office/drawing/2014/main" id="{420C2504-F99E-44CE-A0B1-9DFB5E912FCF}"/>
+              </a:ext>
+            </a:extLst>
+          </p:cNvPr>
+          <p:cNvPicPr>
+            <a:picLocks noChangeAspect="1"/>
+          </p:cNvPicPr>
+          <p:nvPr/>
+        </p:nvPicPr>
+        <p:blipFill>
+          <a:blip r:embed="rId15">
+            <a:extLst>
+              <a:ext uri="{28A0092B-C50C-407E-A947-70E740481C1C}">
+                <a14:useLocalDpi xmlns:a14="http://schemas.microsoft.com/office/drawing/2010/main" val="0"/>
+              </a:ext>
+            </a:extLst>
+          </a:blip>
+          <a:stretch>
+            <a:fillRect/>
+          </a:stretch>
+        </p:blipFill>
+        <p:spPr>
+          <a:xfrm>
+            <a:off x="8280145" y="2454797"/>
             <a:ext cx="2590800" cy="1762125"/>
           </a:xfrm>
           <a:prstGeom prst="rect">
@@ -4393,7 +5700,7 @@
         </p:spPr>
         <p:txBody>
           <a:bodyPr>
-            <a:normAutofit/>
+            <a:normAutofit fontScale="92500" lnSpcReduction="10000"/>
           </a:bodyPr>
           <a:lstStyle/>
           <a:p>
@@ -4454,6 +5761,16 @@
                 </a:solidFill>
               </a:rPr>
               <a:t>Website Demonstration</a:t>
+            </a:r>
+          </a:p>
+          <a:p>
+            <a:r>
+              <a:rPr lang="en-US" sz="3500" dirty="0">
+                <a:solidFill>
+                  <a:srgbClr val="777777"/>
+                </a:solidFill>
+              </a:rPr>
+              <a:t>Reflection</a:t>
             </a:r>
           </a:p>
           <a:p>
@@ -4830,7 +6147,7 @@
               <a:buNone/>
             </a:pPr>
             <a:r>
-              <a:rPr lang="en-US" dirty="0">
+              <a:rPr lang="en-US" sz="2500" dirty="0">
                 <a:solidFill>
                   <a:srgbClr val="777777"/>
                 </a:solidFill>
@@ -4950,8 +6267,8 @@
         </p:blipFill>
         <p:spPr>
           <a:xfrm>
-            <a:off x="3866753" y="3054916"/>
-            <a:ext cx="4458494" cy="2898022"/>
+            <a:off x="3421570" y="2582508"/>
+            <a:ext cx="5348860" cy="3476760"/>
           </a:xfrm>
           <a:prstGeom prst="rect">
             <a:avLst/>
@@ -6013,7 +7330,7 @@
               <a:t>Scientists believe </a:t>
             </a:r>
             <a:r>
-              <a:rPr lang="en-US" sz="1000" b="1" i="1" dirty="0">
+              <a:rPr lang="en-US" sz="1000" i="1" dirty="0">
                 <a:solidFill>
                   <a:srgbClr val="202124"/>
                 </a:solidFill>
@@ -6030,7 +7347,7 @@
                 <a:effectLst/>
                 <a:latin typeface="arial" panose="020B0604020202020204" pitchFamily="34" charset="0"/>
               </a:rPr>
-              <a:t> may be around 100 or more </a:t>
+              <a:t> are only 100 or more </a:t>
             </a:r>
             <a:r>
               <a:rPr lang="en-US" sz="1000" b="1" i="1" dirty="0">
@@ -6060,22 +7377,68 @@
                 <a:effectLst/>
                 <a:latin typeface="arial" panose="020B0604020202020204" pitchFamily="34" charset="0"/>
               </a:rPr>
-              <a:t>Aye left</a:t>
-            </a:r>
-            <a:r>
-              <a:rPr lang="en-US" sz="1000" b="0" i="1" dirty="0">
+              <a:t>Aye </a:t>
+            </a:r>
+            <a:r>
+              <a:rPr lang="en-US" sz="1000" i="1" dirty="0">
                 <a:solidFill>
                   <a:srgbClr val="202124"/>
                 </a:solidFill>
                 <a:effectLst/>
                 <a:latin typeface="arial" panose="020B0604020202020204" pitchFamily="34" charset="0"/>
               </a:rPr>
+              <a:t>left</a:t>
+            </a:r>
+            <a:r>
+              <a:rPr lang="en-US" sz="1000" b="0" i="1" dirty="0">
+                <a:solidFill>
+                  <a:srgbClr val="202124"/>
+                </a:solidFill>
+                <a:effectLst/>
+                <a:latin typeface="arial" panose="020B0604020202020204" pitchFamily="34" charset="0"/>
+              </a:rPr>
               <a:t> in the wild.</a:t>
             </a:r>
             <a:endParaRPr lang="en-US" sz="1000" i="1" dirty="0"/>
           </a:p>
         </p:txBody>
       </p:sp>
+      <p:pic>
+        <p:nvPicPr>
+          <p:cNvPr id="15" name="Picture 14">
+            <a:extLst>
+              <a:ext uri="{FF2B5EF4-FFF2-40B4-BE49-F238E27FC236}">
+                <a16:creationId xmlns:a16="http://schemas.microsoft.com/office/drawing/2014/main" id="{C3C469B1-2DF7-4214-991A-97B36A699206}"/>
+              </a:ext>
+            </a:extLst>
+          </p:cNvPr>
+          <p:cNvPicPr>
+            <a:picLocks noChangeAspect="1"/>
+          </p:cNvPicPr>
+          <p:nvPr/>
+        </p:nvPicPr>
+        <p:blipFill>
+          <a:blip r:embed="rId6">
+            <a:extLst>
+              <a:ext uri="{28A0092B-C50C-407E-A947-70E740481C1C}">
+                <a14:useLocalDpi xmlns:a14="http://schemas.microsoft.com/office/drawing/2010/main" val="0"/>
+              </a:ext>
+            </a:extLst>
+          </a:blip>
+          <a:stretch>
+            <a:fillRect/>
+          </a:stretch>
+        </p:blipFill>
+        <p:spPr>
+          <a:xfrm>
+            <a:off x="7676356" y="456177"/>
+            <a:ext cx="4474432" cy="4474432"/>
+          </a:xfrm>
+          <a:prstGeom prst="rect">
+            <a:avLst/>
+          </a:prstGeom>
+        </p:spPr>
+      </p:pic>
     </p:spTree>
     <p:extLst>
       <p:ext uri="{BB962C8B-B14F-4D97-AF65-F5344CB8AC3E}">
@@ -6292,6 +7655,16 @@
                   <a:srgbClr val="777777"/>
                 </a:solidFill>
               </a:rPr>
+              <a:t>Original dataset had over 100,000 records </a:t>
+            </a:r>
+          </a:p>
+          <a:p>
+            <a:r>
+              <a:rPr lang="en-US" dirty="0">
+                <a:solidFill>
+                  <a:srgbClr val="777777"/>
+                </a:solidFill>
+              </a:rPr>
               <a:t>Integration of zip code level demographics</a:t>
             </a:r>
           </a:p>
@@ -6595,6 +7968,42 @@
           </a:p>
         </p:txBody>
       </p:sp>
+      <p:pic>
+        <p:nvPicPr>
+          <p:cNvPr id="17" name="Picture 16">
+            <a:extLst>
+              <a:ext uri="{FF2B5EF4-FFF2-40B4-BE49-F238E27FC236}">
+                <a16:creationId xmlns:a16="http://schemas.microsoft.com/office/drawing/2014/main" id="{250A7660-EEC0-4A46-87F4-76DC80E1689A}"/>
+              </a:ext>
+            </a:extLst>
+          </p:cNvPr>
+          <p:cNvPicPr>
+            <a:picLocks noChangeAspect="1"/>
+          </p:cNvPicPr>
+          <p:nvPr/>
+        </p:nvPicPr>
+        <p:blipFill>
+          <a:blip r:embed="rId6">
+            <a:extLst>
+              <a:ext uri="{28A0092B-C50C-407E-A947-70E740481C1C}">
+                <a14:useLocalDpi xmlns:a14="http://schemas.microsoft.com/office/drawing/2010/main" val="0"/>
+              </a:ext>
+            </a:extLst>
+          </a:blip>
+          <a:stretch>
+            <a:fillRect/>
+          </a:stretch>
+        </p:blipFill>
+        <p:spPr>
+          <a:xfrm>
+            <a:off x="7424928" y="1793043"/>
+            <a:ext cx="3377184" cy="3377184"/>
+          </a:xfrm>
+          <a:prstGeom prst="rect">
+            <a:avLst/>
+          </a:prstGeom>
+        </p:spPr>
+      </p:pic>
     </p:spTree>
     <p:extLst>
       <p:ext uri="{BB962C8B-B14F-4D97-AF65-F5344CB8AC3E}">
@@ -7023,10 +8432,30 @@
                 <a:effectLst/>
                 <a:latin typeface="arial" panose="020B0604020202020204" pitchFamily="34" charset="0"/>
               </a:rPr>
-              <a:t>The aye-aye is a lemur native to the island of </a:t>
+              <a:t>The </a:t>
             </a:r>
             <a:r>
               <a:rPr lang="en-US" sz="1000" b="1" i="1" dirty="0">
+                <a:solidFill>
+                  <a:srgbClr val="202124"/>
+                </a:solidFill>
+                <a:effectLst/>
+                <a:latin typeface="arial" panose="020B0604020202020204" pitchFamily="34" charset="0"/>
+              </a:rPr>
+              <a:t>aye-aye</a:t>
+            </a:r>
+            <a:r>
+              <a:rPr lang="en-US" sz="1000" b="0" i="1" dirty="0">
+                <a:solidFill>
+                  <a:srgbClr val="202124"/>
+                </a:solidFill>
+                <a:effectLst/>
+                <a:latin typeface="arial" panose="020B0604020202020204" pitchFamily="34" charset="0"/>
+              </a:rPr>
+              <a:t> is a lemur native to the island of </a:t>
+            </a:r>
+            <a:r>
+              <a:rPr lang="en-US" sz="1000" i="1" dirty="0">
                 <a:solidFill>
                   <a:srgbClr val="202124"/>
                 </a:solidFill>
@@ -7259,6 +8688,16 @@
             </a:endParaRPr>
           </a:p>
           <a:p>
+            <a:pPr marL="457200" lvl="1" indent="0">
+              <a:buNone/>
+            </a:pPr>
+            <a:endParaRPr lang="en-US" dirty="0">
+              <a:solidFill>
+                <a:srgbClr val="777777"/>
+              </a:solidFill>
+            </a:endParaRPr>
+          </a:p>
+          <a:p>
             <a:pPr lvl="1"/>
             <a:endParaRPr lang="en-US" dirty="0">
               <a:solidFill>
@@ -7404,42 +8843,6 @@
           </a:prstGeom>
         </p:spPr>
       </p:pic>
-      <p:pic>
-        <p:nvPicPr>
-          <p:cNvPr id="6" name="Picture 5">
-            <a:extLst>
-              <a:ext uri="{FF2B5EF4-FFF2-40B4-BE49-F238E27FC236}">
-                <a16:creationId xmlns:a16="http://schemas.microsoft.com/office/drawing/2014/main" id="{3EB0DFE4-E805-4595-A0BA-37B7E69DEE3C}"/>
-              </a:ext>
-            </a:extLst>
-          </p:cNvPr>
-          <p:cNvPicPr>
-            <a:picLocks noChangeAspect="1"/>
-          </p:cNvPicPr>
-          <p:nvPr/>
-        </p:nvPicPr>
-        <p:blipFill>
-          <a:blip r:embed="rId5">
-            <a:extLst>
-              <a:ext uri="{28A0092B-C50C-407E-A947-70E740481C1C}">
-                <a14:useLocalDpi xmlns:a14="http://schemas.microsoft.com/office/drawing/2010/main" val="0"/>
-              </a:ext>
-            </a:extLst>
-          </a:blip>
-          <a:stretch>
-            <a:fillRect/>
-          </a:stretch>
-        </p:blipFill>
-        <p:spPr>
-          <a:xfrm>
-            <a:off x="9062408" y="5468075"/>
-            <a:ext cx="1484326" cy="1301930"/>
-          </a:xfrm>
-          <a:prstGeom prst="rect">
-            <a:avLst/>
-          </a:prstGeom>
-        </p:spPr>
-      </p:pic>
       <p:sp>
         <p:nvSpPr>
           <p:cNvPr id="13" name="TextBox 12">
@@ -7455,7 +8858,7 @@
         <p:spPr>
           <a:xfrm>
             <a:off x="3154886" y="6213020"/>
-            <a:ext cx="5937085" cy="400110"/>
+            <a:ext cx="5937085" cy="246221"/>
           </a:xfrm>
           <a:prstGeom prst="rect">
             <a:avLst/>
@@ -7507,72 +8910,488 @@
                 <a:effectLst/>
                 <a:latin typeface="Roboto"/>
               </a:rPr>
-              <a:t> are the only primates thought to use echolocation to find prey. </a:t>
-            </a:r>
-            <a:r>
-              <a:rPr lang="en-US" sz="1000" b="1" i="1" dirty="0">
-                <a:solidFill>
-                  <a:srgbClr val="202124"/>
+              <a:t> </a:t>
+            </a:r>
+            <a:r>
+              <a:rPr lang="en-US" sz="1000" b="0" i="0" dirty="0">
+                <a:solidFill>
+                  <a:srgbClr val="1D1C1D"/>
                 </a:solidFill>
                 <a:effectLst/>
-                <a:latin typeface="Roboto"/>
-              </a:rPr>
-              <a:t>Aye</a:t>
-            </a:r>
-            <a:r>
-              <a:rPr lang="en-US" sz="1000" b="0" i="1" dirty="0">
-                <a:solidFill>
-                  <a:srgbClr val="202124"/>
-                </a:solidFill>
-                <a:effectLst/>
-                <a:latin typeface="Roboto"/>
-              </a:rPr>
-              <a:t>-</a:t>
-            </a:r>
-            <a:r>
-              <a:rPr lang="en-US" sz="1000" b="1" i="1" dirty="0">
-                <a:solidFill>
-                  <a:srgbClr val="202124"/>
-                </a:solidFill>
-                <a:effectLst/>
-                <a:latin typeface="Roboto"/>
-              </a:rPr>
-              <a:t>ayes</a:t>
-            </a:r>
-            <a:r>
-              <a:rPr lang="en-US" sz="1000" b="0" i="1" dirty="0">
-                <a:solidFill>
-                  <a:srgbClr val="202124"/>
-                </a:solidFill>
-                <a:effectLst/>
-                <a:latin typeface="Roboto"/>
-              </a:rPr>
-              <a:t> tap </a:t>
-            </a:r>
-            <a:r>
-              <a:rPr lang="en-US" sz="1000" b="1" i="1" dirty="0">
-                <a:solidFill>
-                  <a:srgbClr val="202124"/>
-                </a:solidFill>
-                <a:effectLst/>
-                <a:latin typeface="Roboto"/>
-              </a:rPr>
-              <a:t>a long</a:t>
-            </a:r>
-            <a:r>
-              <a:rPr lang="en-US" sz="1000" b="0" i="1" dirty="0">
-                <a:solidFill>
-                  <a:srgbClr val="202124"/>
-                </a:solidFill>
-                <a:effectLst/>
-                <a:latin typeface="Roboto"/>
-              </a:rPr>
-              <a:t> finger on tree bark, feeling for the vibrations of insect larvae.</a:t>
+                <a:latin typeface="Slack-Lato"/>
+              </a:rPr>
+              <a:t> teeth never stop growing, like a rodents.</a:t>
             </a:r>
             <a:endParaRPr lang="en-US" sz="1000" i="1" dirty="0"/>
           </a:p>
         </p:txBody>
       </p:sp>
+      <p:pic>
+        <p:nvPicPr>
+          <p:cNvPr id="1026" name="Picture 2" descr="Strange long-fingered aye-aye lemur has a hidden SIXTH digit | Daily Mail  Online">
+            <a:extLst>
+              <a:ext uri="{FF2B5EF4-FFF2-40B4-BE49-F238E27FC236}">
+                <a16:creationId xmlns:a16="http://schemas.microsoft.com/office/drawing/2014/main" id="{A3B14005-C711-4739-8366-30039E996FA0}"/>
+              </a:ext>
+            </a:extLst>
+          </p:cNvPr>
+          <p:cNvPicPr>
+            <a:picLocks noChangeAspect="1" noChangeArrowheads="1"/>
+          </p:cNvPicPr>
+          <p:nvPr/>
+        </p:nvPicPr>
+        <p:blipFill>
+          <a:blip r:embed="rId5">
+            <a:extLst>
+              <a:ext uri="{28A0092B-C50C-407E-A947-70E740481C1C}">
+                <a14:useLocalDpi xmlns:a14="http://schemas.microsoft.com/office/drawing/2010/main" val="0"/>
+              </a:ext>
+            </a:extLst>
+          </a:blip>
+          <a:srcRect/>
+          <a:stretch>
+            <a:fillRect/>
+          </a:stretch>
+        </p:blipFill>
+        <p:spPr bwMode="auto">
+          <a:xfrm>
+            <a:off x="9265401" y="5687568"/>
+            <a:ext cx="1279492" cy="1024612"/>
+          </a:xfrm>
+          <a:prstGeom prst="rect">
+            <a:avLst/>
+          </a:prstGeom>
+          <a:noFill/>
+          <a:extLst>
+            <a:ext uri="{909E8E84-426E-40DD-AFC4-6F175D3DCCD1}">
+              <a14:hiddenFill xmlns:a14="http://schemas.microsoft.com/office/drawing/2010/main">
+                <a:solidFill>
+                  <a:srgbClr val="FFFFFF"/>
+                </a:solidFill>
+              </a14:hiddenFill>
+            </a:ext>
+          </a:extLst>
+        </p:spPr>
+      </p:pic>
+      <p:sp>
+        <p:nvSpPr>
+          <p:cNvPr id="15" name="Content Placeholder 2">
+            <a:extLst>
+              <a:ext uri="{FF2B5EF4-FFF2-40B4-BE49-F238E27FC236}">
+                <a16:creationId xmlns:a16="http://schemas.microsoft.com/office/drawing/2014/main" id="{2353EA18-93AA-4E47-954B-564C78919851}"/>
+              </a:ext>
+            </a:extLst>
+          </p:cNvPr>
+          <p:cNvSpPr txBox="1">
+            <a:spLocks/>
+          </p:cNvSpPr>
+          <p:nvPr/>
+        </p:nvSpPr>
+        <p:spPr>
+          <a:xfrm>
+            <a:off x="838200" y="1479229"/>
+            <a:ext cx="6915912" cy="4208339"/>
+          </a:xfrm>
+          <a:prstGeom prst="rect">
+            <a:avLst/>
+          </a:prstGeom>
+        </p:spPr>
+        <p:txBody>
+          <a:bodyPr vert="horz" lIns="91440" tIns="45720" rIns="91440" bIns="45720" rtlCol="0">
+            <a:normAutofit fontScale="92500" lnSpcReduction="20000"/>
+          </a:bodyPr>
+          <a:lstStyle>
+            <a:lvl1pPr marL="228600" indent="-228600" algn="l" defTabSz="914400" rtl="0" eaLnBrk="1" latinLnBrk="0" hangingPunct="1">
+              <a:lnSpc>
+                <a:spcPct val="90000"/>
+              </a:lnSpc>
+              <a:spcBef>
+                <a:spcPts val="1000"/>
+              </a:spcBef>
+              <a:buFont typeface="Arial" panose="020B0604020202020204" pitchFamily="34" charset="0"/>
+              <a:buChar char="•"/>
+              <a:defRPr sz="2800" kern="1200">
+                <a:solidFill>
+                  <a:schemeClr val="tx1"/>
+                </a:solidFill>
+                <a:latin typeface="+mn-lt"/>
+                <a:ea typeface="+mn-ea"/>
+                <a:cs typeface="+mn-cs"/>
+              </a:defRPr>
+            </a:lvl1pPr>
+            <a:lvl2pPr marL="685800" indent="-228600" algn="l" defTabSz="914400" rtl="0" eaLnBrk="1" latinLnBrk="0" hangingPunct="1">
+              <a:lnSpc>
+                <a:spcPct val="90000"/>
+              </a:lnSpc>
+              <a:spcBef>
+                <a:spcPts val="500"/>
+              </a:spcBef>
+              <a:buFont typeface="Arial" panose="020B0604020202020204" pitchFamily="34" charset="0"/>
+              <a:buChar char="•"/>
+              <a:defRPr sz="2400" kern="1200">
+                <a:solidFill>
+                  <a:schemeClr val="tx1"/>
+                </a:solidFill>
+                <a:latin typeface="+mn-lt"/>
+                <a:ea typeface="+mn-ea"/>
+                <a:cs typeface="+mn-cs"/>
+              </a:defRPr>
+            </a:lvl2pPr>
+            <a:lvl3pPr marL="1143000" indent="-228600" algn="l" defTabSz="914400" rtl="0" eaLnBrk="1" latinLnBrk="0" hangingPunct="1">
+              <a:lnSpc>
+                <a:spcPct val="90000"/>
+              </a:lnSpc>
+              <a:spcBef>
+                <a:spcPts val="500"/>
+              </a:spcBef>
+              <a:buFont typeface="Arial" panose="020B0604020202020204" pitchFamily="34" charset="0"/>
+              <a:buChar char="•"/>
+              <a:defRPr sz="2000" kern="1200">
+                <a:solidFill>
+                  <a:schemeClr val="tx1"/>
+                </a:solidFill>
+                <a:latin typeface="+mn-lt"/>
+                <a:ea typeface="+mn-ea"/>
+                <a:cs typeface="+mn-cs"/>
+              </a:defRPr>
+            </a:lvl3pPr>
+            <a:lvl4pPr marL="1600200" indent="-228600" algn="l" defTabSz="914400" rtl="0" eaLnBrk="1" latinLnBrk="0" hangingPunct="1">
+              <a:lnSpc>
+                <a:spcPct val="90000"/>
+              </a:lnSpc>
+              <a:spcBef>
+                <a:spcPts val="500"/>
+              </a:spcBef>
+              <a:buFont typeface="Arial" panose="020B0604020202020204" pitchFamily="34" charset="0"/>
+              <a:buChar char="•"/>
+              <a:defRPr sz="1800" kern="1200">
+                <a:solidFill>
+                  <a:schemeClr val="tx1"/>
+                </a:solidFill>
+                <a:latin typeface="+mn-lt"/>
+                <a:ea typeface="+mn-ea"/>
+                <a:cs typeface="+mn-cs"/>
+              </a:defRPr>
+            </a:lvl4pPr>
+            <a:lvl5pPr marL="2057400" indent="-228600" algn="l" defTabSz="914400" rtl="0" eaLnBrk="1" latinLnBrk="0" hangingPunct="1">
+              <a:lnSpc>
+                <a:spcPct val="90000"/>
+              </a:lnSpc>
+              <a:spcBef>
+                <a:spcPts val="500"/>
+              </a:spcBef>
+              <a:buFont typeface="Arial" panose="020B0604020202020204" pitchFamily="34" charset="0"/>
+              <a:buChar char="•"/>
+              <a:defRPr sz="1800" kern="1200">
+                <a:solidFill>
+                  <a:schemeClr val="tx1"/>
+                </a:solidFill>
+                <a:latin typeface="+mn-lt"/>
+                <a:ea typeface="+mn-ea"/>
+                <a:cs typeface="+mn-cs"/>
+              </a:defRPr>
+            </a:lvl5pPr>
+            <a:lvl6pPr marL="2514600" indent="-228600" algn="l" defTabSz="914400" rtl="0" eaLnBrk="1" latinLnBrk="0" hangingPunct="1">
+              <a:lnSpc>
+                <a:spcPct val="90000"/>
+              </a:lnSpc>
+              <a:spcBef>
+                <a:spcPts val="500"/>
+              </a:spcBef>
+              <a:buFont typeface="Arial" panose="020B0604020202020204" pitchFamily="34" charset="0"/>
+              <a:buChar char="•"/>
+              <a:defRPr sz="1800" kern="1200">
+                <a:solidFill>
+                  <a:schemeClr val="tx1"/>
+                </a:solidFill>
+                <a:latin typeface="+mn-lt"/>
+                <a:ea typeface="+mn-ea"/>
+                <a:cs typeface="+mn-cs"/>
+              </a:defRPr>
+            </a:lvl6pPr>
+            <a:lvl7pPr marL="2971800" indent="-228600" algn="l" defTabSz="914400" rtl="0" eaLnBrk="1" latinLnBrk="0" hangingPunct="1">
+              <a:lnSpc>
+                <a:spcPct val="90000"/>
+              </a:lnSpc>
+              <a:spcBef>
+                <a:spcPts val="500"/>
+              </a:spcBef>
+              <a:buFont typeface="Arial" panose="020B0604020202020204" pitchFamily="34" charset="0"/>
+              <a:buChar char="•"/>
+              <a:defRPr sz="1800" kern="1200">
+                <a:solidFill>
+                  <a:schemeClr val="tx1"/>
+                </a:solidFill>
+                <a:latin typeface="+mn-lt"/>
+                <a:ea typeface="+mn-ea"/>
+                <a:cs typeface="+mn-cs"/>
+              </a:defRPr>
+            </a:lvl7pPr>
+            <a:lvl8pPr marL="3429000" indent="-228600" algn="l" defTabSz="914400" rtl="0" eaLnBrk="1" latinLnBrk="0" hangingPunct="1">
+              <a:lnSpc>
+                <a:spcPct val="90000"/>
+              </a:lnSpc>
+              <a:spcBef>
+                <a:spcPts val="500"/>
+              </a:spcBef>
+              <a:buFont typeface="Arial" panose="020B0604020202020204" pitchFamily="34" charset="0"/>
+              <a:buChar char="•"/>
+              <a:defRPr sz="1800" kern="1200">
+                <a:solidFill>
+                  <a:schemeClr val="tx1"/>
+                </a:solidFill>
+                <a:latin typeface="+mn-lt"/>
+                <a:ea typeface="+mn-ea"/>
+                <a:cs typeface="+mn-cs"/>
+              </a:defRPr>
+            </a:lvl8pPr>
+            <a:lvl9pPr marL="3886200" indent="-228600" algn="l" defTabSz="914400" rtl="0" eaLnBrk="1" latinLnBrk="0" hangingPunct="1">
+              <a:lnSpc>
+                <a:spcPct val="90000"/>
+              </a:lnSpc>
+              <a:spcBef>
+                <a:spcPts val="500"/>
+              </a:spcBef>
+              <a:buFont typeface="Arial" panose="020B0604020202020204" pitchFamily="34" charset="0"/>
+              <a:buChar char="•"/>
+              <a:defRPr sz="1800" kern="1200">
+                <a:solidFill>
+                  <a:schemeClr val="tx1"/>
+                </a:solidFill>
+                <a:latin typeface="+mn-lt"/>
+                <a:ea typeface="+mn-ea"/>
+                <a:cs typeface="+mn-cs"/>
+              </a:defRPr>
+            </a:lvl9pPr>
+          </a:lstStyle>
+          <a:p>
+            <a:r>
+              <a:rPr lang="en-US" dirty="0">
+                <a:solidFill>
+                  <a:srgbClr val="777777"/>
+                </a:solidFill>
+              </a:rPr>
+              <a:t>Tableau was used </a:t>
+            </a:r>
+          </a:p>
+          <a:p>
+            <a:pPr lvl="1"/>
+            <a:r>
+              <a:rPr lang="en-US" dirty="0">
+                <a:solidFill>
+                  <a:srgbClr val="777777"/>
+                </a:solidFill>
+              </a:rPr>
+              <a:t>Showcase Data</a:t>
+            </a:r>
+          </a:p>
+          <a:p>
+            <a:pPr lvl="1"/>
+            <a:r>
+              <a:rPr lang="en-US" dirty="0">
+                <a:solidFill>
+                  <a:srgbClr val="777777"/>
+                </a:solidFill>
+              </a:rPr>
+              <a:t>Understand Dataset</a:t>
+            </a:r>
+          </a:p>
+          <a:p>
+            <a:r>
+              <a:rPr lang="en-US" dirty="0">
+                <a:solidFill>
+                  <a:srgbClr val="777777"/>
+                </a:solidFill>
+              </a:rPr>
+              <a:t>The following was reviewed</a:t>
+            </a:r>
+          </a:p>
+          <a:p>
+            <a:pPr lvl="1"/>
+            <a:r>
+              <a:rPr lang="en-US" dirty="0">
+                <a:solidFill>
+                  <a:srgbClr val="777777"/>
+                </a:solidFill>
+              </a:rPr>
+              <a:t>Reviewed the Median Price by District</a:t>
+            </a:r>
+          </a:p>
+          <a:p>
+            <a:pPr lvl="1"/>
+            <a:r>
+              <a:rPr lang="en-US" dirty="0">
+                <a:solidFill>
+                  <a:srgbClr val="777777"/>
+                </a:solidFill>
+              </a:rPr>
+              <a:t>Looked at top 10 areas based on price </a:t>
+            </a:r>
+          </a:p>
+          <a:p>
+            <a:pPr lvl="1"/>
+            <a:r>
+              <a:rPr lang="en-US" dirty="0">
+                <a:solidFill>
+                  <a:srgbClr val="777777"/>
+                </a:solidFill>
+              </a:rPr>
+              <a:t>Mapped areas and concentrations based on median price and household income.</a:t>
+            </a:r>
+          </a:p>
+          <a:p>
+            <a:pPr lvl="1"/>
+            <a:r>
+              <a:rPr lang="en-US" dirty="0">
+                <a:solidFill>
+                  <a:srgbClr val="777777"/>
+                </a:solidFill>
+              </a:rPr>
+              <a:t>Square Footage vs Price</a:t>
+            </a:r>
+          </a:p>
+          <a:p>
+            <a:pPr lvl="1"/>
+            <a:r>
+              <a:rPr lang="en-US" dirty="0">
+                <a:solidFill>
+                  <a:srgbClr val="777777"/>
+                </a:solidFill>
+              </a:rPr>
+              <a:t>Days on Market vs Number of Records</a:t>
+            </a:r>
+          </a:p>
+          <a:p>
+            <a:pPr lvl="1"/>
+            <a:r>
+              <a:rPr lang="en-US" dirty="0">
+                <a:solidFill>
+                  <a:srgbClr val="777777"/>
+                </a:solidFill>
+              </a:rPr>
+              <a:t>Median Price vs Year Built</a:t>
+            </a:r>
+          </a:p>
+          <a:p>
+            <a:pPr lvl="1"/>
+            <a:r>
+              <a:rPr lang="en-US" dirty="0">
+                <a:solidFill>
+                  <a:srgbClr val="777777"/>
+                </a:solidFill>
+              </a:rPr>
+              <a:t>Sale Year vs Median Price</a:t>
+            </a:r>
+          </a:p>
+          <a:p>
+            <a:pPr lvl="1"/>
+            <a:r>
+              <a:rPr lang="en-US" dirty="0">
+                <a:solidFill>
+                  <a:srgbClr val="777777"/>
+                </a:solidFill>
+              </a:rPr>
+              <a:t>Monthly Sales vs Number of Records</a:t>
+            </a:r>
+          </a:p>
+          <a:p>
+            <a:pPr lvl="1"/>
+            <a:endParaRPr lang="en-US" dirty="0">
+              <a:solidFill>
+                <a:srgbClr val="777777"/>
+              </a:solidFill>
+            </a:endParaRPr>
+          </a:p>
+          <a:p>
+            <a:endParaRPr lang="en-US" sz="3500" dirty="0">
+              <a:solidFill>
+                <a:srgbClr val="777777"/>
+              </a:solidFill>
+            </a:endParaRPr>
+          </a:p>
+          <a:p>
+            <a:endParaRPr lang="en-US" sz="3500" dirty="0">
+              <a:solidFill>
+                <a:srgbClr val="777777"/>
+              </a:solidFill>
+            </a:endParaRPr>
+          </a:p>
+          <a:p>
+            <a:endParaRPr lang="en-US" dirty="0">
+              <a:solidFill>
+                <a:srgbClr val="777777"/>
+              </a:solidFill>
+            </a:endParaRPr>
+          </a:p>
+          <a:p>
+            <a:endParaRPr lang="en-US" dirty="0">
+              <a:solidFill>
+                <a:srgbClr val="777777"/>
+              </a:solidFill>
+            </a:endParaRPr>
+          </a:p>
+        </p:txBody>
+      </p:sp>
+      <p:pic>
+        <p:nvPicPr>
+          <p:cNvPr id="14" name="Picture 13">
+            <a:extLst>
+              <a:ext uri="{FF2B5EF4-FFF2-40B4-BE49-F238E27FC236}">
+                <a16:creationId xmlns:a16="http://schemas.microsoft.com/office/drawing/2014/main" id="{2279E43D-BB38-458A-9BC5-6426706B2038}"/>
+              </a:ext>
+            </a:extLst>
+          </p:cNvPr>
+          <p:cNvPicPr>
+            <a:picLocks noChangeAspect="1"/>
+          </p:cNvPicPr>
+          <p:nvPr/>
+        </p:nvPicPr>
+        <p:blipFill>
+          <a:blip r:embed="rId6"/>
+          <a:stretch>
+            <a:fillRect/>
+          </a:stretch>
+        </p:blipFill>
+        <p:spPr>
+          <a:xfrm>
+            <a:off x="6554423" y="3685032"/>
+            <a:ext cx="4879932" cy="2006450"/>
+          </a:xfrm>
+          <a:prstGeom prst="rect">
+            <a:avLst/>
+          </a:prstGeom>
+        </p:spPr>
+      </p:pic>
+      <p:pic>
+        <p:nvPicPr>
+          <p:cNvPr id="17" name="Picture 16">
+            <a:extLst>
+              <a:ext uri="{FF2B5EF4-FFF2-40B4-BE49-F238E27FC236}">
+                <a16:creationId xmlns:a16="http://schemas.microsoft.com/office/drawing/2014/main" id="{334A02E2-EFA0-40B7-A08E-8BDA39890A5B}"/>
+              </a:ext>
+            </a:extLst>
+          </p:cNvPr>
+          <p:cNvPicPr>
+            <a:picLocks noChangeAspect="1"/>
+          </p:cNvPicPr>
+          <p:nvPr/>
+        </p:nvPicPr>
+        <p:blipFill>
+          <a:blip r:embed="rId7"/>
+          <a:stretch>
+            <a:fillRect/>
+          </a:stretch>
+        </p:blipFill>
+        <p:spPr>
+          <a:xfrm>
+            <a:off x="4992624" y="1156318"/>
+            <a:ext cx="7126224" cy="1620348"/>
+          </a:xfrm>
+          <a:prstGeom prst="rect">
+            <a:avLst/>
+          </a:prstGeom>
+        </p:spPr>
+      </p:pic>
     </p:spTree>
     <p:extLst>
       <p:ext uri="{BB962C8B-B14F-4D97-AF65-F5344CB8AC3E}">
@@ -7605,10 +9424,10 @@
       </p:grpSpPr>
       <p:pic>
         <p:nvPicPr>
-          <p:cNvPr id="5" name="Picture 4">
-            <a:extLst>
-              <a:ext uri="{FF2B5EF4-FFF2-40B4-BE49-F238E27FC236}">
-                <a16:creationId xmlns:a16="http://schemas.microsoft.com/office/drawing/2014/main" id="{4E1D6A53-CCB1-448E-B73A-C24A6B7FA7F5}"/>
+          <p:cNvPr id="38" name="Picture 37">
+            <a:extLst>
+              <a:ext uri="{FF2B5EF4-FFF2-40B4-BE49-F238E27FC236}">
+                <a16:creationId xmlns:a16="http://schemas.microsoft.com/office/drawing/2014/main" id="{4A4651DE-2A7A-44B7-99AD-BDBA2F5039EE}"/>
               </a:ext>
             </a:extLst>
           </p:cNvPr>
@@ -7641,10 +9460,10 @@
       </p:pic>
       <p:sp>
         <p:nvSpPr>
-          <p:cNvPr id="2" name="Title 1">
-            <a:extLst>
-              <a:ext uri="{FF2B5EF4-FFF2-40B4-BE49-F238E27FC236}">
-                <a16:creationId xmlns:a16="http://schemas.microsoft.com/office/drawing/2014/main" id="{B78BD6CC-06EC-41F0-A49E-9914B3569BBB}"/>
+          <p:cNvPr id="39" name="Title 1">
+            <a:extLst>
+              <a:ext uri="{FF2B5EF4-FFF2-40B4-BE49-F238E27FC236}">
+                <a16:creationId xmlns:a16="http://schemas.microsoft.com/office/drawing/2014/main" id="{0F063197-06B8-4B19-8F76-F3D0062E9910}"/>
               </a:ext>
             </a:extLst>
           </p:cNvPr>
@@ -7655,7 +9474,12 @@
             <p:ph type="title"/>
           </p:nvPr>
         </p:nvSpPr>
-        <p:spPr/>
+        <p:spPr>
+          <a:xfrm>
+            <a:off x="838200" y="365125"/>
+            <a:ext cx="10515600" cy="1325563"/>
+          </a:xfrm>
+        </p:spPr>
         <p:txBody>
           <a:bodyPr>
             <a:normAutofit/>
@@ -7668,17 +9492,17 @@
                   <a:srgbClr val="777777"/>
                 </a:solidFill>
               </a:rPr>
-              <a:t>Machine Learning</a:t>
+              <a:t>Data Analysis – Linear Analysis</a:t>
             </a:r>
           </a:p>
         </p:txBody>
       </p:sp>
       <p:pic>
         <p:nvPicPr>
-          <p:cNvPr id="7" name="Picture 6">
-            <a:extLst>
-              <a:ext uri="{FF2B5EF4-FFF2-40B4-BE49-F238E27FC236}">
-                <a16:creationId xmlns:a16="http://schemas.microsoft.com/office/drawing/2014/main" id="{31756008-26B5-498C-B4BB-EDA072BEC72A}"/>
+          <p:cNvPr id="40" name="Picture 39">
+            <a:extLst>
+              <a:ext uri="{FF2B5EF4-FFF2-40B4-BE49-F238E27FC236}">
+                <a16:creationId xmlns:a16="http://schemas.microsoft.com/office/drawing/2014/main" id="{A22F673A-C978-45F1-9BA2-659CE0F3E02E}"/>
               </a:ext>
             </a:extLst>
           </p:cNvPr>
@@ -7711,10 +9535,10 @@
       </p:pic>
       <p:pic>
         <p:nvPicPr>
-          <p:cNvPr id="8" name="Picture 7">
-            <a:extLst>
-              <a:ext uri="{FF2B5EF4-FFF2-40B4-BE49-F238E27FC236}">
-                <a16:creationId xmlns:a16="http://schemas.microsoft.com/office/drawing/2014/main" id="{41B0AE2E-BC4F-4A32-96E8-B504B231A753}"/>
+          <p:cNvPr id="41" name="Picture 40">
+            <a:extLst>
+              <a:ext uri="{FF2B5EF4-FFF2-40B4-BE49-F238E27FC236}">
+                <a16:creationId xmlns:a16="http://schemas.microsoft.com/office/drawing/2014/main" id="{BA5C0614-0669-452C-95A1-37DBF004DD51}"/>
               </a:ext>
             </a:extLst>
           </p:cNvPr>
@@ -7724,7 +9548,7 @@
           <p:nvPr/>
         </p:nvPicPr>
         <p:blipFill>
-          <a:blip r:embed="rId3">
+          <a:blip r:embed="rId3" cstate="print">
             <a:extLst>
               <a:ext uri="{28A0092B-C50C-407E-A947-70E740481C1C}">
                 <a14:useLocalDpi xmlns:a14="http://schemas.microsoft.com/office/drawing/2010/main" val="0"/>
@@ -7747,10 +9571,10 @@
       </p:pic>
       <p:sp>
         <p:nvSpPr>
-          <p:cNvPr id="10" name="Content Placeholder 2">
-            <a:extLst>
-              <a:ext uri="{FF2B5EF4-FFF2-40B4-BE49-F238E27FC236}">
-                <a16:creationId xmlns:a16="http://schemas.microsoft.com/office/drawing/2014/main" id="{1C9D4C57-2F9A-43AE-8677-9502474D110C}"/>
+          <p:cNvPr id="42" name="Content Placeholder 2">
+            <a:extLst>
+              <a:ext uri="{FF2B5EF4-FFF2-40B4-BE49-F238E27FC236}">
+                <a16:creationId xmlns:a16="http://schemas.microsoft.com/office/drawing/2014/main" id="{6C24960F-6894-49D4-BD48-1B307FEACC8A}"/>
               </a:ext>
             </a:extLst>
           </p:cNvPr>
@@ -7822,10 +9646,10 @@
       </p:sp>
       <p:pic>
         <p:nvPicPr>
-          <p:cNvPr id="9" name="Picture 8">
-            <a:extLst>
-              <a:ext uri="{FF2B5EF4-FFF2-40B4-BE49-F238E27FC236}">
-                <a16:creationId xmlns:a16="http://schemas.microsoft.com/office/drawing/2014/main" id="{53554AA0-9657-46C8-BC8A-EF6404AD3D89}"/>
+          <p:cNvPr id="43" name="Picture 42">
+            <a:extLst>
+              <a:ext uri="{FF2B5EF4-FFF2-40B4-BE49-F238E27FC236}">
+                <a16:creationId xmlns:a16="http://schemas.microsoft.com/office/drawing/2014/main" id="{EDC0163D-3978-4AE7-8F10-56578638742D}"/>
               </a:ext>
             </a:extLst>
           </p:cNvPr>
@@ -7858,10 +9682,10 @@
       </p:pic>
       <p:pic>
         <p:nvPicPr>
-          <p:cNvPr id="11" name="Picture 10">
-            <a:extLst>
-              <a:ext uri="{FF2B5EF4-FFF2-40B4-BE49-F238E27FC236}">
-                <a16:creationId xmlns:a16="http://schemas.microsoft.com/office/drawing/2014/main" id="{6A914B30-4EB6-4805-9773-1EC500ADCB6C}"/>
+          <p:cNvPr id="44" name="Picture 43">
+            <a:extLst>
+              <a:ext uri="{FF2B5EF4-FFF2-40B4-BE49-F238E27FC236}">
+                <a16:creationId xmlns:a16="http://schemas.microsoft.com/office/drawing/2014/main" id="{A33EFD5E-6D2F-4443-ADFF-63DE2B6BEF05}"/>
               </a:ext>
             </a:extLst>
           </p:cNvPr>
@@ -7894,10 +9718,10 @@
       </p:pic>
       <p:pic>
         <p:nvPicPr>
-          <p:cNvPr id="12" name="Picture 11">
-            <a:extLst>
-              <a:ext uri="{FF2B5EF4-FFF2-40B4-BE49-F238E27FC236}">
-                <a16:creationId xmlns:a16="http://schemas.microsoft.com/office/drawing/2014/main" id="{AD78F74E-3885-4DCF-9468-F8A2333ED915}"/>
+          <p:cNvPr id="45" name="Picture 44">
+            <a:extLst>
+              <a:ext uri="{FF2B5EF4-FFF2-40B4-BE49-F238E27FC236}">
+                <a16:creationId xmlns:a16="http://schemas.microsoft.com/office/drawing/2014/main" id="{C32E7FB0-2BBE-4D5F-94D6-989E0A55B630}"/>
               </a:ext>
             </a:extLst>
           </p:cNvPr>
@@ -7930,10 +9754,10 @@
       </p:pic>
       <p:pic>
         <p:nvPicPr>
-          <p:cNvPr id="13" name="Picture 12">
-            <a:extLst>
-              <a:ext uri="{FF2B5EF4-FFF2-40B4-BE49-F238E27FC236}">
-                <a16:creationId xmlns:a16="http://schemas.microsoft.com/office/drawing/2014/main" id="{9F711F4C-722D-4ACF-B23D-7245E23C642C}"/>
+          <p:cNvPr id="46" name="Picture 45">
+            <a:extLst>
+              <a:ext uri="{FF2B5EF4-FFF2-40B4-BE49-F238E27FC236}">
+                <a16:creationId xmlns:a16="http://schemas.microsoft.com/office/drawing/2014/main" id="{CBC1DD60-E22E-4017-BB39-55D3843D506C}"/>
               </a:ext>
             </a:extLst>
           </p:cNvPr>
@@ -7956,8 +9780,8 @@
         </p:blipFill>
         <p:spPr>
           <a:xfrm>
-            <a:off x="8971099" y="5641740"/>
-            <a:ext cx="1613296" cy="1097278"/>
+            <a:off x="9062408" y="5468075"/>
+            <a:ext cx="1484326" cy="1301930"/>
           </a:xfrm>
           <a:prstGeom prst="rect">
             <a:avLst/>
@@ -7966,10 +9790,10 @@
       </p:pic>
       <p:sp>
         <p:nvSpPr>
-          <p:cNvPr id="14" name="TextBox 13">
-            <a:extLst>
-              <a:ext uri="{FF2B5EF4-FFF2-40B4-BE49-F238E27FC236}">
-                <a16:creationId xmlns:a16="http://schemas.microsoft.com/office/drawing/2014/main" id="{BE6B62DC-CA7A-4FE1-BC66-A9198C476579}"/>
+          <p:cNvPr id="47" name="TextBox 46">
+            <a:extLst>
+              <a:ext uri="{FF2B5EF4-FFF2-40B4-BE49-F238E27FC236}">
+                <a16:creationId xmlns:a16="http://schemas.microsoft.com/office/drawing/2014/main" id="{261A6304-F923-4542-9D88-B055038928FE}"/>
               </a:ext>
             </a:extLst>
           </p:cNvPr>
@@ -7978,7 +9802,7 @@
         </p:nvSpPr>
         <p:spPr>
           <a:xfrm>
-            <a:off x="2964386" y="6213020"/>
+            <a:off x="3154886" y="6213020"/>
             <a:ext cx="5937085" cy="400110"/>
           </a:xfrm>
           <a:prstGeom prst="rect">
@@ -7994,83 +9818,596 @@
           <a:p>
             <a:pPr algn="r"/>
             <a:r>
-              <a:rPr lang="en-US" sz="1000" b="0" i="1" dirty="0">
+              <a:rPr lang="en-US" sz="1000" b="1" i="1" dirty="0">
                 <a:solidFill>
                   <a:srgbClr val="202124"/>
                 </a:solidFill>
                 <a:effectLst/>
                 <a:latin typeface="Roboto"/>
               </a:rPr>
-              <a:t>The </a:t>
-            </a:r>
-            <a:r>
-              <a:rPr lang="en-US" sz="1000" b="1" i="1" dirty="0">
+              <a:t>Aye</a:t>
+            </a:r>
+            <a:r>
+              <a:rPr lang="en-US" sz="1000" b="0" i="1" dirty="0">
                 <a:solidFill>
                   <a:srgbClr val="202124"/>
                 </a:solidFill>
                 <a:effectLst/>
                 <a:latin typeface="Roboto"/>
               </a:rPr>
-              <a:t>aye</a:t>
-            </a:r>
-            <a:r>
-              <a:rPr lang="en-US" sz="1000" b="0" i="1" dirty="0">
+              <a:t>-</a:t>
+            </a:r>
+            <a:r>
+              <a:rPr lang="en-US" sz="1000" b="1" i="1" dirty="0">
                 <a:solidFill>
                   <a:srgbClr val="202124"/>
                 </a:solidFill>
                 <a:effectLst/>
                 <a:latin typeface="Roboto"/>
               </a:rPr>
-              <a:t>-</a:t>
-            </a:r>
-            <a:r>
-              <a:rPr lang="en-US" sz="1000" b="1" i="1" dirty="0">
+              <a:t>ayes</a:t>
+            </a:r>
+            <a:r>
+              <a:rPr lang="en-US" sz="1000" b="0" i="1" dirty="0">
                 <a:solidFill>
                   <a:srgbClr val="202124"/>
                 </a:solidFill>
                 <a:effectLst/>
                 <a:latin typeface="Roboto"/>
               </a:rPr>
-              <a:t>aye</a:t>
-            </a:r>
-            <a:r>
-              <a:rPr lang="en-US" sz="1000" b="0" i="1" dirty="0">
+              <a:t> are the only primates thought to use echolocation to find prey. </a:t>
+            </a:r>
+            <a:r>
+              <a:rPr lang="en-US" sz="1000" b="1" i="1" dirty="0">
                 <a:solidFill>
                   <a:srgbClr val="202124"/>
                 </a:solidFill>
                 <a:effectLst/>
                 <a:latin typeface="Roboto"/>
               </a:rPr>
-              <a:t> is often viewed as a harbinger of evil and </a:t>
-            </a:r>
-            <a:r>
-              <a:rPr lang="en-US" sz="1000" b="1" i="1" dirty="0">
+              <a:t>Aye</a:t>
+            </a:r>
+            <a:r>
+              <a:rPr lang="en-US" sz="1000" b="0" i="1" dirty="0">
                 <a:solidFill>
                   <a:srgbClr val="202124"/>
                 </a:solidFill>
                 <a:effectLst/>
                 <a:latin typeface="Roboto"/>
               </a:rPr>
-              <a:t>killed</a:t>
-            </a:r>
-            <a:r>
-              <a:rPr lang="en-US" sz="1000" b="0" i="1" dirty="0">
+              <a:t>-</a:t>
+            </a:r>
+            <a:r>
+              <a:rPr lang="en-US" sz="1000" b="1" i="1" dirty="0">
                 <a:solidFill>
                   <a:srgbClr val="202124"/>
                 </a:solidFill>
                 <a:effectLst/>
                 <a:latin typeface="Roboto"/>
               </a:rPr>
-              <a:t> on sight. Others believe, if one points its narrowest finger at someone, they are marked for death.</a:t>
+              <a:t>ayes</a:t>
+            </a:r>
+            <a:r>
+              <a:rPr lang="en-US" sz="1000" b="0" i="1" dirty="0">
+                <a:solidFill>
+                  <a:srgbClr val="202124"/>
+                </a:solidFill>
+                <a:effectLst/>
+                <a:latin typeface="Roboto"/>
+              </a:rPr>
+              <a:t> tap </a:t>
+            </a:r>
+            <a:r>
+              <a:rPr lang="en-US" sz="1000" b="1" i="1" dirty="0">
+                <a:solidFill>
+                  <a:srgbClr val="202124"/>
+                </a:solidFill>
+                <a:effectLst/>
+                <a:latin typeface="Roboto"/>
+              </a:rPr>
+              <a:t>a long</a:t>
+            </a:r>
+            <a:r>
+              <a:rPr lang="en-US" sz="1000" b="0" i="1" dirty="0">
+                <a:solidFill>
+                  <a:srgbClr val="202124"/>
+                </a:solidFill>
+                <a:effectLst/>
+                <a:latin typeface="Roboto"/>
+              </a:rPr>
+              <a:t> finger on tree bark, feeling for the vibrations of insect larvae.</a:t>
             </a:r>
             <a:endParaRPr lang="en-US" sz="1000" i="1" dirty="0"/>
           </a:p>
         </p:txBody>
       </p:sp>
+      <p:sp>
+        <p:nvSpPr>
+          <p:cNvPr id="48" name="Content Placeholder 2">
+            <a:extLst>
+              <a:ext uri="{FF2B5EF4-FFF2-40B4-BE49-F238E27FC236}">
+                <a16:creationId xmlns:a16="http://schemas.microsoft.com/office/drawing/2014/main" id="{EFA45F4F-4D1D-4F92-8653-EB24A1D41A71}"/>
+              </a:ext>
+            </a:extLst>
+          </p:cNvPr>
+          <p:cNvSpPr txBox="1">
+            <a:spLocks/>
+          </p:cNvSpPr>
+          <p:nvPr/>
+        </p:nvSpPr>
+        <p:spPr>
+          <a:xfrm>
+            <a:off x="871720" y="1452471"/>
+            <a:ext cx="4221487" cy="4870088"/>
+          </a:xfrm>
+          <a:prstGeom prst="rect">
+            <a:avLst/>
+          </a:prstGeom>
+        </p:spPr>
+        <p:txBody>
+          <a:bodyPr vert="horz" lIns="91440" tIns="45720" rIns="91440" bIns="45720" rtlCol="0">
+            <a:normAutofit/>
+          </a:bodyPr>
+          <a:lstStyle>
+            <a:lvl1pPr marL="228600" indent="-228600" algn="l" defTabSz="914400" rtl="0" eaLnBrk="1" latinLnBrk="0" hangingPunct="1">
+              <a:lnSpc>
+                <a:spcPct val="90000"/>
+              </a:lnSpc>
+              <a:spcBef>
+                <a:spcPts val="1000"/>
+              </a:spcBef>
+              <a:buFont typeface="Arial" panose="020B0604020202020204" pitchFamily="34" charset="0"/>
+              <a:buChar char="•"/>
+              <a:defRPr sz="2800" kern="1200">
+                <a:solidFill>
+                  <a:schemeClr val="tx1"/>
+                </a:solidFill>
+                <a:latin typeface="+mn-lt"/>
+                <a:ea typeface="+mn-ea"/>
+                <a:cs typeface="+mn-cs"/>
+              </a:defRPr>
+            </a:lvl1pPr>
+            <a:lvl2pPr marL="685800" indent="-228600" algn="l" defTabSz="914400" rtl="0" eaLnBrk="1" latinLnBrk="0" hangingPunct="1">
+              <a:lnSpc>
+                <a:spcPct val="90000"/>
+              </a:lnSpc>
+              <a:spcBef>
+                <a:spcPts val="500"/>
+              </a:spcBef>
+              <a:buFont typeface="Arial" panose="020B0604020202020204" pitchFamily="34" charset="0"/>
+              <a:buChar char="•"/>
+              <a:defRPr sz="2400" kern="1200">
+                <a:solidFill>
+                  <a:schemeClr val="tx1"/>
+                </a:solidFill>
+                <a:latin typeface="+mn-lt"/>
+                <a:ea typeface="+mn-ea"/>
+                <a:cs typeface="+mn-cs"/>
+              </a:defRPr>
+            </a:lvl2pPr>
+            <a:lvl3pPr marL="1143000" indent="-228600" algn="l" defTabSz="914400" rtl="0" eaLnBrk="1" latinLnBrk="0" hangingPunct="1">
+              <a:lnSpc>
+                <a:spcPct val="90000"/>
+              </a:lnSpc>
+              <a:spcBef>
+                <a:spcPts val="500"/>
+              </a:spcBef>
+              <a:buFont typeface="Arial" panose="020B0604020202020204" pitchFamily="34" charset="0"/>
+              <a:buChar char="•"/>
+              <a:defRPr sz="2000" kern="1200">
+                <a:solidFill>
+                  <a:schemeClr val="tx1"/>
+                </a:solidFill>
+                <a:latin typeface="+mn-lt"/>
+                <a:ea typeface="+mn-ea"/>
+                <a:cs typeface="+mn-cs"/>
+              </a:defRPr>
+            </a:lvl3pPr>
+            <a:lvl4pPr marL="1600200" indent="-228600" algn="l" defTabSz="914400" rtl="0" eaLnBrk="1" latinLnBrk="0" hangingPunct="1">
+              <a:lnSpc>
+                <a:spcPct val="90000"/>
+              </a:lnSpc>
+              <a:spcBef>
+                <a:spcPts val="500"/>
+              </a:spcBef>
+              <a:buFont typeface="Arial" panose="020B0604020202020204" pitchFamily="34" charset="0"/>
+              <a:buChar char="•"/>
+              <a:defRPr sz="1800" kern="1200">
+                <a:solidFill>
+                  <a:schemeClr val="tx1"/>
+                </a:solidFill>
+                <a:latin typeface="+mn-lt"/>
+                <a:ea typeface="+mn-ea"/>
+                <a:cs typeface="+mn-cs"/>
+              </a:defRPr>
+            </a:lvl4pPr>
+            <a:lvl5pPr marL="2057400" indent="-228600" algn="l" defTabSz="914400" rtl="0" eaLnBrk="1" latinLnBrk="0" hangingPunct="1">
+              <a:lnSpc>
+                <a:spcPct val="90000"/>
+              </a:lnSpc>
+              <a:spcBef>
+                <a:spcPts val="500"/>
+              </a:spcBef>
+              <a:buFont typeface="Arial" panose="020B0604020202020204" pitchFamily="34" charset="0"/>
+              <a:buChar char="•"/>
+              <a:defRPr sz="1800" kern="1200">
+                <a:solidFill>
+                  <a:schemeClr val="tx1"/>
+                </a:solidFill>
+                <a:latin typeface="+mn-lt"/>
+                <a:ea typeface="+mn-ea"/>
+                <a:cs typeface="+mn-cs"/>
+              </a:defRPr>
+            </a:lvl5pPr>
+            <a:lvl6pPr marL="2514600" indent="-228600" algn="l" defTabSz="914400" rtl="0" eaLnBrk="1" latinLnBrk="0" hangingPunct="1">
+              <a:lnSpc>
+                <a:spcPct val="90000"/>
+              </a:lnSpc>
+              <a:spcBef>
+                <a:spcPts val="500"/>
+              </a:spcBef>
+              <a:buFont typeface="Arial" panose="020B0604020202020204" pitchFamily="34" charset="0"/>
+              <a:buChar char="•"/>
+              <a:defRPr sz="1800" kern="1200">
+                <a:solidFill>
+                  <a:schemeClr val="tx1"/>
+                </a:solidFill>
+                <a:latin typeface="+mn-lt"/>
+                <a:ea typeface="+mn-ea"/>
+                <a:cs typeface="+mn-cs"/>
+              </a:defRPr>
+            </a:lvl6pPr>
+            <a:lvl7pPr marL="2971800" indent="-228600" algn="l" defTabSz="914400" rtl="0" eaLnBrk="1" latinLnBrk="0" hangingPunct="1">
+              <a:lnSpc>
+                <a:spcPct val="90000"/>
+              </a:lnSpc>
+              <a:spcBef>
+                <a:spcPts val="500"/>
+              </a:spcBef>
+              <a:buFont typeface="Arial" panose="020B0604020202020204" pitchFamily="34" charset="0"/>
+              <a:buChar char="•"/>
+              <a:defRPr sz="1800" kern="1200">
+                <a:solidFill>
+                  <a:schemeClr val="tx1"/>
+                </a:solidFill>
+                <a:latin typeface="+mn-lt"/>
+                <a:ea typeface="+mn-ea"/>
+                <a:cs typeface="+mn-cs"/>
+              </a:defRPr>
+            </a:lvl7pPr>
+            <a:lvl8pPr marL="3429000" indent="-228600" algn="l" defTabSz="914400" rtl="0" eaLnBrk="1" latinLnBrk="0" hangingPunct="1">
+              <a:lnSpc>
+                <a:spcPct val="90000"/>
+              </a:lnSpc>
+              <a:spcBef>
+                <a:spcPts val="500"/>
+              </a:spcBef>
+              <a:buFont typeface="Arial" panose="020B0604020202020204" pitchFamily="34" charset="0"/>
+              <a:buChar char="•"/>
+              <a:defRPr sz="1800" kern="1200">
+                <a:solidFill>
+                  <a:schemeClr val="tx1"/>
+                </a:solidFill>
+                <a:latin typeface="+mn-lt"/>
+                <a:ea typeface="+mn-ea"/>
+                <a:cs typeface="+mn-cs"/>
+              </a:defRPr>
+            </a:lvl8pPr>
+            <a:lvl9pPr marL="3886200" indent="-228600" algn="l" defTabSz="914400" rtl="0" eaLnBrk="1" latinLnBrk="0" hangingPunct="1">
+              <a:lnSpc>
+                <a:spcPct val="90000"/>
+              </a:lnSpc>
+              <a:spcBef>
+                <a:spcPts val="500"/>
+              </a:spcBef>
+              <a:buFont typeface="Arial" panose="020B0604020202020204" pitchFamily="34" charset="0"/>
+              <a:buChar char="•"/>
+              <a:defRPr sz="1800" kern="1200">
+                <a:solidFill>
+                  <a:schemeClr val="tx1"/>
+                </a:solidFill>
+                <a:latin typeface="+mn-lt"/>
+                <a:ea typeface="+mn-ea"/>
+                <a:cs typeface="+mn-cs"/>
+              </a:defRPr>
+            </a:lvl9pPr>
+          </a:lstStyle>
+          <a:p>
+            <a:r>
+              <a:rPr lang="en-US" sz="2500" dirty="0">
+                <a:solidFill>
+                  <a:srgbClr val="777777"/>
+                </a:solidFill>
+              </a:rPr>
+              <a:t>Linear Regression Analysis</a:t>
+            </a:r>
+          </a:p>
+          <a:p>
+            <a:pPr lvl="1"/>
+            <a:r>
+              <a:rPr lang="en-US" sz="1500" dirty="0">
+                <a:solidFill>
+                  <a:srgbClr val="777777"/>
+                </a:solidFill>
+              </a:rPr>
+              <a:t>Descriptive rather than predictive analysis</a:t>
+            </a:r>
+          </a:p>
+          <a:p>
+            <a:pPr marL="914400" lvl="2" indent="0">
+              <a:buNone/>
+            </a:pPr>
+            <a:r>
+              <a:rPr lang="en-US" sz="1100" dirty="0">
+                <a:solidFill>
+                  <a:srgbClr val="777777"/>
+                </a:solidFill>
+              </a:rPr>
+              <a:t>(Fed entire dataset rather than doing a train-test split)</a:t>
+            </a:r>
+          </a:p>
+          <a:p>
+            <a:r>
+              <a:rPr lang="en-US" sz="2500" dirty="0">
+                <a:solidFill>
+                  <a:srgbClr val="777777"/>
+                </a:solidFill>
+              </a:rPr>
+              <a:t>Test Score</a:t>
+            </a:r>
+          </a:p>
+          <a:p>
+            <a:pPr lvl="1"/>
+            <a:r>
+              <a:rPr lang="en-US" sz="1500" dirty="0">
+                <a:solidFill>
+                  <a:srgbClr val="777777"/>
+                </a:solidFill>
+              </a:rPr>
+              <a:t>80% test group scored</a:t>
+            </a:r>
+          </a:p>
+          <a:p>
+            <a:pPr lvl="1"/>
+            <a:r>
+              <a:rPr lang="en-US" sz="1500" dirty="0">
+                <a:solidFill>
+                  <a:srgbClr val="777777"/>
+                </a:solidFill>
+              </a:rPr>
+              <a:t>22% within 5% with additional testing</a:t>
+            </a:r>
+          </a:p>
+          <a:p>
+            <a:pPr lvl="1"/>
+            <a:endParaRPr lang="en-US" sz="1500" dirty="0">
+              <a:solidFill>
+                <a:srgbClr val="777777"/>
+              </a:solidFill>
+            </a:endParaRPr>
+          </a:p>
+          <a:p>
+            <a:pPr marL="457200" lvl="1" indent="0">
+              <a:buNone/>
+            </a:pPr>
+            <a:r>
+              <a:rPr lang="en-US" sz="1500" dirty="0">
+                <a:solidFill>
+                  <a:srgbClr val="777777"/>
+                </a:solidFill>
+              </a:rPr>
+              <a:t> </a:t>
+            </a:r>
+          </a:p>
+          <a:p>
+            <a:endParaRPr lang="en-US" dirty="0">
+              <a:solidFill>
+                <a:srgbClr val="777777"/>
+              </a:solidFill>
+            </a:endParaRPr>
+          </a:p>
+        </p:txBody>
+      </p:sp>
+      <p:sp>
+        <p:nvSpPr>
+          <p:cNvPr id="49" name="TextBox 48">
+            <a:extLst>
+              <a:ext uri="{FF2B5EF4-FFF2-40B4-BE49-F238E27FC236}">
+                <a16:creationId xmlns:a16="http://schemas.microsoft.com/office/drawing/2014/main" id="{D6CB9F22-BE4A-4875-AB53-C3B889A448BF}"/>
+              </a:ext>
+            </a:extLst>
+          </p:cNvPr>
+          <p:cNvSpPr txBox="1"/>
+          <p:nvPr/>
+        </p:nvSpPr>
+        <p:spPr>
+          <a:xfrm>
+            <a:off x="4335775" y="4501112"/>
+            <a:ext cx="3275472" cy="1107996"/>
+          </a:xfrm>
+          <a:prstGeom prst="rect">
+            <a:avLst/>
+          </a:prstGeom>
+          <a:noFill/>
+        </p:spPr>
+        <p:txBody>
+          <a:bodyPr wrap="square" rtlCol="0">
+            <a:spAutoFit/>
+          </a:bodyPr>
+          <a:lstStyle/>
+          <a:p>
+            <a:r>
+              <a:rPr lang="en-US" sz="1200" b="1" dirty="0">
+                <a:solidFill>
+                  <a:srgbClr val="777777"/>
+                </a:solidFill>
+              </a:rPr>
+              <a:t>Interesting Finds</a:t>
+            </a:r>
+          </a:p>
+          <a:p>
+            <a:pPr marL="285750" indent="-285750">
+              <a:buFont typeface="Arial" panose="020B0604020202020204" pitchFamily="34" charset="0"/>
+              <a:buChar char="•"/>
+            </a:pPr>
+            <a:r>
+              <a:rPr lang="en-US" sz="1200" dirty="0">
+                <a:solidFill>
+                  <a:srgbClr val="777777"/>
+                </a:solidFill>
+              </a:rPr>
+              <a:t>Bedrooms alone will decrease a homes value</a:t>
+            </a:r>
+          </a:p>
+          <a:p>
+            <a:pPr marL="285750" indent="-285750">
+              <a:buFont typeface="Arial" panose="020B0604020202020204" pitchFamily="34" charset="0"/>
+              <a:buChar char="•"/>
+            </a:pPr>
+            <a:r>
+              <a:rPr lang="en-US" sz="1200" dirty="0">
+                <a:solidFill>
+                  <a:srgbClr val="777777"/>
+                </a:solidFill>
+              </a:rPr>
+              <a:t>Bathrooms will increase a homes value by $20-30K per.</a:t>
+            </a:r>
+          </a:p>
+          <a:p>
+            <a:endParaRPr lang="en-US" dirty="0"/>
+          </a:p>
+        </p:txBody>
+      </p:sp>
+      <p:pic>
+        <p:nvPicPr>
+          <p:cNvPr id="51" name="Picture 50">
+            <a:extLst>
+              <a:ext uri="{FF2B5EF4-FFF2-40B4-BE49-F238E27FC236}">
+                <a16:creationId xmlns:a16="http://schemas.microsoft.com/office/drawing/2014/main" id="{5A48FDD4-906D-46C4-822A-AAEE23BADC97}"/>
+              </a:ext>
+            </a:extLst>
+          </p:cNvPr>
+          <p:cNvPicPr>
+            <a:picLocks noChangeAspect="1"/>
+          </p:cNvPicPr>
+          <p:nvPr/>
+        </p:nvPicPr>
+        <p:blipFill>
+          <a:blip r:embed="rId6"/>
+          <a:stretch>
+            <a:fillRect/>
+          </a:stretch>
+        </p:blipFill>
+        <p:spPr>
+          <a:xfrm>
+            <a:off x="1488508" y="4381678"/>
+            <a:ext cx="2476142" cy="1674467"/>
+          </a:xfrm>
+          <a:prstGeom prst="rect">
+            <a:avLst/>
+          </a:prstGeom>
+        </p:spPr>
+      </p:pic>
+      <p:pic>
+        <p:nvPicPr>
+          <p:cNvPr id="52" name="Picture 51">
+            <a:extLst>
+              <a:ext uri="{FF2B5EF4-FFF2-40B4-BE49-F238E27FC236}">
+                <a16:creationId xmlns:a16="http://schemas.microsoft.com/office/drawing/2014/main" id="{E3C3457A-D104-4ABB-B945-C1AB1BADB2B3}"/>
+              </a:ext>
+            </a:extLst>
+          </p:cNvPr>
+          <p:cNvPicPr>
+            <a:picLocks noChangeAspect="1"/>
+          </p:cNvPicPr>
+          <p:nvPr/>
+        </p:nvPicPr>
+        <p:blipFill>
+          <a:blip r:embed="rId7"/>
+          <a:stretch>
+            <a:fillRect/>
+          </a:stretch>
+        </p:blipFill>
+        <p:spPr>
+          <a:xfrm>
+            <a:off x="1488508" y="3516149"/>
+            <a:ext cx="2145146" cy="729350"/>
+          </a:xfrm>
+          <a:prstGeom prst="rect">
+            <a:avLst/>
+          </a:prstGeom>
+        </p:spPr>
+      </p:pic>
+      <p:pic>
+        <p:nvPicPr>
+          <p:cNvPr id="53" name="Picture 52">
+            <a:extLst>
+              <a:ext uri="{FF2B5EF4-FFF2-40B4-BE49-F238E27FC236}">
+                <a16:creationId xmlns:a16="http://schemas.microsoft.com/office/drawing/2014/main" id="{49DA8DA2-A94B-49F4-9388-096DDC651ECE}"/>
+              </a:ext>
+            </a:extLst>
+          </p:cNvPr>
+          <p:cNvPicPr>
+            <a:picLocks noChangeAspect="1"/>
+          </p:cNvPicPr>
+          <p:nvPr/>
+        </p:nvPicPr>
+        <p:blipFill>
+          <a:blip r:embed="rId8"/>
+          <a:stretch>
+            <a:fillRect/>
+          </a:stretch>
+        </p:blipFill>
+        <p:spPr>
+          <a:xfrm>
+            <a:off x="4209629" y="3597578"/>
+            <a:ext cx="3742553" cy="719722"/>
+          </a:xfrm>
+          <a:prstGeom prst="rect">
+            <a:avLst/>
+          </a:prstGeom>
+        </p:spPr>
+      </p:pic>
+      <p:pic>
+        <p:nvPicPr>
+          <p:cNvPr id="55" name="Picture 54">
+            <a:extLst>
+              <a:ext uri="{FF2B5EF4-FFF2-40B4-BE49-F238E27FC236}">
+                <a16:creationId xmlns:a16="http://schemas.microsoft.com/office/drawing/2014/main" id="{2EA9A214-78BE-4525-8A84-4E31C0A9344B}"/>
+              </a:ext>
+            </a:extLst>
+          </p:cNvPr>
+          <p:cNvPicPr>
+            <a:picLocks noChangeAspect="1"/>
+          </p:cNvPicPr>
+          <p:nvPr/>
+        </p:nvPicPr>
+        <p:blipFill>
+          <a:blip r:embed="rId9">
+            <a:extLst>
+              <a:ext uri="{28A0092B-C50C-407E-A947-70E740481C1C}">
+                <a14:useLocalDpi xmlns:a14="http://schemas.microsoft.com/office/drawing/2010/main" val="0"/>
+              </a:ext>
+            </a:extLst>
+          </a:blip>
+          <a:stretch>
+            <a:fillRect/>
+          </a:stretch>
+        </p:blipFill>
+        <p:spPr>
+          <a:xfrm>
+            <a:off x="7982372" y="1319608"/>
+            <a:ext cx="3940528" cy="3940528"/>
+          </a:xfrm>
+          <a:prstGeom prst="rect">
+            <a:avLst/>
+          </a:prstGeom>
+        </p:spPr>
+      </p:pic>
     </p:spTree>
     <p:extLst>
       <p:ext uri="{BB962C8B-B14F-4D97-AF65-F5344CB8AC3E}">
-        <p14:creationId xmlns:p14="http://schemas.microsoft.com/office/powerpoint/2010/main" val="4129213164"/>
+        <p14:creationId xmlns:p14="http://schemas.microsoft.com/office/powerpoint/2010/main" val="3260201894"/>
       </p:ext>
     </p:extLst>
   </p:cSld>
@@ -8149,26 +10486,20 @@
             <p:ph type="title"/>
           </p:nvPr>
         </p:nvSpPr>
-        <p:spPr>
-          <a:xfrm>
-            <a:off x="883637" y="2568829"/>
-            <a:ext cx="10515600" cy="1325563"/>
-          </a:xfrm>
-        </p:spPr>
+        <p:spPr/>
         <p:txBody>
           <a:bodyPr>
             <a:normAutofit/>
           </a:bodyPr>
           <a:lstStyle/>
           <a:p>
-            <a:pPr algn="ctr"/>
             <a:r>
               <a:rPr lang="en-US" sz="4800" b="1" dirty="0">
                 <a:solidFill>
                   <a:srgbClr val="777777"/>
                 </a:solidFill>
               </a:rPr>
-              <a:t>Website Demonstration</a:t>
+              <a:t>Machine Learning</a:t>
             </a:r>
           </a:p>
         </p:txBody>
@@ -8355,10 +10686,10 @@
       </p:pic>
       <p:pic>
         <p:nvPicPr>
-          <p:cNvPr id="16" name="Picture 15">
-            <a:extLst>
-              <a:ext uri="{FF2B5EF4-FFF2-40B4-BE49-F238E27FC236}">
-                <a16:creationId xmlns:a16="http://schemas.microsoft.com/office/drawing/2014/main" id="{0C375EE0-0C98-4AD8-BE72-ED19C8977127}"/>
+          <p:cNvPr id="13" name="Picture 12">
+            <a:extLst>
+              <a:ext uri="{FF2B5EF4-FFF2-40B4-BE49-F238E27FC236}">
+                <a16:creationId xmlns:a16="http://schemas.microsoft.com/office/drawing/2014/main" id="{9F711F4C-722D-4ACF-B23D-7245E23C642C}"/>
               </a:ext>
             </a:extLst>
           </p:cNvPr>
@@ -8381,8 +10712,8 @@
         </p:blipFill>
         <p:spPr>
           <a:xfrm>
-            <a:off x="9283146" y="5495544"/>
-            <a:ext cx="1270092" cy="1270092"/>
+            <a:off x="8971099" y="5641740"/>
+            <a:ext cx="1613296" cy="1097278"/>
           </a:xfrm>
           <a:prstGeom prst="rect">
             <a:avLst/>
@@ -8391,10 +10722,10 @@
       </p:pic>
       <p:sp>
         <p:nvSpPr>
-          <p:cNvPr id="10" name="TextBox 9">
-            <a:extLst>
-              <a:ext uri="{FF2B5EF4-FFF2-40B4-BE49-F238E27FC236}">
-                <a16:creationId xmlns:a16="http://schemas.microsoft.com/office/drawing/2014/main" id="{A11629CE-18A3-4B13-AA4E-07916937FCA3}"/>
+          <p:cNvPr id="14" name="TextBox 13">
+            <a:extLst>
+              <a:ext uri="{FF2B5EF4-FFF2-40B4-BE49-F238E27FC236}">
+                <a16:creationId xmlns:a16="http://schemas.microsoft.com/office/drawing/2014/main" id="{BE6B62DC-CA7A-4FE1-BC66-A9198C476579}"/>
               </a:ext>
             </a:extLst>
           </p:cNvPr>
@@ -8403,8 +10734,8 @@
         </p:nvSpPr>
         <p:spPr>
           <a:xfrm>
-            <a:off x="3221561" y="6213020"/>
-            <a:ext cx="5937085" cy="246221"/>
+            <a:off x="2964386" y="6213020"/>
+            <a:ext cx="5937085" cy="400110"/>
           </a:xfrm>
           <a:prstGeom prst="rect">
             <a:avLst/>
@@ -8419,17 +10750,17 @@
           <a:p>
             <a:pPr algn="r"/>
             <a:r>
-              <a:rPr lang="en-US" sz="1000" b="1" i="1" dirty="0">
+              <a:rPr lang="en-US" sz="1000" b="0" i="1" dirty="0">
                 <a:solidFill>
                   <a:srgbClr val="202124"/>
                 </a:solidFill>
                 <a:effectLst/>
                 <a:latin typeface="Roboto"/>
               </a:rPr>
-              <a:t>Aye </a:t>
-            </a:r>
-            <a:r>
-              <a:rPr lang="en-US" sz="1000" b="1" i="1" dirty="0" err="1">
+              <a:t>The </a:t>
+            </a:r>
+            <a:r>
+              <a:rPr lang="en-US" sz="1000" b="1" i="1" dirty="0">
                 <a:solidFill>
                   <a:srgbClr val="202124"/>
                 </a:solidFill>
@@ -8446,7 +10777,7 @@
                 <a:effectLst/>
                 <a:latin typeface="Roboto"/>
               </a:rPr>
-              <a:t> come from the lemur family, and </a:t>
+              <a:t>-</a:t>
             </a:r>
             <a:r>
               <a:rPr lang="en-US" sz="1000" b="1" i="1" dirty="0">
@@ -8456,7 +10787,7 @@
                 <a:effectLst/>
                 <a:latin typeface="Roboto"/>
               </a:rPr>
-              <a:t>baby aye ayes</a:t>
+              <a:t>aye</a:t>
             </a:r>
             <a:r>
               <a:rPr lang="en-US" sz="1000" b="0" i="1" dirty="0">
@@ -8466,17 +10797,17 @@
                 <a:effectLst/>
                 <a:latin typeface="Roboto"/>
               </a:rPr>
-              <a:t> are </a:t>
-            </a:r>
-            <a:r>
-              <a:rPr lang="en-US" sz="1000" b="1" i="1" dirty="0">
+              <a:t> is often viewed as a harbinger of evil and </a:t>
+            </a:r>
+            <a:r>
+              <a:rPr lang="en-US" sz="1000" i="1" dirty="0">
                 <a:solidFill>
                   <a:srgbClr val="202124"/>
                 </a:solidFill>
                 <a:effectLst/>
                 <a:latin typeface="Roboto"/>
               </a:rPr>
-              <a:t>known as</a:t>
+              <a:t>killed</a:t>
             </a:r>
             <a:r>
               <a:rPr lang="en-US" sz="1000" b="0" i="1" dirty="0">
@@ -8486,16 +10817,445 @@
                 <a:effectLst/>
                 <a:latin typeface="Roboto"/>
               </a:rPr>
-              <a:t> “infants”, just like you! </a:t>
+              <a:t> on sight. Others believe, if one points its narrowest finger at someone, they are marked for death.</a:t>
             </a:r>
             <a:endParaRPr lang="en-US" sz="1000" i="1" dirty="0"/>
           </a:p>
         </p:txBody>
       </p:sp>
+      <p:sp>
+        <p:nvSpPr>
+          <p:cNvPr id="17" name="Content Placeholder 2">
+            <a:extLst>
+              <a:ext uri="{FF2B5EF4-FFF2-40B4-BE49-F238E27FC236}">
+                <a16:creationId xmlns:a16="http://schemas.microsoft.com/office/drawing/2014/main" id="{EF6E6C45-B2FC-4F49-B8B5-BE03BFE31BA8}"/>
+              </a:ext>
+            </a:extLst>
+          </p:cNvPr>
+          <p:cNvSpPr txBox="1">
+            <a:spLocks/>
+          </p:cNvSpPr>
+          <p:nvPr/>
+        </p:nvSpPr>
+        <p:spPr>
+          <a:xfrm>
+            <a:off x="853642" y="1409327"/>
+            <a:ext cx="4221487" cy="4870088"/>
+          </a:xfrm>
+          <a:prstGeom prst="rect">
+            <a:avLst/>
+          </a:prstGeom>
+        </p:spPr>
+        <p:txBody>
+          <a:bodyPr vert="horz" lIns="91440" tIns="45720" rIns="91440" bIns="45720" rtlCol="0">
+            <a:normAutofit/>
+          </a:bodyPr>
+          <a:lstStyle>
+            <a:lvl1pPr marL="228600" indent="-228600" algn="l" defTabSz="914400" rtl="0" eaLnBrk="1" latinLnBrk="0" hangingPunct="1">
+              <a:lnSpc>
+                <a:spcPct val="90000"/>
+              </a:lnSpc>
+              <a:spcBef>
+                <a:spcPts val="1000"/>
+              </a:spcBef>
+              <a:buFont typeface="Arial" panose="020B0604020202020204" pitchFamily="34" charset="0"/>
+              <a:buChar char="•"/>
+              <a:defRPr sz="2800" kern="1200">
+                <a:solidFill>
+                  <a:schemeClr val="tx1"/>
+                </a:solidFill>
+                <a:latin typeface="+mn-lt"/>
+                <a:ea typeface="+mn-ea"/>
+                <a:cs typeface="+mn-cs"/>
+              </a:defRPr>
+            </a:lvl1pPr>
+            <a:lvl2pPr marL="685800" indent="-228600" algn="l" defTabSz="914400" rtl="0" eaLnBrk="1" latinLnBrk="0" hangingPunct="1">
+              <a:lnSpc>
+                <a:spcPct val="90000"/>
+              </a:lnSpc>
+              <a:spcBef>
+                <a:spcPts val="500"/>
+              </a:spcBef>
+              <a:buFont typeface="Arial" panose="020B0604020202020204" pitchFamily="34" charset="0"/>
+              <a:buChar char="•"/>
+              <a:defRPr sz="2400" kern="1200">
+                <a:solidFill>
+                  <a:schemeClr val="tx1"/>
+                </a:solidFill>
+                <a:latin typeface="+mn-lt"/>
+                <a:ea typeface="+mn-ea"/>
+                <a:cs typeface="+mn-cs"/>
+              </a:defRPr>
+            </a:lvl2pPr>
+            <a:lvl3pPr marL="1143000" indent="-228600" algn="l" defTabSz="914400" rtl="0" eaLnBrk="1" latinLnBrk="0" hangingPunct="1">
+              <a:lnSpc>
+                <a:spcPct val="90000"/>
+              </a:lnSpc>
+              <a:spcBef>
+                <a:spcPts val="500"/>
+              </a:spcBef>
+              <a:buFont typeface="Arial" panose="020B0604020202020204" pitchFamily="34" charset="0"/>
+              <a:buChar char="•"/>
+              <a:defRPr sz="2000" kern="1200">
+                <a:solidFill>
+                  <a:schemeClr val="tx1"/>
+                </a:solidFill>
+                <a:latin typeface="+mn-lt"/>
+                <a:ea typeface="+mn-ea"/>
+                <a:cs typeface="+mn-cs"/>
+              </a:defRPr>
+            </a:lvl3pPr>
+            <a:lvl4pPr marL="1600200" indent="-228600" algn="l" defTabSz="914400" rtl="0" eaLnBrk="1" latinLnBrk="0" hangingPunct="1">
+              <a:lnSpc>
+                <a:spcPct val="90000"/>
+              </a:lnSpc>
+              <a:spcBef>
+                <a:spcPts val="500"/>
+              </a:spcBef>
+              <a:buFont typeface="Arial" panose="020B0604020202020204" pitchFamily="34" charset="0"/>
+              <a:buChar char="•"/>
+              <a:defRPr sz="1800" kern="1200">
+                <a:solidFill>
+                  <a:schemeClr val="tx1"/>
+                </a:solidFill>
+                <a:latin typeface="+mn-lt"/>
+                <a:ea typeface="+mn-ea"/>
+                <a:cs typeface="+mn-cs"/>
+              </a:defRPr>
+            </a:lvl4pPr>
+            <a:lvl5pPr marL="2057400" indent="-228600" algn="l" defTabSz="914400" rtl="0" eaLnBrk="1" latinLnBrk="0" hangingPunct="1">
+              <a:lnSpc>
+                <a:spcPct val="90000"/>
+              </a:lnSpc>
+              <a:spcBef>
+                <a:spcPts val="500"/>
+              </a:spcBef>
+              <a:buFont typeface="Arial" panose="020B0604020202020204" pitchFamily="34" charset="0"/>
+              <a:buChar char="•"/>
+              <a:defRPr sz="1800" kern="1200">
+                <a:solidFill>
+                  <a:schemeClr val="tx1"/>
+                </a:solidFill>
+                <a:latin typeface="+mn-lt"/>
+                <a:ea typeface="+mn-ea"/>
+                <a:cs typeface="+mn-cs"/>
+              </a:defRPr>
+            </a:lvl5pPr>
+            <a:lvl6pPr marL="2514600" indent="-228600" algn="l" defTabSz="914400" rtl="0" eaLnBrk="1" latinLnBrk="0" hangingPunct="1">
+              <a:lnSpc>
+                <a:spcPct val="90000"/>
+              </a:lnSpc>
+              <a:spcBef>
+                <a:spcPts val="500"/>
+              </a:spcBef>
+              <a:buFont typeface="Arial" panose="020B0604020202020204" pitchFamily="34" charset="0"/>
+              <a:buChar char="•"/>
+              <a:defRPr sz="1800" kern="1200">
+                <a:solidFill>
+                  <a:schemeClr val="tx1"/>
+                </a:solidFill>
+                <a:latin typeface="+mn-lt"/>
+                <a:ea typeface="+mn-ea"/>
+                <a:cs typeface="+mn-cs"/>
+              </a:defRPr>
+            </a:lvl6pPr>
+            <a:lvl7pPr marL="2971800" indent="-228600" algn="l" defTabSz="914400" rtl="0" eaLnBrk="1" latinLnBrk="0" hangingPunct="1">
+              <a:lnSpc>
+                <a:spcPct val="90000"/>
+              </a:lnSpc>
+              <a:spcBef>
+                <a:spcPts val="500"/>
+              </a:spcBef>
+              <a:buFont typeface="Arial" panose="020B0604020202020204" pitchFamily="34" charset="0"/>
+              <a:buChar char="•"/>
+              <a:defRPr sz="1800" kern="1200">
+                <a:solidFill>
+                  <a:schemeClr val="tx1"/>
+                </a:solidFill>
+                <a:latin typeface="+mn-lt"/>
+                <a:ea typeface="+mn-ea"/>
+                <a:cs typeface="+mn-cs"/>
+              </a:defRPr>
+            </a:lvl7pPr>
+            <a:lvl8pPr marL="3429000" indent="-228600" algn="l" defTabSz="914400" rtl="0" eaLnBrk="1" latinLnBrk="0" hangingPunct="1">
+              <a:lnSpc>
+                <a:spcPct val="90000"/>
+              </a:lnSpc>
+              <a:spcBef>
+                <a:spcPts val="500"/>
+              </a:spcBef>
+              <a:buFont typeface="Arial" panose="020B0604020202020204" pitchFamily="34" charset="0"/>
+              <a:buChar char="•"/>
+              <a:defRPr sz="1800" kern="1200">
+                <a:solidFill>
+                  <a:schemeClr val="tx1"/>
+                </a:solidFill>
+                <a:latin typeface="+mn-lt"/>
+                <a:ea typeface="+mn-ea"/>
+                <a:cs typeface="+mn-cs"/>
+              </a:defRPr>
+            </a:lvl8pPr>
+            <a:lvl9pPr marL="3886200" indent="-228600" algn="l" defTabSz="914400" rtl="0" eaLnBrk="1" latinLnBrk="0" hangingPunct="1">
+              <a:lnSpc>
+                <a:spcPct val="90000"/>
+              </a:lnSpc>
+              <a:spcBef>
+                <a:spcPts val="500"/>
+              </a:spcBef>
+              <a:buFont typeface="Arial" panose="020B0604020202020204" pitchFamily="34" charset="0"/>
+              <a:buChar char="•"/>
+              <a:defRPr sz="1800" kern="1200">
+                <a:solidFill>
+                  <a:schemeClr val="tx1"/>
+                </a:solidFill>
+                <a:latin typeface="+mn-lt"/>
+                <a:ea typeface="+mn-ea"/>
+                <a:cs typeface="+mn-cs"/>
+              </a:defRPr>
+            </a:lvl9pPr>
+          </a:lstStyle>
+          <a:p>
+            <a:r>
+              <a:rPr lang="en-US" sz="2500" dirty="0">
+                <a:solidFill>
+                  <a:srgbClr val="777777"/>
+                </a:solidFill>
+              </a:rPr>
+              <a:t>Random Forest </a:t>
+            </a:r>
+            <a:r>
+              <a:rPr lang="en-US" sz="2500" dirty="0" err="1">
+                <a:solidFill>
+                  <a:srgbClr val="777777"/>
+                </a:solidFill>
+              </a:rPr>
+              <a:t>Regressor</a:t>
+            </a:r>
+            <a:endParaRPr lang="en-US" sz="2500" dirty="0">
+              <a:solidFill>
+                <a:srgbClr val="777777"/>
+              </a:solidFill>
+            </a:endParaRPr>
+          </a:p>
+          <a:p>
+            <a:pPr lvl="1"/>
+            <a:r>
+              <a:rPr lang="en-US" sz="1500" dirty="0">
+                <a:solidFill>
+                  <a:srgbClr val="777777"/>
+                </a:solidFill>
+              </a:rPr>
+              <a:t>Did a 60/20/20 Train/tune/test split</a:t>
+            </a:r>
+          </a:p>
+          <a:p>
+            <a:pPr lvl="1"/>
+            <a:r>
+              <a:rPr lang="en-US" sz="1500" dirty="0">
+                <a:solidFill>
+                  <a:srgbClr val="777777"/>
+                </a:solidFill>
+              </a:rPr>
+              <a:t>Developed custom scoring method for </a:t>
+            </a:r>
+            <a:r>
+              <a:rPr lang="en-US" sz="1500" dirty="0" err="1">
+                <a:solidFill>
+                  <a:srgbClr val="777777"/>
+                </a:solidFill>
+              </a:rPr>
+              <a:t>hyperparameter</a:t>
+            </a:r>
+            <a:r>
+              <a:rPr lang="en-US" sz="1500" dirty="0">
+                <a:solidFill>
+                  <a:srgbClr val="777777"/>
+                </a:solidFill>
+              </a:rPr>
+              <a:t> tuning</a:t>
+            </a:r>
+          </a:p>
+          <a:p>
+            <a:pPr lvl="1"/>
+            <a:r>
+              <a:rPr lang="en-US" sz="1500" dirty="0">
+                <a:solidFill>
+                  <a:srgbClr val="777777"/>
+                </a:solidFill>
+              </a:rPr>
+              <a:t>More performant than </a:t>
+            </a:r>
+            <a:r>
+              <a:rPr lang="en-US" sz="1500" dirty="0" err="1">
+                <a:solidFill>
+                  <a:srgbClr val="777777"/>
+                </a:solidFill>
+              </a:rPr>
+              <a:t>KNeighborsRegressor</a:t>
+            </a:r>
+            <a:r>
+              <a:rPr lang="en-US" sz="1500" dirty="0">
+                <a:solidFill>
+                  <a:srgbClr val="777777"/>
+                </a:solidFill>
+              </a:rPr>
+              <a:t>()</a:t>
+            </a:r>
+          </a:p>
+          <a:p>
+            <a:r>
+              <a:rPr lang="en-US" sz="2500" dirty="0">
+                <a:solidFill>
+                  <a:srgbClr val="777777"/>
+                </a:solidFill>
+              </a:rPr>
+              <a:t>Test Score</a:t>
+            </a:r>
+          </a:p>
+          <a:p>
+            <a:pPr lvl="1"/>
+            <a:r>
+              <a:rPr lang="en-US" sz="1500" dirty="0">
+                <a:solidFill>
+                  <a:srgbClr val="777777"/>
+                </a:solidFill>
+              </a:rPr>
+              <a:t>89% test group scored</a:t>
+            </a:r>
+          </a:p>
+          <a:p>
+            <a:pPr lvl="1"/>
+            <a:r>
+              <a:rPr lang="en-US" sz="1500" dirty="0">
+                <a:solidFill>
+                  <a:srgbClr val="777777"/>
+                </a:solidFill>
+              </a:rPr>
+              <a:t>24% within 5% of true price</a:t>
+            </a:r>
+          </a:p>
+          <a:p>
+            <a:r>
+              <a:rPr lang="en-US" sz="2500" dirty="0">
+                <a:solidFill>
+                  <a:srgbClr val="777777"/>
+                </a:solidFill>
+              </a:rPr>
+              <a:t>Machine Learning Limitations</a:t>
+            </a:r>
+            <a:endParaRPr lang="en-US" sz="2100" dirty="0">
+              <a:solidFill>
+                <a:srgbClr val="777777"/>
+              </a:solidFill>
+            </a:endParaRPr>
+          </a:p>
+          <a:p>
+            <a:pPr lvl="1"/>
+            <a:r>
+              <a:rPr lang="en-US" sz="1500" dirty="0">
+                <a:solidFill>
+                  <a:srgbClr val="777777"/>
+                </a:solidFill>
+              </a:rPr>
+              <a:t>Git Hub had size limitations that required the model to be scaled down. </a:t>
+            </a:r>
+          </a:p>
+        </p:txBody>
+      </p:sp>
+      <p:pic>
+        <p:nvPicPr>
+          <p:cNvPr id="18" name="Picture 17">
+            <a:extLst>
+              <a:ext uri="{FF2B5EF4-FFF2-40B4-BE49-F238E27FC236}">
+                <a16:creationId xmlns:a16="http://schemas.microsoft.com/office/drawing/2014/main" id="{0759BC7F-A747-44FF-AE78-9A66AC2B4F19}"/>
+              </a:ext>
+            </a:extLst>
+          </p:cNvPr>
+          <p:cNvPicPr>
+            <a:picLocks noChangeAspect="1"/>
+          </p:cNvPicPr>
+          <p:nvPr/>
+        </p:nvPicPr>
+        <p:blipFill>
+          <a:blip r:embed="rId6"/>
+          <a:stretch>
+            <a:fillRect/>
+          </a:stretch>
+        </p:blipFill>
+        <p:spPr>
+          <a:xfrm>
+            <a:off x="6356591" y="758386"/>
+            <a:ext cx="4227804" cy="2536682"/>
+          </a:xfrm>
+          <a:prstGeom prst="rect">
+            <a:avLst/>
+          </a:prstGeom>
+        </p:spPr>
+      </p:pic>
+      <p:pic>
+        <p:nvPicPr>
+          <p:cNvPr id="19" name="Picture 18">
+            <a:extLst>
+              <a:ext uri="{FF2B5EF4-FFF2-40B4-BE49-F238E27FC236}">
+                <a16:creationId xmlns:a16="http://schemas.microsoft.com/office/drawing/2014/main" id="{7DD68B06-9176-446E-A248-F3FE3716C52F}"/>
+              </a:ext>
+            </a:extLst>
+          </p:cNvPr>
+          <p:cNvPicPr>
+            <a:picLocks noChangeAspect="1"/>
+          </p:cNvPicPr>
+          <p:nvPr/>
+        </p:nvPicPr>
+        <p:blipFill>
+          <a:blip r:embed="rId7"/>
+          <a:stretch>
+            <a:fillRect/>
+          </a:stretch>
+        </p:blipFill>
+        <p:spPr>
+          <a:xfrm>
+            <a:off x="6355081" y="4792335"/>
+            <a:ext cx="4195271" cy="779234"/>
+          </a:xfrm>
+          <a:prstGeom prst="rect">
+            <a:avLst/>
+          </a:prstGeom>
+        </p:spPr>
+      </p:pic>
+      <p:pic>
+        <p:nvPicPr>
+          <p:cNvPr id="20" name="Picture 19">
+            <a:extLst>
+              <a:ext uri="{FF2B5EF4-FFF2-40B4-BE49-F238E27FC236}">
+                <a16:creationId xmlns:a16="http://schemas.microsoft.com/office/drawing/2014/main" id="{2369C5A9-3E91-4458-B313-4173A236DD70}"/>
+              </a:ext>
+            </a:extLst>
+          </p:cNvPr>
+          <p:cNvPicPr>
+            <a:picLocks noChangeAspect="1"/>
+          </p:cNvPicPr>
+          <p:nvPr/>
+        </p:nvPicPr>
+        <p:blipFill>
+          <a:blip r:embed="rId8"/>
+          <a:stretch>
+            <a:fillRect/>
+          </a:stretch>
+        </p:blipFill>
+        <p:spPr>
+          <a:xfrm>
+            <a:off x="6355081" y="3365239"/>
+            <a:ext cx="4825420" cy="1379626"/>
+          </a:xfrm>
+          <a:prstGeom prst="rect">
+            <a:avLst/>
+          </a:prstGeom>
+        </p:spPr>
+      </p:pic>
     </p:spTree>
     <p:extLst>
       <p:ext uri="{BB962C8B-B14F-4D97-AF65-F5344CB8AC3E}">
-        <p14:creationId xmlns:p14="http://schemas.microsoft.com/office/powerpoint/2010/main" val="461459708"/>
+        <p14:creationId xmlns:p14="http://schemas.microsoft.com/office/powerpoint/2010/main" val="4129213164"/>
       </p:ext>
     </p:extLst>
   </p:cSld>

</xml_diff>